<commit_message>
* Proper set up of almost all screens, model screen is missing * Load screen now shown first before game actually starts loading
</commit_message>
<xml_diff>
--- a/handbook/SpaceBIT - Handbook.pptx
+++ b/handbook/SpaceBIT - Handbook.pptx
@@ -9,10 +9,13 @@
     <p:sldId id="257" r:id="rId3"/>
     <p:sldId id="258" r:id="rId4"/>
     <p:sldId id="259" r:id="rId5"/>
-    <p:sldId id="260" r:id="rId6"/>
-    <p:sldId id="261" r:id="rId7"/>
-    <p:sldId id="262" r:id="rId8"/>
-    <p:sldId id="263" r:id="rId9"/>
+    <p:sldId id="266" r:id="rId6"/>
+    <p:sldId id="260" r:id="rId7"/>
+    <p:sldId id="261" r:id="rId8"/>
+    <p:sldId id="262" r:id="rId9"/>
+    <p:sldId id="264" r:id="rId10"/>
+    <p:sldId id="265" r:id="rId11"/>
+    <p:sldId id="263" r:id="rId12"/>
   </p:sldIdLst>
   <p:sldSz cx="9144000" cy="6858000" type="screen4x3"/>
   <p:notesSz cx="6858000" cy="9144000"/>
@@ -295,7 +298,7 @@
           <a:p>
             <a:fld id="{C581432F-93D2-48D5-B81A-4141BD2990AC}" type="datetimeFigureOut">
               <a:rPr lang="de-DE" smtClean="0"/>
-              <a:t>04.07.2012</a:t>
+              <a:t>06.07.2012</a:t>
             </a:fld>
             <a:endParaRPr lang="de-DE"/>
           </a:p>
@@ -465,7 +468,7 @@
           <a:p>
             <a:fld id="{C581432F-93D2-48D5-B81A-4141BD2990AC}" type="datetimeFigureOut">
               <a:rPr lang="de-DE" smtClean="0"/>
-              <a:t>04.07.2012</a:t>
+              <a:t>06.07.2012</a:t>
             </a:fld>
             <a:endParaRPr lang="de-DE"/>
           </a:p>
@@ -645,7 +648,7 @@
           <a:p>
             <a:fld id="{C581432F-93D2-48D5-B81A-4141BD2990AC}" type="datetimeFigureOut">
               <a:rPr lang="de-DE" smtClean="0"/>
-              <a:t>04.07.2012</a:t>
+              <a:t>06.07.2012</a:t>
             </a:fld>
             <a:endParaRPr lang="de-DE"/>
           </a:p>
@@ -815,7 +818,7 @@
           <a:p>
             <a:fld id="{C581432F-93D2-48D5-B81A-4141BD2990AC}" type="datetimeFigureOut">
               <a:rPr lang="de-DE" smtClean="0"/>
-              <a:t>04.07.2012</a:t>
+              <a:t>06.07.2012</a:t>
             </a:fld>
             <a:endParaRPr lang="de-DE"/>
           </a:p>
@@ -1061,7 +1064,7 @@
           <a:p>
             <a:fld id="{C581432F-93D2-48D5-B81A-4141BD2990AC}" type="datetimeFigureOut">
               <a:rPr lang="de-DE" smtClean="0"/>
-              <a:t>04.07.2012</a:t>
+              <a:t>06.07.2012</a:t>
             </a:fld>
             <a:endParaRPr lang="de-DE"/>
           </a:p>
@@ -1349,7 +1352,7 @@
           <a:p>
             <a:fld id="{C581432F-93D2-48D5-B81A-4141BD2990AC}" type="datetimeFigureOut">
               <a:rPr lang="de-DE" smtClean="0"/>
-              <a:t>04.07.2012</a:t>
+              <a:t>06.07.2012</a:t>
             </a:fld>
             <a:endParaRPr lang="de-DE"/>
           </a:p>
@@ -1771,7 +1774,7 @@
           <a:p>
             <a:fld id="{C581432F-93D2-48D5-B81A-4141BD2990AC}" type="datetimeFigureOut">
               <a:rPr lang="de-DE" smtClean="0"/>
-              <a:t>04.07.2012</a:t>
+              <a:t>06.07.2012</a:t>
             </a:fld>
             <a:endParaRPr lang="de-DE"/>
           </a:p>
@@ -1889,7 +1892,7 @@
           <a:p>
             <a:fld id="{C581432F-93D2-48D5-B81A-4141BD2990AC}" type="datetimeFigureOut">
               <a:rPr lang="de-DE" smtClean="0"/>
-              <a:t>04.07.2012</a:t>
+              <a:t>06.07.2012</a:t>
             </a:fld>
             <a:endParaRPr lang="de-DE"/>
           </a:p>
@@ -1984,7 +1987,7 @@
           <a:p>
             <a:fld id="{C581432F-93D2-48D5-B81A-4141BD2990AC}" type="datetimeFigureOut">
               <a:rPr lang="de-DE" smtClean="0"/>
-              <a:t>04.07.2012</a:t>
+              <a:t>06.07.2012</a:t>
             </a:fld>
             <a:endParaRPr lang="de-DE"/>
           </a:p>
@@ -2261,7 +2264,7 @@
           <a:p>
             <a:fld id="{C581432F-93D2-48D5-B81A-4141BD2990AC}" type="datetimeFigureOut">
               <a:rPr lang="de-DE" smtClean="0"/>
-              <a:t>04.07.2012</a:t>
+              <a:t>06.07.2012</a:t>
             </a:fld>
             <a:endParaRPr lang="de-DE"/>
           </a:p>
@@ -2514,7 +2517,7 @@
           <a:p>
             <a:fld id="{C581432F-93D2-48D5-B81A-4141BD2990AC}" type="datetimeFigureOut">
               <a:rPr lang="de-DE" smtClean="0"/>
-              <a:t>04.07.2012</a:t>
+              <a:t>06.07.2012</a:t>
             </a:fld>
             <a:endParaRPr lang="de-DE"/>
           </a:p>
@@ -2736,7 +2739,7 @@
           <a:p>
             <a:fld id="{C581432F-93D2-48D5-B81A-4141BD2990AC}" type="datetimeFigureOut">
               <a:rPr lang="de-DE" smtClean="0"/>
-              <a:t>04.07.2012</a:t>
+              <a:t>06.07.2012</a:t>
             </a:fld>
             <a:endParaRPr lang="de-DE"/>
           </a:p>
@@ -3239,7 +3242,7 @@
                 <a:latin typeface="Courier New" pitchFamily="49" charset="0"/>
                 <a:cs typeface="Courier New" pitchFamily="49" charset="0"/>
               </a:rPr>
-              <a:t>Index</a:t>
+              <a:t>CONTENT</a:t>
             </a:r>
           </a:p>
           <a:p>
@@ -3263,7 +3266,7 @@
                 <a:latin typeface="Courier New" pitchFamily="49" charset="0"/>
                 <a:cs typeface="Courier New" pitchFamily="49" charset="0"/>
               </a:rPr>
-              <a:t>Story</a:t>
+              <a:t>STORY</a:t>
             </a:r>
           </a:p>
           <a:p>
@@ -3278,7 +3281,7 @@
                 <a:latin typeface="Courier New" pitchFamily="49" charset="0"/>
                 <a:cs typeface="Courier New" pitchFamily="49" charset="0"/>
               </a:rPr>
-              <a:t>Mission</a:t>
+              <a:t>MISSION</a:t>
             </a:r>
           </a:p>
           <a:p>
@@ -3293,7 +3296,7 @@
                 <a:latin typeface="Courier New" pitchFamily="49" charset="0"/>
                 <a:cs typeface="Courier New" pitchFamily="49" charset="0"/>
               </a:rPr>
-              <a:t>Rules</a:t>
+              <a:t>RULES</a:t>
             </a:r>
           </a:p>
           <a:p>
@@ -3308,22 +3311,7 @@
                 <a:latin typeface="Courier New" pitchFamily="49" charset="0"/>
                 <a:cs typeface="Courier New" pitchFamily="49" charset="0"/>
               </a:rPr>
-              <a:t>Enemies</a:t>
-            </a:r>
-          </a:p>
-          <a:p>
-            <a:pPr marL="457200" indent="-457200">
-              <a:buAutoNum type="arabicPeriod"/>
-            </a:pPr>
-            <a:r>
-              <a:rPr lang="de-DE" sz="2000" b="1" dirty="0" smtClean="0">
-                <a:solidFill>
-                  <a:srgbClr val="66FF33"/>
-                </a:solidFill>
-                <a:latin typeface="Courier New" pitchFamily="49" charset="0"/>
-                <a:cs typeface="Courier New" pitchFamily="49" charset="0"/>
-              </a:rPr>
-              <a:t>Obstacles</a:t>
+              <a:t>CONTROLS</a:t>
             </a:r>
             <a:endParaRPr lang="de-DE" sz="2000" b="1" dirty="0" smtClean="0">
               <a:solidFill>
@@ -3345,7 +3333,7 @@
                 <a:latin typeface="Courier New" pitchFamily="49" charset="0"/>
                 <a:cs typeface="Courier New" pitchFamily="49" charset="0"/>
               </a:rPr>
-              <a:t>Extras</a:t>
+              <a:t>ENEMIES</a:t>
             </a:r>
           </a:p>
           <a:p>
@@ -3360,7 +3348,7 @@
                 <a:latin typeface="Courier New" pitchFamily="49" charset="0"/>
                 <a:cs typeface="Courier New" pitchFamily="49" charset="0"/>
               </a:rPr>
-              <a:t>HUD</a:t>
+              <a:t>OBSTACLES</a:t>
             </a:r>
           </a:p>
           <a:p>
@@ -3375,7 +3363,7 @@
                 <a:latin typeface="Courier New" pitchFamily="49" charset="0"/>
                 <a:cs typeface="Courier New" pitchFamily="49" charset="0"/>
               </a:rPr>
-              <a:t>Typical scene</a:t>
+              <a:t>EXTRAS</a:t>
             </a:r>
           </a:p>
           <a:p>
@@ -3390,7 +3378,22 @@
                 <a:latin typeface="Courier New" pitchFamily="49" charset="0"/>
                 <a:cs typeface="Courier New" pitchFamily="49" charset="0"/>
               </a:rPr>
-              <a:t>Copyrights</a:t>
+              <a:t>IN GAME SCENE</a:t>
+            </a:r>
+          </a:p>
+          <a:p>
+            <a:pPr marL="457200" indent="-457200">
+              <a:buAutoNum type="arabicPeriod"/>
+            </a:pPr>
+            <a:r>
+              <a:rPr lang="de-DE" sz="2000" b="1" dirty="0" smtClean="0">
+                <a:solidFill>
+                  <a:srgbClr val="66FF33"/>
+                </a:solidFill>
+                <a:latin typeface="Courier New" pitchFamily="49" charset="0"/>
+                <a:cs typeface="Courier New" pitchFamily="49" charset="0"/>
+              </a:rPr>
+              <a:t>COPYRIGHTS</a:t>
             </a:r>
             <a:endParaRPr lang="de-DE" sz="2000" b="1" dirty="0" smtClean="0">
               <a:solidFill>
@@ -3422,7 +3425,7 @@
 </p:sld>
 </file>
 
-<file path=ppt/slides/slide2.xml><?xml version="1.0" encoding="utf-8"?>
+<file path=ppt/slides/slide10.xml><?xml version="1.0" encoding="utf-8"?>
 <p:sld xmlns:a="http://schemas.openxmlformats.org/drawingml/2006/main" xmlns:r="http://schemas.openxmlformats.org/officeDocument/2006/relationships" xmlns:p="http://schemas.openxmlformats.org/presentationml/2006/main">
   <p:cSld>
     <p:spTree>
@@ -3439,9 +3442,622 @@
           <a:chExt cx="0" cy="0"/>
         </a:xfrm>
       </p:grpSpPr>
-      <p:sp>
-        <p:nvSpPr>
-          <p:cNvPr id="9" name="Rounded Rectangle 8"/>
+      <p:pic>
+        <p:nvPicPr>
+          <p:cNvPr id="4" name="Picture 3"/>
+          <p:cNvPicPr>
+            <a:picLocks noChangeAspect="1"/>
+          </p:cNvPicPr>
+          <p:nvPr/>
+        </p:nvPicPr>
+        <p:blipFill>
+          <a:blip r:embed="rId2">
+            <a:extLst>
+              <a:ext uri="{28A0092B-C50C-407E-A947-70E740481C1C}">
+                <a14:useLocalDpi xmlns:a14="http://schemas.microsoft.com/office/drawing/2010/main" val="0"/>
+              </a:ext>
+            </a:extLst>
+          </a:blip>
+          <a:stretch>
+            <a:fillRect/>
+          </a:stretch>
+        </p:blipFill>
+        <p:spPr>
+          <a:xfrm>
+            <a:off x="0" y="10095"/>
+            <a:ext cx="9144000" cy="6837810"/>
+          </a:xfrm>
+          <a:prstGeom prst="rect">
+            <a:avLst/>
+          </a:prstGeom>
+        </p:spPr>
+      </p:pic>
+      <p:sp>
+        <p:nvSpPr>
+          <p:cNvPr id="2" name="Rectangular Callout 1"/>
+          <p:cNvSpPr/>
+          <p:nvPr/>
+        </p:nvSpPr>
+        <p:spPr>
+          <a:xfrm>
+            <a:off x="467544" y="692696"/>
+            <a:ext cx="3168352" cy="792088"/>
+          </a:xfrm>
+          <a:prstGeom prst="wedgeRectCallout">
+            <a:avLst>
+              <a:gd name="adj1" fmla="val -51244"/>
+              <a:gd name="adj2" fmla="val -89043"/>
+            </a:avLst>
+          </a:prstGeom>
+        </p:spPr>
+        <p:style>
+          <a:lnRef idx="1">
+            <a:schemeClr val="dk1"/>
+          </a:lnRef>
+          <a:fillRef idx="3">
+            <a:schemeClr val="dk1"/>
+          </a:fillRef>
+          <a:effectRef idx="2">
+            <a:schemeClr val="dk1"/>
+          </a:effectRef>
+          <a:fontRef idx="minor">
+            <a:schemeClr val="lt1"/>
+          </a:fontRef>
+        </p:style>
+        <p:txBody>
+          <a:bodyPr rtlCol="0" anchor="ctr"/>
+          <a:lstStyle/>
+          <a:p>
+            <a:pPr algn="ctr"/>
+            <a:r>
+              <a:rPr lang="de-DE" sz="1400" b="1" dirty="0" smtClean="0">
+                <a:latin typeface="Courier New" pitchFamily="49" charset="0"/>
+                <a:cs typeface="Courier New" pitchFamily="49" charset="0"/>
+              </a:rPr>
+              <a:t>GAME COUNTDOWN</a:t>
+            </a:r>
+          </a:p>
+          <a:p>
+            <a:r>
+              <a:rPr lang="de-DE" sz="1400" b="1" dirty="0" smtClean="0">
+                <a:latin typeface="Courier New" pitchFamily="49" charset="0"/>
+                <a:cs typeface="Courier New" pitchFamily="49" charset="0"/>
+              </a:rPr>
+              <a:t>YOU MUST REACH THE „MUST SCORE“ BEFORE THE TIME‘S UP</a:t>
+            </a:r>
+          </a:p>
+        </p:txBody>
+      </p:sp>
+      <p:sp>
+        <p:nvSpPr>
+          <p:cNvPr id="5" name="Rectangular Callout 4"/>
+          <p:cNvSpPr/>
+          <p:nvPr/>
+        </p:nvSpPr>
+        <p:spPr>
+          <a:xfrm>
+            <a:off x="5796136" y="1628800"/>
+            <a:ext cx="3168352" cy="648072"/>
+          </a:xfrm>
+          <a:prstGeom prst="wedgeRectCallout">
+            <a:avLst>
+              <a:gd name="adj1" fmla="val 37962"/>
+              <a:gd name="adj2" fmla="val -221550"/>
+            </a:avLst>
+          </a:prstGeom>
+        </p:spPr>
+        <p:style>
+          <a:lnRef idx="1">
+            <a:schemeClr val="dk1"/>
+          </a:lnRef>
+          <a:fillRef idx="3">
+            <a:schemeClr val="dk1"/>
+          </a:fillRef>
+          <a:effectRef idx="2">
+            <a:schemeClr val="dk1"/>
+          </a:effectRef>
+          <a:fontRef idx="minor">
+            <a:schemeClr val="lt1"/>
+          </a:fontRef>
+        </p:style>
+        <p:txBody>
+          <a:bodyPr rtlCol="0" anchor="ctr"/>
+          <a:lstStyle/>
+          <a:p>
+            <a:pPr algn="ctr"/>
+            <a:r>
+              <a:rPr lang="de-DE" sz="1400" b="1" dirty="0" smtClean="0">
+                <a:latin typeface="Courier New" pitchFamily="49" charset="0"/>
+                <a:cs typeface="Courier New" pitchFamily="49" charset="0"/>
+              </a:rPr>
+              <a:t>CURRENT SCORE/MUST SCORE</a:t>
+            </a:r>
+          </a:p>
+          <a:p>
+            <a:pPr algn="ctr"/>
+            <a:r>
+              <a:rPr lang="de-DE" sz="1400" b="1" dirty="0" smtClean="0">
+                <a:latin typeface="Courier New" pitchFamily="49" charset="0"/>
+                <a:cs typeface="Courier New" pitchFamily="49" charset="0"/>
+              </a:rPr>
+              <a:t>YOU HAVE TO REACH THIS SCORE</a:t>
+            </a:r>
+          </a:p>
+        </p:txBody>
+      </p:sp>
+      <p:sp>
+        <p:nvSpPr>
+          <p:cNvPr id="6" name="Rectangular Callout 5"/>
+          <p:cNvSpPr/>
+          <p:nvPr/>
+        </p:nvSpPr>
+        <p:spPr>
+          <a:xfrm>
+            <a:off x="5796136" y="5805264"/>
+            <a:ext cx="2736304" cy="504056"/>
+          </a:xfrm>
+          <a:prstGeom prst="wedgeRectCallout">
+            <a:avLst>
+              <a:gd name="adj1" fmla="val -64417"/>
+              <a:gd name="adj2" fmla="val -127754"/>
+            </a:avLst>
+          </a:prstGeom>
+        </p:spPr>
+        <p:style>
+          <a:lnRef idx="1">
+            <a:schemeClr val="accent5"/>
+          </a:lnRef>
+          <a:fillRef idx="3">
+            <a:schemeClr val="accent5"/>
+          </a:fillRef>
+          <a:effectRef idx="2">
+            <a:schemeClr val="accent5"/>
+          </a:effectRef>
+          <a:fontRef idx="minor">
+            <a:schemeClr val="lt1"/>
+          </a:fontRef>
+        </p:style>
+        <p:txBody>
+          <a:bodyPr rtlCol="0" anchor="ctr"/>
+          <a:lstStyle/>
+          <a:p>
+            <a:pPr algn="ctr"/>
+            <a:r>
+              <a:rPr lang="de-DE" sz="1400" b="1" dirty="0" smtClean="0">
+                <a:latin typeface="Courier New" pitchFamily="49" charset="0"/>
+                <a:cs typeface="Courier New" pitchFamily="49" charset="0"/>
+              </a:rPr>
+              <a:t>THAT IS YOU!</a:t>
+            </a:r>
+          </a:p>
+        </p:txBody>
+      </p:sp>
+      <p:sp>
+        <p:nvSpPr>
+          <p:cNvPr id="7" name="Rectangular Callout 6"/>
+          <p:cNvSpPr/>
+          <p:nvPr/>
+        </p:nvSpPr>
+        <p:spPr>
+          <a:xfrm>
+            <a:off x="251520" y="4221088"/>
+            <a:ext cx="2736304" cy="1080120"/>
+          </a:xfrm>
+          <a:prstGeom prst="wedgeRectCallout">
+            <a:avLst>
+              <a:gd name="adj1" fmla="val 37710"/>
+              <a:gd name="adj2" fmla="val 113332"/>
+            </a:avLst>
+          </a:prstGeom>
+        </p:spPr>
+        <p:style>
+          <a:lnRef idx="1">
+            <a:schemeClr val="accent4"/>
+          </a:lnRef>
+          <a:fillRef idx="3">
+            <a:schemeClr val="accent4"/>
+          </a:fillRef>
+          <a:effectRef idx="2">
+            <a:schemeClr val="accent4"/>
+          </a:effectRef>
+          <a:fontRef idx="minor">
+            <a:schemeClr val="lt1"/>
+          </a:fontRef>
+        </p:style>
+        <p:txBody>
+          <a:bodyPr rtlCol="0" anchor="ctr"/>
+          <a:lstStyle/>
+          <a:p>
+            <a:pPr algn="ctr"/>
+            <a:r>
+              <a:rPr lang="de-DE" sz="1400" b="1" dirty="0" smtClean="0">
+                <a:latin typeface="Courier New" pitchFamily="49" charset="0"/>
+                <a:cs typeface="Courier New" pitchFamily="49" charset="0"/>
+              </a:rPr>
+              <a:t>BOTTOM BAR</a:t>
+            </a:r>
+          </a:p>
+          <a:p>
+            <a:r>
+              <a:rPr lang="de-DE" sz="1400" b="1" dirty="0" smtClean="0">
+                <a:latin typeface="Courier New" pitchFamily="49" charset="0"/>
+                <a:cs typeface="Courier New" pitchFamily="49" charset="0"/>
+              </a:rPr>
+              <a:t>YOURHEALTH</a:t>
+            </a:r>
+          </a:p>
+          <a:p>
+            <a:r>
+              <a:rPr lang="de-DE" sz="1400" b="1" dirty="0" smtClean="0">
+                <a:latin typeface="Courier New" pitchFamily="49" charset="0"/>
+                <a:cs typeface="Courier New" pitchFamily="49" charset="0"/>
+              </a:rPr>
+              <a:t>CAUGHT POWER RINGS</a:t>
+            </a:r>
+          </a:p>
+          <a:p>
+            <a:r>
+              <a:rPr lang="de-DE" sz="1400" b="1" dirty="0" smtClean="0">
+                <a:latin typeface="Courier New" pitchFamily="49" charset="0"/>
+                <a:cs typeface="Courier New" pitchFamily="49" charset="0"/>
+              </a:rPr>
+              <a:t>YOUR LIVES</a:t>
+            </a:r>
+          </a:p>
+        </p:txBody>
+      </p:sp>
+      <p:sp>
+        <p:nvSpPr>
+          <p:cNvPr id="8" name="Rectangular Callout 7"/>
+          <p:cNvSpPr/>
+          <p:nvPr/>
+        </p:nvSpPr>
+        <p:spPr>
+          <a:xfrm>
+            <a:off x="179512" y="3356992"/>
+            <a:ext cx="2736304" cy="504056"/>
+          </a:xfrm>
+          <a:prstGeom prst="wedgeRectCallout">
+            <a:avLst>
+              <a:gd name="adj1" fmla="val 78622"/>
+              <a:gd name="adj2" fmla="val 36700"/>
+            </a:avLst>
+          </a:prstGeom>
+          <a:solidFill>
+            <a:srgbClr val="663300"/>
+          </a:solidFill>
+          <a:ln>
+            <a:solidFill>
+              <a:srgbClr val="663300"/>
+            </a:solidFill>
+          </a:ln>
+        </p:spPr>
+        <p:style>
+          <a:lnRef idx="1">
+            <a:schemeClr val="accent6"/>
+          </a:lnRef>
+          <a:fillRef idx="3">
+            <a:schemeClr val="accent6"/>
+          </a:fillRef>
+          <a:effectRef idx="2">
+            <a:schemeClr val="accent6"/>
+          </a:effectRef>
+          <a:fontRef idx="minor">
+            <a:schemeClr val="lt1"/>
+          </a:fontRef>
+        </p:style>
+        <p:txBody>
+          <a:bodyPr rtlCol="0" anchor="ctr"/>
+          <a:lstStyle/>
+          <a:p>
+            <a:pPr algn="ctr"/>
+            <a:r>
+              <a:rPr lang="de-DE" sz="1400" b="1" dirty="0" smtClean="0">
+                <a:latin typeface="Courier New" pitchFamily="49" charset="0"/>
+                <a:cs typeface="Courier New" pitchFamily="49" charset="0"/>
+              </a:rPr>
+              <a:t>100 POWER RINGS = 1 LIVE</a:t>
+            </a:r>
+          </a:p>
+        </p:txBody>
+      </p:sp>
+      <p:sp>
+        <p:nvSpPr>
+          <p:cNvPr id="9" name="Rectangular Callout 8"/>
+          <p:cNvSpPr/>
+          <p:nvPr/>
+        </p:nvSpPr>
+        <p:spPr>
+          <a:xfrm>
+            <a:off x="7185263" y="4257092"/>
+            <a:ext cx="1760725" cy="504056"/>
+          </a:xfrm>
+          <a:prstGeom prst="wedgeRectCallout">
+            <a:avLst>
+              <a:gd name="adj1" fmla="val -49400"/>
+              <a:gd name="adj2" fmla="val 94344"/>
+            </a:avLst>
+          </a:prstGeom>
+        </p:spPr>
+        <p:style>
+          <a:lnRef idx="1">
+            <a:schemeClr val="accent2"/>
+          </a:lnRef>
+          <a:fillRef idx="3">
+            <a:schemeClr val="accent2"/>
+          </a:fillRef>
+          <a:effectRef idx="2">
+            <a:schemeClr val="accent2"/>
+          </a:effectRef>
+          <a:fontRef idx="minor">
+            <a:schemeClr val="lt1"/>
+          </a:fontRef>
+        </p:style>
+        <p:txBody>
+          <a:bodyPr rtlCol="0" anchor="ctr"/>
+          <a:lstStyle/>
+          <a:p>
+            <a:pPr algn="ctr"/>
+            <a:r>
+              <a:rPr lang="de-DE" sz="1400" b="1" dirty="0" smtClean="0">
+                <a:latin typeface="Courier New" pitchFamily="49" charset="0"/>
+                <a:cs typeface="Courier New" pitchFamily="49" charset="0"/>
+              </a:rPr>
+              <a:t>GIVES YOU HEALTH</a:t>
+            </a:r>
+          </a:p>
+        </p:txBody>
+      </p:sp>
+      <p:sp>
+        <p:nvSpPr>
+          <p:cNvPr id="10" name="Rectangular Callout 9"/>
+          <p:cNvSpPr/>
+          <p:nvPr/>
+        </p:nvSpPr>
+        <p:spPr>
+          <a:xfrm>
+            <a:off x="1873325" y="2024844"/>
+            <a:ext cx="1760725" cy="504056"/>
+          </a:xfrm>
+          <a:prstGeom prst="wedgeRectCallout">
+            <a:avLst>
+              <a:gd name="adj1" fmla="val -66873"/>
+              <a:gd name="adj2" fmla="val -7380"/>
+            </a:avLst>
+          </a:prstGeom>
+        </p:spPr>
+        <p:style>
+          <a:lnRef idx="1">
+            <a:schemeClr val="accent1"/>
+          </a:lnRef>
+          <a:fillRef idx="3">
+            <a:schemeClr val="accent1"/>
+          </a:fillRef>
+          <a:effectRef idx="2">
+            <a:schemeClr val="accent1"/>
+          </a:effectRef>
+          <a:fontRef idx="minor">
+            <a:schemeClr val="lt1"/>
+          </a:fontRef>
+        </p:style>
+        <p:txBody>
+          <a:bodyPr rtlCol="0" anchor="ctr"/>
+          <a:lstStyle/>
+          <a:p>
+            <a:pPr algn="ctr"/>
+            <a:r>
+              <a:rPr lang="de-DE" sz="1400" b="1" dirty="0" smtClean="0">
+                <a:latin typeface="Courier New" pitchFamily="49" charset="0"/>
+                <a:cs typeface="Courier New" pitchFamily="49" charset="0"/>
+              </a:rPr>
+              <a:t>WARP CORE SPEEDS YOU UP</a:t>
+            </a:r>
+          </a:p>
+        </p:txBody>
+      </p:sp>
+      <p:sp>
+        <p:nvSpPr>
+          <p:cNvPr id="11" name="Rectangular Callout 10"/>
+          <p:cNvSpPr/>
+          <p:nvPr/>
+        </p:nvSpPr>
+        <p:spPr>
+          <a:xfrm>
+            <a:off x="4788024" y="476672"/>
+            <a:ext cx="1240403" cy="432048"/>
+          </a:xfrm>
+          <a:prstGeom prst="wedgeRectCallout">
+            <a:avLst>
+              <a:gd name="adj1" fmla="val -85268"/>
+              <a:gd name="adj2" fmla="val 63827"/>
+            </a:avLst>
+          </a:prstGeom>
+        </p:spPr>
+        <p:style>
+          <a:lnRef idx="1">
+            <a:schemeClr val="accent4"/>
+          </a:lnRef>
+          <a:fillRef idx="3">
+            <a:schemeClr val="accent4"/>
+          </a:fillRef>
+          <a:effectRef idx="2">
+            <a:schemeClr val="accent4"/>
+          </a:effectRef>
+          <a:fontRef idx="minor">
+            <a:schemeClr val="lt1"/>
+          </a:fontRef>
+        </p:style>
+        <p:txBody>
+          <a:bodyPr rtlCol="0" anchor="ctr"/>
+          <a:lstStyle/>
+          <a:p>
+            <a:pPr algn="ctr"/>
+            <a:r>
+              <a:rPr lang="de-DE" sz="1400" b="1" dirty="0" smtClean="0">
+                <a:latin typeface="Courier New" pitchFamily="49" charset="0"/>
+                <a:cs typeface="Courier New" pitchFamily="49" charset="0"/>
+              </a:rPr>
+              <a:t>ENEMY</a:t>
+            </a:r>
+          </a:p>
+        </p:txBody>
+      </p:sp>
+      <p:sp>
+        <p:nvSpPr>
+          <p:cNvPr id="12" name="Rectangular Callout 11"/>
+          <p:cNvSpPr/>
+          <p:nvPr/>
+        </p:nvSpPr>
+        <p:spPr>
+          <a:xfrm>
+            <a:off x="6084168" y="2924944"/>
+            <a:ext cx="2952328" cy="936104"/>
+          </a:xfrm>
+          <a:prstGeom prst="wedgeRectCallout">
+            <a:avLst>
+              <a:gd name="adj1" fmla="val -62403"/>
+              <a:gd name="adj2" fmla="val -24781"/>
+            </a:avLst>
+          </a:prstGeom>
+        </p:spPr>
+        <p:style>
+          <a:lnRef idx="1">
+            <a:schemeClr val="accent3"/>
+          </a:lnRef>
+          <a:fillRef idx="3">
+            <a:schemeClr val="accent3"/>
+          </a:fillRef>
+          <a:effectRef idx="2">
+            <a:schemeClr val="accent3"/>
+          </a:effectRef>
+          <a:fontRef idx="minor">
+            <a:schemeClr val="lt1"/>
+          </a:fontRef>
+        </p:style>
+        <p:txBody>
+          <a:bodyPr rtlCol="0" anchor="ctr"/>
+          <a:lstStyle/>
+          <a:p>
+            <a:r>
+              <a:rPr lang="de-DE" sz="1400" b="1" dirty="0" smtClean="0">
+                <a:latin typeface="Courier New" pitchFamily="49" charset="0"/>
+                <a:cs typeface="Courier New" pitchFamily="49" charset="0"/>
+              </a:rPr>
+              <a:t>DON‘T COLLIDE WITH PLANETS! MAKE LOT OF DAMAGE BUT ALSO GIVE MANY POINTS!</a:t>
+            </a:r>
+          </a:p>
+        </p:txBody>
+      </p:sp>
+    </p:spTree>
+    <p:extLst>
+      <p:ext uri="{BB962C8B-B14F-4D97-AF65-F5344CB8AC3E}">
+        <p14:creationId xmlns:p14="http://schemas.microsoft.com/office/powerpoint/2010/main" val="3562478406"/>
+      </p:ext>
+    </p:extLst>
+  </p:cSld>
+  <p:clrMapOvr>
+    <a:masterClrMapping/>
+  </p:clrMapOvr>
+</p:sld>
+</file>
+
+<file path=ppt/slides/slide11.xml><?xml version="1.0" encoding="utf-8"?>
+<p:sld xmlns:a="http://schemas.openxmlformats.org/drawingml/2006/main" xmlns:r="http://schemas.openxmlformats.org/officeDocument/2006/relationships" xmlns:p="http://schemas.openxmlformats.org/presentationml/2006/main">
+  <p:cSld>
+    <p:spTree>
+      <p:nvGrpSpPr>
+        <p:cNvPr id="1" name=""/>
+        <p:cNvGrpSpPr/>
+        <p:nvPr/>
+      </p:nvGrpSpPr>
+      <p:grpSpPr>
+        <a:xfrm>
+          <a:off x="0" y="0"/>
+          <a:ext cx="0" cy="0"/>
+          <a:chOff x="0" y="0"/>
+          <a:chExt cx="0" cy="0"/>
+        </a:xfrm>
+      </p:grpSpPr>
+      <p:sp>
+        <p:nvSpPr>
+          <p:cNvPr id="11" name="Title 1"/>
+          <p:cNvSpPr txBox="1">
+            <a:spLocks/>
+          </p:cNvSpPr>
+          <p:nvPr/>
+        </p:nvSpPr>
+        <p:spPr>
+          <a:xfrm>
+            <a:off x="251520" y="260648"/>
+            <a:ext cx="8568952" cy="778098"/>
+          </a:xfrm>
+          <a:prstGeom prst="rect">
+            <a:avLst/>
+          </a:prstGeom>
+        </p:spPr>
+        <p:txBody>
+          <a:bodyPr vert="horz" lIns="91440" tIns="45720" rIns="91440" bIns="45720" rtlCol="0" anchor="ctr">
+            <a:noAutofit/>
+          </a:bodyPr>
+          <a:lstStyle>
+            <a:lvl1pPr algn="ctr" defTabSz="914400" rtl="0" eaLnBrk="1" latinLnBrk="0" hangingPunct="1">
+              <a:spcBef>
+                <a:spcPct val="0"/>
+              </a:spcBef>
+              <a:buNone/>
+              <a:defRPr sz="4400" kern="1200">
+                <a:solidFill>
+                  <a:schemeClr val="tx1"/>
+                </a:solidFill>
+                <a:latin typeface="+mj-lt"/>
+                <a:ea typeface="+mj-ea"/>
+                <a:cs typeface="+mj-cs"/>
+              </a:defRPr>
+            </a:lvl1pPr>
+          </a:lstStyle>
+          <a:p>
+            <a:r>
+              <a:rPr lang="de-DE" sz="4800" b="1" dirty="0" smtClean="0">
+                <a:ln w="38100">
+                  <a:solidFill>
+                    <a:schemeClr val="tx1"/>
+                  </a:solidFill>
+                  <a:prstDash val="solid"/>
+                </a:ln>
+                <a:solidFill>
+                  <a:srgbClr val="66FF33"/>
+                </a:solidFill>
+                <a:effectLst>
+                  <a:glow rad="63500">
+                    <a:srgbClr val="FFFF00">
+                      <a:alpha val="40000"/>
+                    </a:srgbClr>
+                  </a:glow>
+                  <a:outerShdw blurRad="50000" dist="50800" dir="7500000" algn="tl">
+                    <a:srgbClr val="000000">
+                      <a:shade val="5000"/>
+                      <a:alpha val="35000"/>
+                    </a:srgbClr>
+                  </a:outerShdw>
+                </a:effectLst>
+                <a:latin typeface="Courier New" pitchFamily="49" charset="0"/>
+                <a:cs typeface="Courier New" pitchFamily="49" charset="0"/>
+              </a:rPr>
+              <a:t>copyrights</a:t>
+            </a:r>
+            <a:endParaRPr lang="de-DE" sz="4800" b="1" dirty="0">
+              <a:solidFill>
+                <a:srgbClr val="66FF33"/>
+              </a:solidFill>
+              <a:latin typeface="Courier New" pitchFamily="49" charset="0"/>
+              <a:cs typeface="Courier New" pitchFamily="49" charset="0"/>
+            </a:endParaRPr>
+          </a:p>
+        </p:txBody>
+      </p:sp>
+      <p:sp>
+        <p:nvSpPr>
+          <p:cNvPr id="10" name="Rounded Rectangle 9"/>
           <p:cNvSpPr/>
           <p:nvPr/>
         </p:nvSpPr>
@@ -3499,43 +4115,7 @@
           <a:bodyPr lIns="360000" tIns="72000" rIns="360000" bIns="72000" rtlCol="0" anchor="ctr"/>
           <a:lstStyle/>
           <a:p>
-            <a:r>
-              <a:rPr lang="de-DE" b="1" dirty="0" smtClean="0">
-                <a:solidFill>
-                  <a:srgbClr val="66FF33"/>
-                </a:solidFill>
-                <a:latin typeface="Courier New" pitchFamily="49" charset="0"/>
-                <a:cs typeface="Courier New" pitchFamily="49" charset="0"/>
-              </a:rPr>
-              <a:t>It‘s the year 3141*10^42 and the earth is facing a galactic war with many races who</a:t>
-            </a:r>
-          </a:p>
-          <a:p>
-            <a:r>
-              <a:rPr lang="de-DE" b="1" dirty="0" smtClean="0">
-                <a:solidFill>
-                  <a:srgbClr val="66FF33"/>
-                </a:solidFill>
-                <a:latin typeface="Courier New" pitchFamily="49" charset="0"/>
-                <a:cs typeface="Courier New" pitchFamily="49" charset="0"/>
-              </a:rPr>
-              <a:t>are trying to conquer all resouces within</a:t>
-            </a:r>
-          </a:p>
-          <a:p>
-            <a:r>
-              <a:rPr lang="de-DE" b="1" dirty="0" smtClean="0">
-                <a:solidFill>
-                  <a:srgbClr val="66FF33"/>
-                </a:solidFill>
-                <a:latin typeface="Courier New" pitchFamily="49" charset="0"/>
-                <a:cs typeface="Courier New" pitchFamily="49" charset="0"/>
-              </a:rPr>
-              <a:t>the milky way.</a:t>
-            </a:r>
-          </a:p>
-          <a:p>
-            <a:endParaRPr lang="de-DE" b="1" dirty="0" smtClean="0">
+            <a:endParaRPr lang="de-DE" sz="1400" b="1" dirty="0" smtClean="0">
               <a:solidFill>
                 <a:srgbClr val="66FF33"/>
               </a:solidFill>
@@ -3544,19 +4124,7 @@
             </a:endParaRPr>
           </a:p>
           <a:p>
-            <a:r>
-              <a:rPr lang="de-DE" b="1" dirty="0" smtClean="0">
-                <a:solidFill>
-                  <a:srgbClr val="66FF33"/>
-                </a:solidFill>
-                <a:latin typeface="Courier New" pitchFamily="49" charset="0"/>
-                <a:cs typeface="Courier New" pitchFamily="49" charset="0"/>
-              </a:rPr>
-              <a:t>You have been sent on a collision course to support the galactic defense forces and to stop as many enemies as you can before they reach the solar system.</a:t>
-            </a:r>
-          </a:p>
-          <a:p>
-            <a:endParaRPr lang="de-DE" b="1" dirty="0" smtClean="0">
+            <a:endParaRPr lang="de-DE" sz="1400" b="1" dirty="0" smtClean="0">
               <a:solidFill>
                 <a:srgbClr val="66FF33"/>
               </a:solidFill>
@@ -3565,19 +4133,7 @@
             </a:endParaRPr>
           </a:p>
           <a:p>
-            <a:r>
-              <a:rPr lang="de-DE" b="1" dirty="0" smtClean="0">
-                <a:solidFill>
-                  <a:srgbClr val="66FF33"/>
-                </a:solidFill>
-                <a:latin typeface="Courier New" pitchFamily="49" charset="0"/>
-                <a:cs typeface="Courier New" pitchFamily="49" charset="0"/>
-              </a:rPr>
-              <a:t>If you fail to stop the enemies the galactic defence network will collapse and the earth can‘t stand the aliens fire and will be exploited and destroyed...</a:t>
-            </a:r>
-          </a:p>
-          <a:p>
-            <a:endParaRPr lang="de-DE" b="1" dirty="0" smtClean="0">
+            <a:endParaRPr lang="de-DE" sz="1400" b="1" dirty="0" smtClean="0">
               <a:solidFill>
                 <a:srgbClr val="66FF33"/>
               </a:solidFill>
@@ -3587,23 +4143,41 @@
           </a:p>
           <a:p>
             <a:r>
-              <a:rPr lang="de-DE" b="1" dirty="0" smtClean="0">
-                <a:solidFill>
-                  <a:srgbClr val="66FF33"/>
-                </a:solidFill>
-                <a:latin typeface="Courier New" pitchFamily="49" charset="0"/>
-                <a:cs typeface="Courier New" pitchFamily="49" charset="0"/>
-              </a:rPr>
-              <a:t>May the force be with &lt;sorry copyrighted&gt;!</a:t>
-            </a:r>
-            <a:endParaRPr lang="de-DE" dirty="0" smtClean="0">
-              <a:solidFill>
-                <a:srgbClr val="66FF33"/>
-              </a:solidFill>
-            </a:endParaRPr>
-          </a:p>
-          <a:p>
-            <a:endParaRPr lang="de-DE" b="1" dirty="0">
+              <a:rPr lang="de-DE" sz="1400" b="1" dirty="0" smtClean="0">
+                <a:solidFill>
+                  <a:srgbClr val="66FF33"/>
+                </a:solidFill>
+                <a:latin typeface="Courier New" pitchFamily="49" charset="0"/>
+                <a:cs typeface="Courier New" pitchFamily="49" charset="0"/>
+              </a:rPr>
+              <a:t>GAME BY SAMAN SEDIGHI RAD, VISIT: </a:t>
+            </a:r>
+            <a:r>
+              <a:rPr lang="de-DE" sz="1400" b="1" dirty="0" smtClean="0">
+                <a:solidFill>
+                  <a:schemeClr val="accent6">
+                    <a:lumMod val="75000"/>
+                  </a:schemeClr>
+                </a:solidFill>
+                <a:latin typeface="Courier New" pitchFamily="49" charset="0"/>
+                <a:cs typeface="Courier New" pitchFamily="49" charset="0"/>
+                <a:hlinkClick r:id="rId2"/>
+              </a:rPr>
+              <a:t>HTTP://SSRAD.ORG/SPACEBIT</a:t>
+            </a:r>
+            <a:r>
+              <a:rPr lang="de-DE" sz="1400" b="1" dirty="0" smtClean="0">
+                <a:solidFill>
+                  <a:srgbClr val="66FF33"/>
+                </a:solidFill>
+                <a:latin typeface="Courier New" pitchFamily="49" charset="0"/>
+                <a:cs typeface="Courier New" pitchFamily="49" charset="0"/>
+              </a:rPr>
+              <a:t> FOR ANY FUTURE DEVELOPMENT</a:t>
+            </a:r>
+          </a:p>
+          <a:p>
+            <a:endParaRPr lang="de-DE" sz="1400" b="1" dirty="0" smtClean="0">
               <a:solidFill>
                 <a:srgbClr val="66FF33"/>
               </a:solidFill>
@@ -3611,60 +4185,20 @@
               <a:cs typeface="Courier New" pitchFamily="49" charset="0"/>
             </a:endParaRPr>
           </a:p>
-        </p:txBody>
-      </p:sp>
-      <p:sp>
-        <p:nvSpPr>
-          <p:cNvPr id="11" name="Title 1"/>
-          <p:cNvSpPr>
-            <a:spLocks noGrp="1"/>
-          </p:cNvSpPr>
-          <p:nvPr>
-            <p:ph type="title"/>
-          </p:nvPr>
-        </p:nvSpPr>
-        <p:spPr>
-          <a:xfrm>
-            <a:off x="251520" y="260648"/>
-            <a:ext cx="8568952" cy="778098"/>
-          </a:xfrm>
-        </p:spPr>
-        <p:txBody>
-          <a:bodyPr>
-            <a:noAutofit/>
-          </a:bodyPr>
-          <a:lstStyle/>
-          <a:p>
-            <a:r>
-              <a:rPr lang="de-DE" sz="4800" b="1" dirty="0" smtClean="0">
-                <a:ln w="38100">
-                  <a:solidFill>
-                    <a:schemeClr val="tx1"/>
-                  </a:solidFill>
-                  <a:prstDash val="solid"/>
-                </a:ln>
-                <a:solidFill>
-                  <a:srgbClr val="66FF33"/>
-                </a:solidFill>
-                <a:effectLst>
-                  <a:glow rad="63500">
-                    <a:srgbClr val="FFFF00">
-                      <a:alpha val="40000"/>
-                    </a:srgbClr>
-                  </a:glow>
-                  <a:outerShdw blurRad="50000" dist="50800" dir="7500000" algn="tl">
-                    <a:srgbClr val="000000">
-                      <a:shade val="5000"/>
-                      <a:alpha val="35000"/>
-                    </a:srgbClr>
-                  </a:outerShdw>
-                </a:effectLst>
-                <a:latin typeface="Courier New" pitchFamily="49" charset="0"/>
-                <a:cs typeface="Courier New" pitchFamily="49" charset="0"/>
-              </a:rPr>
-              <a:t>story</a:t>
-            </a:r>
-            <a:endParaRPr lang="de-DE" sz="4800" b="1" dirty="0">
+          <a:p>
+            <a:r>
+              <a:rPr lang="de-DE" sz="1400" b="1" dirty="0" smtClean="0">
+                <a:solidFill>
+                  <a:srgbClr val="66FF33"/>
+                </a:solidFill>
+                <a:latin typeface="Courier New" pitchFamily="49" charset="0"/>
+                <a:cs typeface="Courier New" pitchFamily="49" charset="0"/>
+              </a:rPr>
+              <a:t>ROCKET DESIGN EXCLUSIVELY PROVIDED BY ALEXANDER ANSARI</a:t>
+            </a:r>
+          </a:p>
+          <a:p>
+            <a:endParaRPr lang="de-DE" sz="1400" b="1" dirty="0" smtClean="0">
               <a:solidFill>
                 <a:srgbClr val="66FF33"/>
               </a:solidFill>
@@ -3672,12 +4206,299 @@
               <a:cs typeface="Courier New" pitchFamily="49" charset="0"/>
             </a:endParaRPr>
           </a:p>
+          <a:p>
+            <a:r>
+              <a:rPr lang="de-DE" sz="1400" b="1" dirty="0" smtClean="0">
+                <a:solidFill>
+                  <a:srgbClr val="66FF33"/>
+                </a:solidFill>
+                <a:latin typeface="Courier New" pitchFamily="49" charset="0"/>
+                <a:cs typeface="Courier New" pitchFamily="49" charset="0"/>
+              </a:rPr>
+              <a:t>MUSIC </a:t>
+            </a:r>
+            <a:r>
+              <a:rPr lang="en-US" sz="1400" b="1" dirty="0" smtClean="0">
+                <a:solidFill>
+                  <a:srgbClr val="66FF33"/>
+                </a:solidFill>
+                <a:latin typeface="Courier New" pitchFamily="49" charset="0"/>
+                <a:cs typeface="Courier New" pitchFamily="49" charset="0"/>
+              </a:rPr>
+              <a:t>RELEASED BY 8BITPEOPLES UNDER CREATIVE COMMONS: </a:t>
+            </a:r>
+            <a:r>
+              <a:rPr lang="en-US" sz="1400" b="1" dirty="0" smtClean="0">
+                <a:solidFill>
+                  <a:srgbClr val="66FF33"/>
+                </a:solidFill>
+                <a:latin typeface="Courier New" pitchFamily="49" charset="0"/>
+                <a:cs typeface="Courier New" pitchFamily="49" charset="0"/>
+                <a:hlinkClick r:id="rId3"/>
+              </a:rPr>
+              <a:t>HTTP://8BITPEOPLES.COM</a:t>
+            </a:r>
+            <a:endParaRPr lang="en-US" sz="1400" b="1" dirty="0" smtClean="0">
+              <a:solidFill>
+                <a:srgbClr val="66FF33"/>
+              </a:solidFill>
+              <a:latin typeface="Courier New" pitchFamily="49" charset="0"/>
+              <a:cs typeface="Courier New" pitchFamily="49" charset="0"/>
+            </a:endParaRPr>
+          </a:p>
+          <a:p>
+            <a:endParaRPr lang="en-US" sz="1400" b="1" dirty="0" smtClean="0">
+              <a:solidFill>
+                <a:srgbClr val="66FF33"/>
+              </a:solidFill>
+              <a:latin typeface="Courier New" pitchFamily="49" charset="0"/>
+              <a:cs typeface="Courier New" pitchFamily="49" charset="0"/>
+            </a:endParaRPr>
+          </a:p>
+          <a:p>
+            <a:r>
+              <a:rPr lang="en-US" sz="1400" b="1" dirty="0" smtClean="0">
+                <a:solidFill>
+                  <a:srgbClr val="66FF33"/>
+                </a:solidFill>
+                <a:latin typeface="Courier New" pitchFamily="49" charset="0"/>
+                <a:cs typeface="Courier New" pitchFamily="49" charset="0"/>
+              </a:rPr>
+              <a:t>APE MODEL: BUILD IN BLENDER. MODEL UNDER BSD LICENSE. </a:t>
+            </a:r>
+            <a:r>
+              <a:rPr lang="en-US" sz="1400" b="1" dirty="0" smtClean="0">
+                <a:solidFill>
+                  <a:srgbClr val="66FF33"/>
+                </a:solidFill>
+                <a:latin typeface="Courier New" pitchFamily="49" charset="0"/>
+                <a:cs typeface="Courier New" pitchFamily="49" charset="0"/>
+                <a:hlinkClick r:id="rId4"/>
+              </a:rPr>
+              <a:t>HTTP://BLENDER.ORG</a:t>
+            </a:r>
+            <a:endParaRPr lang="en-US" sz="1400" b="1" dirty="0" smtClean="0">
+              <a:solidFill>
+                <a:srgbClr val="66FF33"/>
+              </a:solidFill>
+              <a:latin typeface="Courier New" pitchFamily="49" charset="0"/>
+              <a:cs typeface="Courier New" pitchFamily="49" charset="0"/>
+            </a:endParaRPr>
+          </a:p>
+          <a:p>
+            <a:endParaRPr lang="en-US" sz="1400" b="1" dirty="0" smtClean="0">
+              <a:solidFill>
+                <a:srgbClr val="66FF33"/>
+              </a:solidFill>
+              <a:latin typeface="Courier New" pitchFamily="49" charset="0"/>
+              <a:cs typeface="Courier New" pitchFamily="49" charset="0"/>
+            </a:endParaRPr>
+          </a:p>
+          <a:p>
+            <a:r>
+              <a:rPr lang="en-US" sz="1400" b="1" dirty="0" smtClean="0">
+                <a:solidFill>
+                  <a:srgbClr val="66FF33"/>
+                </a:solidFill>
+                <a:latin typeface="Courier New" pitchFamily="49" charset="0"/>
+                <a:cs typeface="Courier New" pitchFamily="49" charset="0"/>
+              </a:rPr>
+              <a:t>ALL OTHER MODELS CREATED AND COPYRIGHT BY</a:t>
+            </a:r>
+          </a:p>
+          <a:p>
+            <a:r>
+              <a:rPr lang="en-US" sz="1400" b="1" dirty="0" smtClean="0">
+                <a:solidFill>
+                  <a:srgbClr val="66FF33"/>
+                </a:solidFill>
+                <a:latin typeface="Courier New" pitchFamily="49" charset="0"/>
+                <a:cs typeface="Courier New" pitchFamily="49" charset="0"/>
+              </a:rPr>
+              <a:t>SAMAN SEDIGHI RAD</a:t>
+            </a:r>
+          </a:p>
+          <a:p>
+            <a:endParaRPr lang="en-US" sz="1400" b="1" dirty="0" smtClean="0">
+              <a:solidFill>
+                <a:srgbClr val="66FF33"/>
+              </a:solidFill>
+              <a:latin typeface="Courier New" pitchFamily="49" charset="0"/>
+              <a:cs typeface="Courier New" pitchFamily="49" charset="0"/>
+            </a:endParaRPr>
+          </a:p>
+          <a:p>
+            <a:r>
+              <a:rPr lang="en-US" sz="1400" b="1" dirty="0" smtClean="0">
+                <a:solidFill>
+                  <a:srgbClr val="66FF33"/>
+                </a:solidFill>
+                <a:latin typeface="Courier New" pitchFamily="49" charset="0"/>
+                <a:cs typeface="Courier New" pitchFamily="49" charset="0"/>
+              </a:rPr>
+              <a:t>GAME ENGINE PROVIDED BY JMONKEYENGINE (V3), UNDER BSD LICENSE: </a:t>
+            </a:r>
+            <a:r>
+              <a:rPr lang="en-US" sz="1400" b="1" dirty="0" smtClean="0">
+                <a:solidFill>
+                  <a:srgbClr val="66FF33"/>
+                </a:solidFill>
+                <a:latin typeface="Courier New" pitchFamily="49" charset="0"/>
+                <a:cs typeface="Courier New" pitchFamily="49" charset="0"/>
+                <a:hlinkClick r:id="rId5"/>
+              </a:rPr>
+              <a:t>HTTP://JMONKEYENGINE.ORG</a:t>
+            </a:r>
+            <a:endParaRPr lang="en-US" sz="1400" b="1" dirty="0" smtClean="0">
+              <a:solidFill>
+                <a:srgbClr val="66FF33"/>
+              </a:solidFill>
+              <a:latin typeface="Courier New" pitchFamily="49" charset="0"/>
+              <a:cs typeface="Courier New" pitchFamily="49" charset="0"/>
+            </a:endParaRPr>
+          </a:p>
+          <a:p>
+            <a:endParaRPr lang="en-US" sz="1400" b="1" dirty="0" smtClean="0">
+              <a:solidFill>
+                <a:srgbClr val="66FF33"/>
+              </a:solidFill>
+              <a:latin typeface="Courier New" pitchFamily="49" charset="0"/>
+              <a:cs typeface="Courier New" pitchFamily="49" charset="0"/>
+            </a:endParaRPr>
+          </a:p>
+          <a:p>
+            <a:r>
+              <a:rPr lang="en-US" sz="1400" b="1" dirty="0" smtClean="0">
+                <a:solidFill>
+                  <a:srgbClr val="66FF33"/>
+                </a:solidFill>
+                <a:latin typeface="Courier New" pitchFamily="49" charset="0"/>
+                <a:cs typeface="Courier New" pitchFamily="49" charset="0"/>
+              </a:rPr>
+              <a:t>SOUNDS CREATE WITH FAMITRACKER</a:t>
+            </a:r>
+            <a:r>
+              <a:rPr lang="en-US" sz="1400" b="1" dirty="0" smtClean="0">
+                <a:solidFill>
+                  <a:srgbClr val="66FF33"/>
+                </a:solidFill>
+                <a:latin typeface="Courier New" pitchFamily="49" charset="0"/>
+                <a:cs typeface="Courier New" pitchFamily="49" charset="0"/>
+              </a:rPr>
+              <a:t>. EXPLOSION SOUND</a:t>
+            </a:r>
+          </a:p>
+          <a:p>
+            <a:r>
+              <a:rPr lang="en-US" sz="1400" b="1" dirty="0" smtClean="0">
+                <a:solidFill>
+                  <a:srgbClr val="66FF33"/>
+                </a:solidFill>
+                <a:latin typeface="Courier New" pitchFamily="49" charset="0"/>
+                <a:cs typeface="Courier New" pitchFamily="49" charset="0"/>
+              </a:rPr>
+              <a:t>WITH </a:t>
+            </a:r>
+            <a:r>
+              <a:rPr lang="en-US" sz="1400" b="1" dirty="0" smtClean="0">
+                <a:solidFill>
+                  <a:srgbClr val="66FF33"/>
+                </a:solidFill>
+                <a:latin typeface="Courier New" pitchFamily="49" charset="0"/>
+                <a:cs typeface="Courier New" pitchFamily="49" charset="0"/>
+              </a:rPr>
+              <a:t>COMMUNITY HELP: </a:t>
+            </a:r>
+            <a:r>
+              <a:rPr lang="en-US" sz="1400" b="1" dirty="0" smtClean="0">
+                <a:solidFill>
+                  <a:srgbClr val="66FF33"/>
+                </a:solidFill>
+                <a:latin typeface="Courier New" pitchFamily="49" charset="0"/>
+                <a:cs typeface="Courier New" pitchFamily="49" charset="0"/>
+                <a:hlinkClick r:id="rId6"/>
+              </a:rPr>
+              <a:t>HTTP://FAMITRACKER.COM/FORUM/POSTS.PHP?ID=244</a:t>
+            </a:r>
+            <a:endParaRPr lang="en-US" sz="1400" b="1" dirty="0" smtClean="0">
+              <a:solidFill>
+                <a:srgbClr val="66FF33"/>
+              </a:solidFill>
+              <a:latin typeface="Courier New" pitchFamily="49" charset="0"/>
+              <a:cs typeface="Courier New" pitchFamily="49" charset="0"/>
+            </a:endParaRPr>
+          </a:p>
+          <a:p>
+            <a:endParaRPr lang="en-US" sz="1400" b="1" dirty="0" smtClean="0">
+              <a:solidFill>
+                <a:srgbClr val="66FF33"/>
+              </a:solidFill>
+              <a:latin typeface="Courier New" pitchFamily="49" charset="0"/>
+              <a:cs typeface="Courier New" pitchFamily="49" charset="0"/>
+            </a:endParaRPr>
+          </a:p>
+          <a:p>
+            <a:r>
+              <a:rPr lang="en-US" sz="1400" b="1" dirty="0" smtClean="0">
+                <a:solidFill>
+                  <a:srgbClr val="66FF33"/>
+                </a:solidFill>
+                <a:latin typeface="Courier New" pitchFamily="49" charset="0"/>
+                <a:cs typeface="Courier New" pitchFamily="49" charset="0"/>
+              </a:rPr>
+              <a:t>SKYBOXES CREATED WITH SPACESCAPE</a:t>
+            </a:r>
+          </a:p>
+          <a:p>
+            <a:r>
+              <a:rPr lang="de-DE" sz="1400" b="1" dirty="0" smtClean="0">
+                <a:latin typeface="Courier New" pitchFamily="49" charset="0"/>
+                <a:cs typeface="Courier New" pitchFamily="49" charset="0"/>
+                <a:hlinkClick r:id="rId7"/>
+              </a:rPr>
+              <a:t>HTTP://ALEXCPETERSON.COM/SPACESCAPE</a:t>
+            </a:r>
+            <a:endParaRPr lang="en-US" sz="1400" b="1" dirty="0" smtClean="0">
+              <a:solidFill>
+                <a:srgbClr val="66FF33"/>
+              </a:solidFill>
+              <a:latin typeface="Courier New" pitchFamily="49" charset="0"/>
+              <a:cs typeface="Courier New" pitchFamily="49" charset="0"/>
+            </a:endParaRPr>
+          </a:p>
+          <a:p>
+            <a:endParaRPr lang="de-DE" sz="1400" b="1" dirty="0" smtClean="0">
+              <a:solidFill>
+                <a:srgbClr val="66FF33"/>
+              </a:solidFill>
+              <a:latin typeface="Courier New" pitchFamily="49" charset="0"/>
+              <a:cs typeface="Courier New" pitchFamily="49" charset="0"/>
+            </a:endParaRPr>
+          </a:p>
+          <a:p>
+            <a:endParaRPr lang="de-DE" sz="1400" b="1" dirty="0" smtClean="0">
+              <a:solidFill>
+                <a:srgbClr val="66FF33"/>
+              </a:solidFill>
+              <a:latin typeface="Courier New" pitchFamily="49" charset="0"/>
+              <a:cs typeface="Courier New" pitchFamily="49" charset="0"/>
+            </a:endParaRPr>
+          </a:p>
+          <a:p>
+            <a:endParaRPr lang="de-DE" sz="1400" b="1" dirty="0">
+              <a:solidFill>
+                <a:srgbClr val="66FF33"/>
+              </a:solidFill>
+              <a:latin typeface="Courier New" pitchFamily="49" charset="0"/>
+              <a:cs typeface="Courier New" pitchFamily="49" charset="0"/>
+            </a:endParaRPr>
+          </a:p>
         </p:txBody>
       </p:sp>
     </p:spTree>
     <p:extLst>
       <p:ext uri="{BB962C8B-B14F-4D97-AF65-F5344CB8AC3E}">
-        <p14:creationId xmlns:p14="http://schemas.microsoft.com/office/powerpoint/2010/main" val="2605200880"/>
+        <p14:creationId xmlns:p14="http://schemas.microsoft.com/office/powerpoint/2010/main" val="2288137917"/>
       </p:ext>
     </p:extLst>
   </p:cSld>
@@ -3694,7 +4515,7 @@
 </p:sld>
 </file>
 
-<file path=ppt/slides/slide3.xml><?xml version="1.0" encoding="utf-8"?>
+<file path=ppt/slides/slide2.xml><?xml version="1.0" encoding="utf-8"?>
 <p:sld xmlns:a="http://schemas.openxmlformats.org/drawingml/2006/main" xmlns:r="http://schemas.openxmlformats.org/officeDocument/2006/relationships" xmlns:p="http://schemas.openxmlformats.org/presentationml/2006/main">
   <p:cSld>
     <p:spTree>
@@ -3713,7 +4534,7 @@
       </p:grpSpPr>
       <p:sp>
         <p:nvSpPr>
-          <p:cNvPr id="8" name="Rounded Rectangle 7"/>
+          <p:cNvPr id="9" name="Rounded Rectangle 8"/>
           <p:cNvSpPr/>
           <p:nvPr/>
         </p:nvSpPr>
@@ -3779,7 +4600,31 @@
                 <a:latin typeface="Courier New" pitchFamily="49" charset="0"/>
                 <a:cs typeface="Courier New" pitchFamily="49" charset="0"/>
               </a:rPr>
-              <a:t>Each ship - like yours – must contribute to the galactic forces to defend the earth.</a:t>
+              <a:t>IT‘S THE YEAR 3141*10^42 AND THE EARTH IS FACING A GALACTIC WAR WITH MANY RACES WHO</a:t>
+            </a:r>
+          </a:p>
+          <a:p>
+            <a:r>
+              <a:rPr lang="de-DE" b="1" dirty="0" smtClean="0">
+                <a:solidFill>
+                  <a:srgbClr val="66FF33"/>
+                </a:solidFill>
+                <a:latin typeface="Courier New" pitchFamily="49" charset="0"/>
+                <a:cs typeface="Courier New" pitchFamily="49" charset="0"/>
+              </a:rPr>
+              <a:t>ARE TRYING TO CONQUER ALL RESOUCES WITHIN</a:t>
+            </a:r>
+          </a:p>
+          <a:p>
+            <a:r>
+              <a:rPr lang="de-DE" b="1" dirty="0" smtClean="0">
+                <a:solidFill>
+                  <a:srgbClr val="66FF33"/>
+                </a:solidFill>
+                <a:latin typeface="Courier New" pitchFamily="49" charset="0"/>
+                <a:cs typeface="Courier New" pitchFamily="49" charset="0"/>
+              </a:rPr>
+              <a:t>THE MILKY WAY.</a:t>
             </a:r>
           </a:p>
           <a:p>
@@ -3800,17 +4645,7 @@
                 <a:latin typeface="Courier New" pitchFamily="49" charset="0"/>
                 <a:cs typeface="Courier New" pitchFamily="49" charset="0"/>
               </a:rPr>
-              <a:t>So your mission is to do a certain amount of work </a:t>
-            </a:r>
-            <a:r>
-              <a:rPr lang="de-DE" b="1" dirty="0" smtClean="0">
-                <a:solidFill>
-                  <a:srgbClr val="66FF33"/>
-                </a:solidFill>
-                <a:latin typeface="Courier New" pitchFamily="49" charset="0"/>
-                <a:cs typeface="Courier New" pitchFamily="49" charset="0"/>
-              </a:rPr>
-              <a:t>for a given time span.</a:t>
+              <a:t>YOU HAVE BEEN SENT ON A COLLISION COURSE TO SUPPORT THE GALACTIC DEFENSE FORCES AND TO STOP AS MANY ENEMIES AS YOU CAN BEFORE THEY REACH THE SOLAR SYSTEM.</a:t>
             </a:r>
           </a:p>
           <a:p>
@@ -3831,7 +4666,7 @@
                 <a:latin typeface="Courier New" pitchFamily="49" charset="0"/>
                 <a:cs typeface="Courier New" pitchFamily="49" charset="0"/>
               </a:rPr>
-              <a:t>You must reach a certain score for a given time span to confirm that you are merit to be part of the galatic forces.</a:t>
+              <a:t>IF YOU FAIL TO STOP THE ENEMIES THE GALACTIC DEFENCE NETWORK WILL COLLAPSE AND THE EARTH CAN‘T STAND THE ALIENS FIRE AND WILL BE EXPLOITED AND DESTROYED...</a:t>
             </a:r>
           </a:p>
           <a:p>
@@ -3852,29 +4687,15 @@
                 <a:latin typeface="Courier New" pitchFamily="49" charset="0"/>
                 <a:cs typeface="Courier New" pitchFamily="49" charset="0"/>
               </a:rPr>
-              <a:t>You have up to 6 lives. When you die with your last life the galactic defense network will collapse and the earth will be conquered!</a:t>
-            </a:r>
-          </a:p>
-          <a:p>
-            <a:endParaRPr lang="de-DE" b="1" dirty="0" smtClean="0">
+              <a:t>MAY THE FORCE BE WITH &lt;SORRY COPYRIGHTED&gt;!</a:t>
+            </a:r>
+            <a:endParaRPr lang="de-DE" dirty="0" smtClean="0">
               <a:solidFill>
                 <a:srgbClr val="66FF33"/>
               </a:solidFill>
-              <a:latin typeface="Courier New" pitchFamily="49" charset="0"/>
-              <a:cs typeface="Courier New" pitchFamily="49" charset="0"/>
             </a:endParaRPr>
           </a:p>
           <a:p>
-            <a:r>
-              <a:rPr lang="de-DE" b="1" dirty="0" smtClean="0">
-                <a:solidFill>
-                  <a:srgbClr val="66FF33"/>
-                </a:solidFill>
-                <a:latin typeface="Courier New" pitchFamily="49" charset="0"/>
-                <a:cs typeface="Courier New" pitchFamily="49" charset="0"/>
-              </a:rPr>
-              <a:t>All information are displayed within your HUD.</a:t>
-            </a:r>
             <a:endParaRPr lang="de-DE" b="1" dirty="0">
               <a:solidFill>
                 <a:srgbClr val="66FF33"/>
@@ -3887,41 +4708,25 @@
       </p:sp>
       <p:sp>
         <p:nvSpPr>
-          <p:cNvPr id="9" name="Title 1"/>
-          <p:cNvSpPr txBox="1">
-            <a:spLocks/>
+          <p:cNvPr id="11" name="Title 1"/>
+          <p:cNvSpPr>
+            <a:spLocks noGrp="1"/>
           </p:cNvSpPr>
-          <p:nvPr/>
+          <p:nvPr>
+            <p:ph type="title"/>
+          </p:nvPr>
         </p:nvSpPr>
         <p:spPr>
           <a:xfrm>
             <a:off x="251520" y="260648"/>
             <a:ext cx="8568952" cy="778098"/>
           </a:xfrm>
-          <a:prstGeom prst="rect">
-            <a:avLst/>
-          </a:prstGeom>
         </p:spPr>
         <p:txBody>
-          <a:bodyPr vert="horz" lIns="91440" tIns="45720" rIns="91440" bIns="45720" rtlCol="0" anchor="ctr">
+          <a:bodyPr>
             <a:noAutofit/>
           </a:bodyPr>
-          <a:lstStyle>
-            <a:lvl1pPr algn="ctr" defTabSz="914400" rtl="0" eaLnBrk="1" latinLnBrk="0" hangingPunct="1">
-              <a:spcBef>
-                <a:spcPct val="0"/>
-              </a:spcBef>
-              <a:buNone/>
-              <a:defRPr sz="4400" kern="1200">
-                <a:solidFill>
-                  <a:schemeClr val="tx1"/>
-                </a:solidFill>
-                <a:latin typeface="+mj-lt"/>
-                <a:ea typeface="+mj-ea"/>
-                <a:cs typeface="+mj-cs"/>
-              </a:defRPr>
-            </a:lvl1pPr>
-          </a:lstStyle>
+          <a:lstStyle/>
           <a:p>
             <a:r>
               <a:rPr lang="de-DE" sz="4800" b="1" dirty="0" smtClean="0">
@@ -3950,7 +4755,7 @@
                 <a:latin typeface="Courier New" pitchFamily="49" charset="0"/>
                 <a:cs typeface="Courier New" pitchFamily="49" charset="0"/>
               </a:rPr>
-              <a:t>mission</a:t>
+              <a:t>story</a:t>
             </a:r>
             <a:endParaRPr lang="de-DE" sz="4800" b="1" dirty="0">
               <a:solidFill>
@@ -3965,7 +4770,7 @@
     </p:spTree>
     <p:extLst>
       <p:ext uri="{BB962C8B-B14F-4D97-AF65-F5344CB8AC3E}">
-        <p14:creationId xmlns:p14="http://schemas.microsoft.com/office/powerpoint/2010/main" val="830345792"/>
+        <p14:creationId xmlns:p14="http://schemas.microsoft.com/office/powerpoint/2010/main" val="2605200880"/>
       </p:ext>
     </p:extLst>
   </p:cSld>
@@ -3982,7 +4787,7 @@
 </p:sld>
 </file>
 
-<file path=ppt/slides/slide4.xml><?xml version="1.0" encoding="utf-8"?>
+<file path=ppt/slides/slide3.xml><?xml version="1.0" encoding="utf-8"?>
 <p:sld xmlns:a="http://schemas.openxmlformats.org/drawingml/2006/main" xmlns:r="http://schemas.openxmlformats.org/officeDocument/2006/relationships" xmlns:p="http://schemas.openxmlformats.org/presentationml/2006/main">
   <p:cSld>
     <p:spTree>
@@ -4001,68 +4806,7 @@
       </p:grpSpPr>
       <p:sp>
         <p:nvSpPr>
-          <p:cNvPr id="2" name="Title 1"/>
-          <p:cNvSpPr>
-            <a:spLocks noGrp="1"/>
-          </p:cNvSpPr>
-          <p:nvPr>
-            <p:ph type="title"/>
-          </p:nvPr>
-        </p:nvSpPr>
-        <p:spPr>
-          <a:xfrm>
-            <a:off x="251520" y="260648"/>
-            <a:ext cx="8568952" cy="778098"/>
-          </a:xfrm>
-        </p:spPr>
-        <p:txBody>
-          <a:bodyPr>
-            <a:noAutofit/>
-          </a:bodyPr>
-          <a:lstStyle/>
-          <a:p>
-            <a:r>
-              <a:rPr lang="de-DE" sz="4800" b="1" dirty="0" smtClean="0">
-                <a:ln w="38100">
-                  <a:solidFill>
-                    <a:schemeClr val="tx1"/>
-                  </a:solidFill>
-                  <a:prstDash val="solid"/>
-                </a:ln>
-                <a:solidFill>
-                  <a:srgbClr val="66FF33"/>
-                </a:solidFill>
-                <a:effectLst>
-                  <a:glow rad="63500">
-                    <a:srgbClr val="FFFF00">
-                      <a:alpha val="40000"/>
-                    </a:srgbClr>
-                  </a:glow>
-                  <a:outerShdw blurRad="50000" dist="50800" dir="7500000" algn="tl">
-                    <a:srgbClr val="000000">
-                      <a:shade val="5000"/>
-                      <a:alpha val="35000"/>
-                    </a:srgbClr>
-                  </a:outerShdw>
-                </a:effectLst>
-                <a:latin typeface="Courier New" pitchFamily="49" charset="0"/>
-                <a:cs typeface="Courier New" pitchFamily="49" charset="0"/>
-              </a:rPr>
-              <a:t>rules</a:t>
-            </a:r>
-            <a:endParaRPr lang="de-DE" sz="4800" b="1" dirty="0">
-              <a:solidFill>
-                <a:srgbClr val="66FF33"/>
-              </a:solidFill>
-              <a:latin typeface="Courier New" pitchFamily="49" charset="0"/>
-              <a:cs typeface="Courier New" pitchFamily="49" charset="0"/>
-            </a:endParaRPr>
-          </a:p>
-        </p:txBody>
-      </p:sp>
-      <p:sp>
-        <p:nvSpPr>
-          <p:cNvPr id="6" name="Rounded Rectangle 5"/>
+          <p:cNvPr id="8" name="Rounded Rectangle 7"/>
           <p:cNvSpPr/>
           <p:nvPr/>
         </p:nvSpPr>
@@ -4120,6 +4864,345 @@
           <a:bodyPr lIns="360000" tIns="72000" rIns="360000" bIns="72000" rtlCol="0" anchor="ctr"/>
           <a:lstStyle/>
           <a:p>
+            <a:r>
+              <a:rPr lang="de-DE" b="1" dirty="0" smtClean="0">
+                <a:solidFill>
+                  <a:srgbClr val="66FF33"/>
+                </a:solidFill>
+                <a:latin typeface="Courier New" pitchFamily="49" charset="0"/>
+                <a:cs typeface="Courier New" pitchFamily="49" charset="0"/>
+              </a:rPr>
+              <a:t>EACH SHIP - LIKE YOURS – MUST CONTRIBUTE TO THE GALACTIC FORCES TO DEFEND THE EARTH.</a:t>
+            </a:r>
+          </a:p>
+          <a:p>
+            <a:endParaRPr lang="de-DE" b="1" dirty="0" smtClean="0">
+              <a:solidFill>
+                <a:srgbClr val="66FF33"/>
+              </a:solidFill>
+              <a:latin typeface="Courier New" pitchFamily="49" charset="0"/>
+              <a:cs typeface="Courier New" pitchFamily="49" charset="0"/>
+            </a:endParaRPr>
+          </a:p>
+          <a:p>
+            <a:r>
+              <a:rPr lang="de-DE" b="1" dirty="0" smtClean="0">
+                <a:solidFill>
+                  <a:srgbClr val="66FF33"/>
+                </a:solidFill>
+                <a:latin typeface="Courier New" pitchFamily="49" charset="0"/>
+                <a:cs typeface="Courier New" pitchFamily="49" charset="0"/>
+              </a:rPr>
+              <a:t>SO YOUR MISSION IS TO DO A CERTAIN AMOUNT OF WORK FOR A GIVEN TIME SPAN.</a:t>
+            </a:r>
+          </a:p>
+          <a:p>
+            <a:endParaRPr lang="de-DE" b="1" dirty="0" smtClean="0">
+              <a:solidFill>
+                <a:srgbClr val="66FF33"/>
+              </a:solidFill>
+              <a:latin typeface="Courier New" pitchFamily="49" charset="0"/>
+              <a:cs typeface="Courier New" pitchFamily="49" charset="0"/>
+            </a:endParaRPr>
+          </a:p>
+          <a:p>
+            <a:r>
+              <a:rPr lang="de-DE" b="1" dirty="0" smtClean="0">
+                <a:solidFill>
+                  <a:srgbClr val="66FF33"/>
+                </a:solidFill>
+                <a:latin typeface="Courier New" pitchFamily="49" charset="0"/>
+                <a:cs typeface="Courier New" pitchFamily="49" charset="0"/>
+              </a:rPr>
+              <a:t>YOU MUST REACH A CERTAIN SCORE FOR A GIVEN TIME SPAN TO CONFIRM THAT YOU ARE MERIT TO BE PART OF THE GALATIC FORCES.</a:t>
+            </a:r>
+          </a:p>
+          <a:p>
+            <a:endParaRPr lang="de-DE" b="1" dirty="0" smtClean="0">
+              <a:solidFill>
+                <a:srgbClr val="66FF33"/>
+              </a:solidFill>
+              <a:latin typeface="Courier New" pitchFamily="49" charset="0"/>
+              <a:cs typeface="Courier New" pitchFamily="49" charset="0"/>
+            </a:endParaRPr>
+          </a:p>
+          <a:p>
+            <a:r>
+              <a:rPr lang="de-DE" b="1" dirty="0" smtClean="0">
+                <a:solidFill>
+                  <a:srgbClr val="66FF33"/>
+                </a:solidFill>
+                <a:latin typeface="Courier New" pitchFamily="49" charset="0"/>
+                <a:cs typeface="Courier New" pitchFamily="49" charset="0"/>
+              </a:rPr>
+              <a:t>YOU HAVE UP TO 6 LIVES. WHEN YOU DIE WITH YOUR LAST LIFE THE GALACTIC DEFENSE NETWORK WILL COLLAPSE AND THE EARTH WILL BE CONQUERED!</a:t>
+            </a:r>
+          </a:p>
+          <a:p>
+            <a:endParaRPr lang="de-DE" b="1" dirty="0" smtClean="0">
+              <a:solidFill>
+                <a:srgbClr val="66FF33"/>
+              </a:solidFill>
+              <a:latin typeface="Courier New" pitchFamily="49" charset="0"/>
+              <a:cs typeface="Courier New" pitchFamily="49" charset="0"/>
+            </a:endParaRPr>
+          </a:p>
+          <a:p>
+            <a:r>
+              <a:rPr lang="de-DE" b="1" dirty="0" smtClean="0">
+                <a:solidFill>
+                  <a:srgbClr val="66FF33"/>
+                </a:solidFill>
+                <a:latin typeface="Courier New" pitchFamily="49" charset="0"/>
+                <a:cs typeface="Courier New" pitchFamily="49" charset="0"/>
+              </a:rPr>
+              <a:t>ALL INFORMATION ARE DISPLAYED WITHIN YOUR HUD.</a:t>
+            </a:r>
+            <a:endParaRPr lang="de-DE" b="1" dirty="0">
+              <a:solidFill>
+                <a:srgbClr val="66FF33"/>
+              </a:solidFill>
+              <a:latin typeface="Courier New" pitchFamily="49" charset="0"/>
+              <a:cs typeface="Courier New" pitchFamily="49" charset="0"/>
+            </a:endParaRPr>
+          </a:p>
+        </p:txBody>
+      </p:sp>
+      <p:sp>
+        <p:nvSpPr>
+          <p:cNvPr id="9" name="Title 1"/>
+          <p:cNvSpPr txBox="1">
+            <a:spLocks/>
+          </p:cNvSpPr>
+          <p:nvPr/>
+        </p:nvSpPr>
+        <p:spPr>
+          <a:xfrm>
+            <a:off x="251520" y="260648"/>
+            <a:ext cx="8568952" cy="778098"/>
+          </a:xfrm>
+          <a:prstGeom prst="rect">
+            <a:avLst/>
+          </a:prstGeom>
+        </p:spPr>
+        <p:txBody>
+          <a:bodyPr vert="horz" lIns="91440" tIns="45720" rIns="91440" bIns="45720" rtlCol="0" anchor="ctr">
+            <a:noAutofit/>
+          </a:bodyPr>
+          <a:lstStyle>
+            <a:lvl1pPr algn="ctr" defTabSz="914400" rtl="0" eaLnBrk="1" latinLnBrk="0" hangingPunct="1">
+              <a:spcBef>
+                <a:spcPct val="0"/>
+              </a:spcBef>
+              <a:buNone/>
+              <a:defRPr sz="4400" kern="1200">
+                <a:solidFill>
+                  <a:schemeClr val="tx1"/>
+                </a:solidFill>
+                <a:latin typeface="+mj-lt"/>
+                <a:ea typeface="+mj-ea"/>
+                <a:cs typeface="+mj-cs"/>
+              </a:defRPr>
+            </a:lvl1pPr>
+          </a:lstStyle>
+          <a:p>
+            <a:r>
+              <a:rPr lang="de-DE" sz="4800" b="1" dirty="0" smtClean="0">
+                <a:ln w="38100">
+                  <a:solidFill>
+                    <a:schemeClr val="tx1"/>
+                  </a:solidFill>
+                  <a:prstDash val="solid"/>
+                </a:ln>
+                <a:solidFill>
+                  <a:srgbClr val="66FF33"/>
+                </a:solidFill>
+                <a:effectLst>
+                  <a:glow rad="63500">
+                    <a:srgbClr val="FFFF00">
+                      <a:alpha val="40000"/>
+                    </a:srgbClr>
+                  </a:glow>
+                  <a:outerShdw blurRad="50000" dist="50800" dir="7500000" algn="tl">
+                    <a:srgbClr val="000000">
+                      <a:shade val="5000"/>
+                      <a:alpha val="35000"/>
+                    </a:srgbClr>
+                  </a:outerShdw>
+                </a:effectLst>
+                <a:latin typeface="Courier New" pitchFamily="49" charset="0"/>
+                <a:cs typeface="Courier New" pitchFamily="49" charset="0"/>
+              </a:rPr>
+              <a:t>mission</a:t>
+            </a:r>
+            <a:endParaRPr lang="de-DE" sz="4800" b="1" dirty="0">
+              <a:solidFill>
+                <a:srgbClr val="66FF33"/>
+              </a:solidFill>
+              <a:latin typeface="Courier New" pitchFamily="49" charset="0"/>
+              <a:cs typeface="Courier New" pitchFamily="49" charset="0"/>
+            </a:endParaRPr>
+          </a:p>
+        </p:txBody>
+      </p:sp>
+    </p:spTree>
+    <p:extLst>
+      <p:ext uri="{BB962C8B-B14F-4D97-AF65-F5344CB8AC3E}">
+        <p14:creationId xmlns:p14="http://schemas.microsoft.com/office/powerpoint/2010/main" val="830345792"/>
+      </p:ext>
+    </p:extLst>
+  </p:cSld>
+  <p:clrMapOvr>
+    <a:masterClrMapping/>
+  </p:clrMapOvr>
+  <p:timing>
+    <p:tnLst>
+      <p:par>
+        <p:cTn id="1" dur="indefinite" restart="never" nodeType="tmRoot"/>
+      </p:par>
+    </p:tnLst>
+  </p:timing>
+</p:sld>
+</file>
+
+<file path=ppt/slides/slide4.xml><?xml version="1.0" encoding="utf-8"?>
+<p:sld xmlns:a="http://schemas.openxmlformats.org/drawingml/2006/main" xmlns:r="http://schemas.openxmlformats.org/officeDocument/2006/relationships" xmlns:p="http://schemas.openxmlformats.org/presentationml/2006/main">
+  <p:cSld>
+    <p:spTree>
+      <p:nvGrpSpPr>
+        <p:cNvPr id="1" name=""/>
+        <p:cNvGrpSpPr/>
+        <p:nvPr/>
+      </p:nvGrpSpPr>
+      <p:grpSpPr>
+        <a:xfrm>
+          <a:off x="0" y="0"/>
+          <a:ext cx="0" cy="0"/>
+          <a:chOff x="0" y="0"/>
+          <a:chExt cx="0" cy="0"/>
+        </a:xfrm>
+      </p:grpSpPr>
+      <p:sp>
+        <p:nvSpPr>
+          <p:cNvPr id="2" name="Title 1"/>
+          <p:cNvSpPr>
+            <a:spLocks noGrp="1"/>
+          </p:cNvSpPr>
+          <p:nvPr>
+            <p:ph type="title"/>
+          </p:nvPr>
+        </p:nvSpPr>
+        <p:spPr>
+          <a:xfrm>
+            <a:off x="251520" y="260648"/>
+            <a:ext cx="8568952" cy="778098"/>
+          </a:xfrm>
+        </p:spPr>
+        <p:txBody>
+          <a:bodyPr>
+            <a:noAutofit/>
+          </a:bodyPr>
+          <a:lstStyle/>
+          <a:p>
+            <a:r>
+              <a:rPr lang="de-DE" sz="4800" b="1" dirty="0" smtClean="0">
+                <a:ln w="38100">
+                  <a:solidFill>
+                    <a:schemeClr val="tx1"/>
+                  </a:solidFill>
+                  <a:prstDash val="solid"/>
+                </a:ln>
+                <a:solidFill>
+                  <a:srgbClr val="66FF33"/>
+                </a:solidFill>
+                <a:effectLst>
+                  <a:glow rad="63500">
+                    <a:srgbClr val="FFFF00">
+                      <a:alpha val="40000"/>
+                    </a:srgbClr>
+                  </a:glow>
+                  <a:outerShdw blurRad="50000" dist="50800" dir="7500000" algn="tl">
+                    <a:srgbClr val="000000">
+                      <a:shade val="5000"/>
+                      <a:alpha val="35000"/>
+                    </a:srgbClr>
+                  </a:outerShdw>
+                </a:effectLst>
+                <a:latin typeface="Courier New" pitchFamily="49" charset="0"/>
+                <a:cs typeface="Courier New" pitchFamily="49" charset="0"/>
+              </a:rPr>
+              <a:t>rules</a:t>
+            </a:r>
+            <a:endParaRPr lang="de-DE" sz="4800" b="1" dirty="0">
+              <a:solidFill>
+                <a:srgbClr val="66FF33"/>
+              </a:solidFill>
+              <a:latin typeface="Courier New" pitchFamily="49" charset="0"/>
+              <a:cs typeface="Courier New" pitchFamily="49" charset="0"/>
+            </a:endParaRPr>
+          </a:p>
+        </p:txBody>
+      </p:sp>
+      <p:sp>
+        <p:nvSpPr>
+          <p:cNvPr id="6" name="Rounded Rectangle 5"/>
+          <p:cNvSpPr/>
+          <p:nvPr/>
+        </p:nvSpPr>
+        <p:spPr>
+          <a:xfrm>
+            <a:off x="683568" y="404664"/>
+            <a:ext cx="7776864" cy="6192688"/>
+          </a:xfrm>
+          <a:prstGeom prst="roundRect">
+            <a:avLst/>
+          </a:prstGeom>
+          <a:ln>
+            <a:noFill/>
+          </a:ln>
+          <a:effectLst>
+            <a:glow>
+              <a:schemeClr val="accent1">
+                <a:alpha val="40000"/>
+              </a:schemeClr>
+            </a:glow>
+            <a:outerShdw blurRad="44450" dist="27940" dir="5400000" algn="ctr">
+              <a:srgbClr val="000000">
+                <a:alpha val="32000"/>
+              </a:srgbClr>
+            </a:outerShdw>
+          </a:effectLst>
+          <a:scene3d>
+            <a:camera prst="perspectiveRelaxedModerately"/>
+            <a:lightRig rig="balanced" dir="t">
+              <a:rot lat="0" lon="0" rev="8700000"/>
+            </a:lightRig>
+          </a:scene3d>
+          <a:sp3d extrusionH="76200">
+            <a:bevelT w="190500" h="38100" prst="angle"/>
+            <a:extrusionClr>
+              <a:schemeClr val="tx1"/>
+            </a:extrusionClr>
+          </a:sp3d>
+        </p:spPr>
+        <p:style>
+          <a:lnRef idx="0">
+            <a:schemeClr val="dk1"/>
+          </a:lnRef>
+          <a:fillRef idx="3">
+            <a:schemeClr val="dk1"/>
+          </a:fillRef>
+          <a:effectRef idx="3">
+            <a:schemeClr val="dk1"/>
+          </a:effectRef>
+          <a:fontRef idx="minor">
+            <a:schemeClr val="lt1"/>
+          </a:fontRef>
+        </p:style>
+        <p:txBody>
+          <a:bodyPr lIns="360000" tIns="72000" rIns="360000" bIns="72000" rtlCol="0" anchor="ctr"/>
+          <a:lstStyle/>
+          <a:p>
             <a:pPr marL="342900" indent="-342900">
               <a:buFont typeface="+mj-lt"/>
               <a:buAutoNum type="arabicPeriod"/>
@@ -4132,7 +5215,7 @@
                 <a:latin typeface="Courier New" pitchFamily="49" charset="0"/>
                 <a:cs typeface="Courier New" pitchFamily="49" charset="0"/>
               </a:rPr>
-              <a:t>You must destroy the enemies and achieve a given score before the timer is up.</a:t>
+              <a:t>YOU MUST DESTROY THE ENEMIES AND ACHIEVE A GIVEN SCORE BEFORE THE TIMER IS UP.</a:t>
             </a:r>
           </a:p>
           <a:p>
@@ -4148,7 +5231,7 @@
                 <a:latin typeface="Courier New" pitchFamily="49" charset="0"/>
                 <a:cs typeface="Courier New" pitchFamily="49" charset="0"/>
               </a:rPr>
-              <a:t>The enemies are radioactive galactic apes and ufos from alpha centauri.</a:t>
+              <a:t>THE ENEMIES ARE RADIOACTIVE GALACTIC APES AND UFOS FROM ALPHA CENTAURI.</a:t>
             </a:r>
           </a:p>
           <a:p>
@@ -4164,7 +5247,7 @@
                 <a:latin typeface="Courier New" pitchFamily="49" charset="0"/>
                 <a:cs typeface="Courier New" pitchFamily="49" charset="0"/>
               </a:rPr>
-              <a:t>You can have up to 6 lives.</a:t>
+              <a:t>YOU CAN HAVE UP TO 6 LIVES.</a:t>
             </a:r>
           </a:p>
           <a:p>
@@ -4180,7 +5263,7 @@
                 <a:latin typeface="Courier New" pitchFamily="49" charset="0"/>
                 <a:cs typeface="Courier New" pitchFamily="49" charset="0"/>
               </a:rPr>
-              <a:t>If you die with 1 live you‘re game over.</a:t>
+              <a:t>IF YOU DIE WITH 1 LIVE YOU‘RE GAME OVER.</a:t>
             </a:r>
           </a:p>
           <a:p>
@@ -4196,7 +5279,7 @@
                 <a:latin typeface="Courier New" pitchFamily="49" charset="0"/>
                 <a:cs typeface="Courier New" pitchFamily="49" charset="0"/>
               </a:rPr>
-              <a:t>You can earn 1 live by catching 100 energy rings which the earth‘s service forces spread in space.</a:t>
+              <a:t>YOU CAN EARN 1 LIVE BY CATCHING 100 ENERGY RINGS WHICH THE EARTH‘S SERVICE FORCES SPREAD IN SPACE.</a:t>
             </a:r>
           </a:p>
           <a:p>
@@ -4212,7 +5295,7 @@
                 <a:latin typeface="Courier New" pitchFamily="49" charset="0"/>
                 <a:cs typeface="Courier New" pitchFamily="49" charset="0"/>
               </a:rPr>
-              <a:t>When your mission starts then you only have impulse drive and you are slow.</a:t>
+              <a:t>WHEN YOUR MISSION STARTS THEN YOU ONLY HAVE IMPULSE DRIVE AND YOU ARE SLOW.</a:t>
             </a:r>
           </a:p>
           <a:p>
@@ -4228,7 +5311,7 @@
                 <a:latin typeface="Courier New" pitchFamily="49" charset="0"/>
                 <a:cs typeface="Courier New" pitchFamily="49" charset="0"/>
               </a:rPr>
-              <a:t>You can fly up to warp 2 by catching up to 2 warp cores which the earth‘s service forces spread in space.</a:t>
+              <a:t>YOU CAN FLY UP TO WARP 2 BY CATCHING UP TO 2 WARP CORES WHICH THE EARTH‘S SERVICE FORCES SPREAD IN SPACE.</a:t>
             </a:r>
           </a:p>
           <a:p>
@@ -4244,7 +5327,7 @@
                 <a:latin typeface="Courier New" pitchFamily="49" charset="0"/>
                 <a:cs typeface="Courier New" pitchFamily="49" charset="0"/>
               </a:rPr>
-              <a:t>If you collide with an enemy each time your warp core will overheat and you will slow down again.</a:t>
+              <a:t>IF YOU COLLIDE WITH AN ENEMY EACH TIME YOUR WARP CORE WILL OVERHEAT AND YOU WILL SLOW DOWN AGAIN.</a:t>
             </a:r>
           </a:p>
           <a:p>
@@ -4260,7 +5343,7 @@
                 <a:latin typeface="Courier New" pitchFamily="49" charset="0"/>
                 <a:cs typeface="Courier New" pitchFamily="49" charset="0"/>
               </a:rPr>
-              <a:t>Prevent collisions with any obstracles except of rings, hearts and warp cores.</a:t>
+              <a:t>PREVENT COLLISIONS WITH ANY OBSTRACLES EXCEPT OF RINGS, HEARTS AND WARP CORES.</a:t>
             </a:r>
           </a:p>
           <a:p>
@@ -4276,7 +5359,7 @@
                 <a:latin typeface="Courier New" pitchFamily="49" charset="0"/>
                 <a:cs typeface="Courier New" pitchFamily="49" charset="0"/>
               </a:rPr>
-              <a:t>Any other collision will reduce your health.</a:t>
+              <a:t>ANY OTHER COLLISION WILL REDUCE YOUR HEALTH.</a:t>
             </a:r>
           </a:p>
           <a:p>
@@ -4292,7 +5375,7 @@
                 <a:latin typeface="Courier New" pitchFamily="49" charset="0"/>
                 <a:cs typeface="Courier New" pitchFamily="49" charset="0"/>
               </a:rPr>
-              <a:t>You can regenerate your health by catching hearts.</a:t>
+              <a:t>YOU CAN REGENERATE YOUR HEALTH BY CATCHING HEARTS.</a:t>
             </a:r>
           </a:p>
           <a:p>
@@ -4327,6 +5410,423 @@
 </file>
 
 <file path=ppt/slides/slide5.xml><?xml version="1.0" encoding="utf-8"?>
+<p:sld xmlns:a="http://schemas.openxmlformats.org/drawingml/2006/main" xmlns:r="http://schemas.openxmlformats.org/officeDocument/2006/relationships" xmlns:p="http://schemas.openxmlformats.org/presentationml/2006/main">
+  <p:cSld>
+    <p:spTree>
+      <p:nvGrpSpPr>
+        <p:cNvPr id="1" name=""/>
+        <p:cNvGrpSpPr/>
+        <p:nvPr/>
+      </p:nvGrpSpPr>
+      <p:grpSpPr>
+        <a:xfrm>
+          <a:off x="0" y="0"/>
+          <a:ext cx="0" cy="0"/>
+          <a:chOff x="0" y="0"/>
+          <a:chExt cx="0" cy="0"/>
+        </a:xfrm>
+      </p:grpSpPr>
+      <p:sp>
+        <p:nvSpPr>
+          <p:cNvPr id="2" name="Title 1"/>
+          <p:cNvSpPr>
+            <a:spLocks noGrp="1"/>
+          </p:cNvSpPr>
+          <p:nvPr>
+            <p:ph type="title"/>
+          </p:nvPr>
+        </p:nvSpPr>
+        <p:spPr>
+          <a:xfrm>
+            <a:off x="251520" y="260648"/>
+            <a:ext cx="8568952" cy="778098"/>
+          </a:xfrm>
+        </p:spPr>
+        <p:txBody>
+          <a:bodyPr>
+            <a:noAutofit/>
+          </a:bodyPr>
+          <a:lstStyle/>
+          <a:p>
+            <a:r>
+              <a:rPr lang="de-DE" sz="4800" b="1" dirty="0" smtClean="0">
+                <a:ln w="38100">
+                  <a:solidFill>
+                    <a:schemeClr val="tx1"/>
+                  </a:solidFill>
+                  <a:prstDash val="solid"/>
+                </a:ln>
+                <a:solidFill>
+                  <a:srgbClr val="66FF33"/>
+                </a:solidFill>
+                <a:effectLst>
+                  <a:glow rad="63500">
+                    <a:srgbClr val="FFFF00">
+                      <a:alpha val="40000"/>
+                    </a:srgbClr>
+                  </a:glow>
+                  <a:outerShdw blurRad="50000" dist="50800" dir="7500000" algn="tl">
+                    <a:srgbClr val="000000">
+                      <a:shade val="5000"/>
+                      <a:alpha val="35000"/>
+                    </a:srgbClr>
+                  </a:outerShdw>
+                </a:effectLst>
+                <a:latin typeface="Courier New" pitchFamily="49" charset="0"/>
+                <a:cs typeface="Courier New" pitchFamily="49" charset="0"/>
+              </a:rPr>
+              <a:t>CONTROLS</a:t>
+            </a:r>
+            <a:endParaRPr lang="de-DE" sz="4800" b="1" dirty="0">
+              <a:solidFill>
+                <a:srgbClr val="66FF33"/>
+              </a:solidFill>
+              <a:latin typeface="Courier New" pitchFamily="49" charset="0"/>
+              <a:cs typeface="Courier New" pitchFamily="49" charset="0"/>
+            </a:endParaRPr>
+          </a:p>
+        </p:txBody>
+      </p:sp>
+      <p:sp>
+        <p:nvSpPr>
+          <p:cNvPr id="6" name="Rounded Rectangle 5"/>
+          <p:cNvSpPr/>
+          <p:nvPr/>
+        </p:nvSpPr>
+        <p:spPr>
+          <a:xfrm>
+            <a:off x="683568" y="404664"/>
+            <a:ext cx="7776864" cy="6192688"/>
+          </a:xfrm>
+          <a:prstGeom prst="roundRect">
+            <a:avLst/>
+          </a:prstGeom>
+          <a:ln>
+            <a:noFill/>
+          </a:ln>
+          <a:effectLst>
+            <a:glow>
+              <a:schemeClr val="accent1">
+                <a:alpha val="40000"/>
+              </a:schemeClr>
+            </a:glow>
+            <a:outerShdw blurRad="44450" dist="27940" dir="5400000" algn="ctr">
+              <a:srgbClr val="000000">
+                <a:alpha val="32000"/>
+              </a:srgbClr>
+            </a:outerShdw>
+          </a:effectLst>
+          <a:scene3d>
+            <a:camera prst="perspectiveRelaxedModerately"/>
+            <a:lightRig rig="balanced" dir="t">
+              <a:rot lat="0" lon="0" rev="8700000"/>
+            </a:lightRig>
+          </a:scene3d>
+          <a:sp3d extrusionH="76200">
+            <a:bevelT w="190500" h="38100" prst="angle"/>
+            <a:extrusionClr>
+              <a:schemeClr val="tx1"/>
+            </a:extrusionClr>
+          </a:sp3d>
+        </p:spPr>
+        <p:style>
+          <a:lnRef idx="0">
+            <a:schemeClr val="dk1"/>
+          </a:lnRef>
+          <a:fillRef idx="3">
+            <a:schemeClr val="dk1"/>
+          </a:fillRef>
+          <a:effectRef idx="3">
+            <a:schemeClr val="dk1"/>
+          </a:effectRef>
+          <a:fontRef idx="minor">
+            <a:schemeClr val="lt1"/>
+          </a:fontRef>
+        </p:style>
+        <p:txBody>
+          <a:bodyPr lIns="360000" tIns="72000" rIns="360000" bIns="72000" rtlCol="0" anchor="ctr"/>
+          <a:lstStyle/>
+          <a:p>
+            <a:r>
+              <a:rPr lang="de-DE" sz="1600" b="1" dirty="0" smtClean="0">
+                <a:solidFill>
+                  <a:srgbClr val="66FF33"/>
+                </a:solidFill>
+                <a:latin typeface="Courier New" pitchFamily="49" charset="0"/>
+                <a:cs typeface="Courier New" pitchFamily="49" charset="0"/>
+              </a:rPr>
+              <a:t>TITLE SCREEN CONTROLS ARE MARKED WITH BRACES</a:t>
+            </a:r>
+          </a:p>
+          <a:p>
+            <a:r>
+              <a:rPr lang="de-DE" sz="1600" b="1" dirty="0" smtClean="0">
+                <a:solidFill>
+                  <a:srgbClr val="66FF33"/>
+                </a:solidFill>
+                <a:latin typeface="Courier New" pitchFamily="49" charset="0"/>
+                <a:cs typeface="Courier New" pitchFamily="49" charset="0"/>
+              </a:rPr>
+              <a:t>LIKE „(1) START LEVEL 1“:</a:t>
+            </a:r>
+          </a:p>
+          <a:p>
+            <a:endParaRPr lang="de-DE" sz="1600" b="1" dirty="0">
+              <a:solidFill>
+                <a:srgbClr val="66FF33"/>
+              </a:solidFill>
+              <a:latin typeface="Courier New" pitchFamily="49" charset="0"/>
+              <a:cs typeface="Courier New" pitchFamily="49" charset="0"/>
+            </a:endParaRPr>
+          </a:p>
+          <a:p>
+            <a:r>
+              <a:rPr lang="de-DE" sz="1600" b="1" dirty="0" smtClean="0">
+                <a:solidFill>
+                  <a:srgbClr val="66FF33"/>
+                </a:solidFill>
+                <a:latin typeface="Courier New" pitchFamily="49" charset="0"/>
+                <a:cs typeface="Courier New" pitchFamily="49" charset="0"/>
+              </a:rPr>
+              <a:t>MEANS PRESSING THE KEY „1“ STARTS THE 1ST LEVEL.</a:t>
+            </a:r>
+            <a:endParaRPr lang="de-DE" sz="1600" b="1" dirty="0" smtClean="0">
+              <a:solidFill>
+                <a:srgbClr val="66FF33"/>
+              </a:solidFill>
+              <a:latin typeface="Courier New" pitchFamily="49" charset="0"/>
+              <a:cs typeface="Courier New" pitchFamily="49" charset="0"/>
+            </a:endParaRPr>
+          </a:p>
+          <a:p>
+            <a:endParaRPr lang="de-DE" sz="1600" b="1" dirty="0">
+              <a:solidFill>
+                <a:srgbClr val="66FF33"/>
+              </a:solidFill>
+              <a:latin typeface="Courier New" pitchFamily="49" charset="0"/>
+              <a:cs typeface="Courier New" pitchFamily="49" charset="0"/>
+            </a:endParaRPr>
+          </a:p>
+          <a:p>
+            <a:r>
+              <a:rPr lang="de-DE" sz="1600" b="1" u="sng" dirty="0" smtClean="0">
+                <a:solidFill>
+                  <a:srgbClr val="66FF33"/>
+                </a:solidFill>
+                <a:latin typeface="Courier New" pitchFamily="49" charset="0"/>
+                <a:cs typeface="Courier New" pitchFamily="49" charset="0"/>
+              </a:rPr>
+              <a:t>IN GAME CONTROLS</a:t>
+            </a:r>
+          </a:p>
+          <a:p>
+            <a:endParaRPr lang="de-DE" sz="1600" b="1" dirty="0">
+              <a:solidFill>
+                <a:srgbClr val="66FF33"/>
+              </a:solidFill>
+              <a:latin typeface="Courier New" pitchFamily="49" charset="0"/>
+              <a:cs typeface="Courier New" pitchFamily="49" charset="0"/>
+            </a:endParaRPr>
+          </a:p>
+          <a:p>
+            <a:r>
+              <a:rPr lang="de-DE" sz="1600" b="1" dirty="0">
+                <a:solidFill>
+                  <a:srgbClr val="66FF33"/>
+                </a:solidFill>
+                <a:latin typeface="Courier New" pitchFamily="49" charset="0"/>
+                <a:cs typeface="Courier New" pitchFamily="49" charset="0"/>
+              </a:rPr>
+              <a:t>(</a:t>
+            </a:r>
+            <a:r>
+              <a:rPr lang="de-DE" sz="1600" b="1" dirty="0" smtClean="0">
+                <a:solidFill>
+                  <a:srgbClr val="66FF33"/>
+                </a:solidFill>
+                <a:latin typeface="Courier New" pitchFamily="49" charset="0"/>
+                <a:cs typeface="Courier New" pitchFamily="49" charset="0"/>
+              </a:rPr>
+              <a:t>W) UP</a:t>
+            </a:r>
+          </a:p>
+          <a:p>
+            <a:r>
+              <a:rPr lang="de-DE" sz="1600" b="1" dirty="0">
+                <a:solidFill>
+                  <a:srgbClr val="66FF33"/>
+                </a:solidFill>
+                <a:latin typeface="Courier New" pitchFamily="49" charset="0"/>
+                <a:cs typeface="Courier New" pitchFamily="49" charset="0"/>
+              </a:rPr>
+              <a:t>(</a:t>
+            </a:r>
+            <a:r>
+              <a:rPr lang="de-DE" sz="1600" b="1" dirty="0" smtClean="0">
+                <a:solidFill>
+                  <a:srgbClr val="66FF33"/>
+                </a:solidFill>
+                <a:latin typeface="Courier New" pitchFamily="49" charset="0"/>
+                <a:cs typeface="Courier New" pitchFamily="49" charset="0"/>
+              </a:rPr>
+              <a:t>A) LEFT</a:t>
+            </a:r>
+          </a:p>
+          <a:p>
+            <a:r>
+              <a:rPr lang="de-DE" sz="1600" b="1" dirty="0">
+                <a:solidFill>
+                  <a:srgbClr val="66FF33"/>
+                </a:solidFill>
+                <a:latin typeface="Courier New" pitchFamily="49" charset="0"/>
+                <a:cs typeface="Courier New" pitchFamily="49" charset="0"/>
+              </a:rPr>
+              <a:t>(</a:t>
+            </a:r>
+            <a:r>
+              <a:rPr lang="de-DE" sz="1600" b="1" dirty="0" smtClean="0">
+                <a:solidFill>
+                  <a:srgbClr val="66FF33"/>
+                </a:solidFill>
+                <a:latin typeface="Courier New" pitchFamily="49" charset="0"/>
+                <a:cs typeface="Courier New" pitchFamily="49" charset="0"/>
+              </a:rPr>
+              <a:t>D) RIGHT</a:t>
+            </a:r>
+          </a:p>
+          <a:p>
+            <a:r>
+              <a:rPr lang="de-DE" sz="1600" b="1" dirty="0" smtClean="0">
+                <a:solidFill>
+                  <a:srgbClr val="66FF33"/>
+                </a:solidFill>
+                <a:latin typeface="Courier New" pitchFamily="49" charset="0"/>
+                <a:cs typeface="Courier New" pitchFamily="49" charset="0"/>
+              </a:rPr>
+              <a:t>(S) DOWN</a:t>
+            </a:r>
+          </a:p>
+          <a:p>
+            <a:r>
+              <a:rPr lang="de-DE" sz="1600" b="1" dirty="0">
+                <a:solidFill>
+                  <a:srgbClr val="66FF33"/>
+                </a:solidFill>
+                <a:latin typeface="Courier New" pitchFamily="49" charset="0"/>
+                <a:cs typeface="Courier New" pitchFamily="49" charset="0"/>
+              </a:rPr>
+              <a:t>(</a:t>
+            </a:r>
+            <a:r>
+              <a:rPr lang="de-DE" sz="1600" b="1" dirty="0" smtClean="0">
+                <a:solidFill>
+                  <a:srgbClr val="66FF33"/>
+                </a:solidFill>
+                <a:latin typeface="Courier New" pitchFamily="49" charset="0"/>
+                <a:cs typeface="Courier New" pitchFamily="49" charset="0"/>
+              </a:rPr>
+              <a:t>SPACE) SHOOT</a:t>
+            </a:r>
+          </a:p>
+          <a:p>
+            <a:r>
+              <a:rPr lang="de-DE" sz="1600" b="1" dirty="0" smtClean="0">
+                <a:solidFill>
+                  <a:srgbClr val="66FF33"/>
+                </a:solidFill>
+                <a:latin typeface="Courier New" pitchFamily="49" charset="0"/>
+                <a:cs typeface="Courier New" pitchFamily="49" charset="0"/>
+              </a:rPr>
+              <a:t>(P) PAUSES/RESUMES THE GAME AND RETURNS TO THE TITLE SCREEN/IN GAME SCENE</a:t>
+            </a:r>
+          </a:p>
+          <a:p>
+            <a:endParaRPr lang="de-DE" sz="1600" b="1" dirty="0">
+              <a:solidFill>
+                <a:srgbClr val="66FF33"/>
+              </a:solidFill>
+              <a:latin typeface="Courier New" pitchFamily="49" charset="0"/>
+              <a:cs typeface="Courier New" pitchFamily="49" charset="0"/>
+            </a:endParaRPr>
+          </a:p>
+          <a:p>
+            <a:r>
+              <a:rPr lang="de-DE" sz="1600" b="1" dirty="0" smtClean="0">
+                <a:solidFill>
+                  <a:srgbClr val="66FF33"/>
+                </a:solidFill>
+                <a:latin typeface="Courier New" pitchFamily="49" charset="0"/>
+                <a:cs typeface="Courier New" pitchFamily="49" charset="0"/>
+              </a:rPr>
+              <a:t>(F1) TOGGLE BLOOM FILTER</a:t>
+            </a:r>
+          </a:p>
+          <a:p>
+            <a:r>
+              <a:rPr lang="de-DE" sz="1600" b="1" dirty="0" smtClean="0">
+                <a:solidFill>
+                  <a:srgbClr val="66FF33"/>
+                </a:solidFill>
+                <a:latin typeface="Courier New" pitchFamily="49" charset="0"/>
+                <a:cs typeface="Courier New" pitchFamily="49" charset="0"/>
+              </a:rPr>
+              <a:t>(F2) TOGGLE SHADOW FILTER (ONLY USE BY APES)</a:t>
+            </a:r>
+          </a:p>
+          <a:p>
+            <a:r>
+              <a:rPr lang="de-DE" sz="1600" b="1" dirty="0" smtClean="0">
+                <a:solidFill>
+                  <a:srgbClr val="66FF33"/>
+                </a:solidFill>
+                <a:latin typeface="Courier New" pitchFamily="49" charset="0"/>
+                <a:cs typeface="Courier New" pitchFamily="49" charset="0"/>
+              </a:rPr>
+              <a:t>(F3) TOGGLE LIGHT SCATTERING FILTER</a:t>
+            </a:r>
+          </a:p>
+          <a:p>
+            <a:r>
+              <a:rPr lang="de-DE" sz="1600" b="1" dirty="0" smtClean="0">
+                <a:solidFill>
+                  <a:srgbClr val="66FF33"/>
+                </a:solidFill>
+                <a:latin typeface="Courier New" pitchFamily="49" charset="0"/>
+                <a:cs typeface="Courier New" pitchFamily="49" charset="0"/>
+              </a:rPr>
+              <a:t>(USED FOR SHIP EXPLOSION)</a:t>
+            </a:r>
+            <a:endParaRPr lang="de-DE" sz="1600" b="1" dirty="0">
+              <a:solidFill>
+                <a:srgbClr val="66FF33"/>
+              </a:solidFill>
+              <a:latin typeface="Courier New" pitchFamily="49" charset="0"/>
+              <a:cs typeface="Courier New" pitchFamily="49" charset="0"/>
+            </a:endParaRPr>
+          </a:p>
+        </p:txBody>
+      </p:sp>
+    </p:spTree>
+    <p:extLst>
+      <p:ext uri="{BB962C8B-B14F-4D97-AF65-F5344CB8AC3E}">
+        <p14:creationId xmlns:p14="http://schemas.microsoft.com/office/powerpoint/2010/main" val="3478212584"/>
+      </p:ext>
+    </p:extLst>
+  </p:cSld>
+  <p:clrMapOvr>
+    <a:masterClrMapping/>
+  </p:clrMapOvr>
+  <p:timing>
+    <p:tnLst>
+      <p:par>
+        <p:cTn id="1" dur="indefinite" restart="never" nodeType="tmRoot"/>
+      </p:par>
+    </p:tnLst>
+  </p:timing>
+</p:sld>
+</file>
+
+<file path=ppt/slides/slide6.xml><?xml version="1.0" encoding="utf-8"?>
 <p:sld xmlns:a="http://schemas.openxmlformats.org/drawingml/2006/main" xmlns:r="http://schemas.openxmlformats.org/officeDocument/2006/relationships" xmlns:p="http://schemas.openxmlformats.org/presentationml/2006/main">
   <p:cSld>
     <p:spTree>
@@ -4415,7 +5915,7 @@
                 <a:latin typeface="Courier New" pitchFamily="49" charset="0"/>
                 <a:cs typeface="Courier New" pitchFamily="49" charset="0"/>
               </a:rPr>
-              <a:t>UFOs from alpha centauri move</a:t>
+              <a:t>UFOS FROM ALPHA CENTAURI MOVE</a:t>
             </a:r>
           </a:p>
           <a:p>
@@ -4432,7 +5932,7 @@
                 <a:latin typeface="Courier New" pitchFamily="49" charset="0"/>
                 <a:cs typeface="Courier New" pitchFamily="49" charset="0"/>
               </a:rPr>
-              <a:t>fast and in groups and make more</a:t>
+              <a:t>FAST AND IN GROUPS AND MAKE MORE</a:t>
             </a:r>
           </a:p>
           <a:p>
@@ -4449,7 +5949,7 @@
                 <a:latin typeface="Courier New" pitchFamily="49" charset="0"/>
                 <a:cs typeface="Courier New" pitchFamily="49" charset="0"/>
               </a:rPr>
-              <a:t>damage than the Apes.</a:t>
+              <a:t>DAMAGE THAN THE APES.</a:t>
             </a:r>
           </a:p>
           <a:p>
@@ -4466,7 +5966,7 @@
                 <a:latin typeface="Courier New" pitchFamily="49" charset="0"/>
                 <a:cs typeface="Courier New" pitchFamily="49" charset="0"/>
               </a:rPr>
-              <a:t>So try to avoid any collisions.</a:t>
+              <a:t>SO TRY TO AVOID ANY COLLISIONS.</a:t>
             </a:r>
             <a:endParaRPr lang="de-DE" b="1" dirty="0">
               <a:ln>
@@ -4555,9 +6055,60 @@
                 <a:latin typeface="Courier New" pitchFamily="49" charset="0"/>
                 <a:cs typeface="Courier New" pitchFamily="49" charset="0"/>
               </a:rPr>
-              <a:t>These radioactive space apes from</a:t>
-            </a:r>
-            <a:endParaRPr lang="de-DE" sz="2000" b="1" dirty="0">
+              <a:t>THESE RADIOACTIVE SPACE APES FROM</a:t>
+            </a:r>
+          </a:p>
+          <a:p>
+            <a:r>
+              <a:rPr lang="de-DE" sz="2000" b="1" dirty="0" smtClean="0">
+                <a:ln>
+                  <a:solidFill>
+                    <a:srgbClr val="7030A0"/>
+                  </a:solidFill>
+                </a:ln>
+                <a:solidFill>
+                  <a:srgbClr val="66FF33"/>
+                </a:solidFill>
+                <a:latin typeface="Courier New" pitchFamily="49" charset="0"/>
+                <a:cs typeface="Courier New" pitchFamily="49" charset="0"/>
+              </a:rPr>
+              <a:t>TAU CETI MOVE RANDOMLY IN CIRCLES.</a:t>
+            </a:r>
+          </a:p>
+          <a:p>
+            <a:r>
+              <a:rPr lang="de-DE" sz="2000" b="1" dirty="0" smtClean="0">
+                <a:ln>
+                  <a:solidFill>
+                    <a:srgbClr val="7030A0"/>
+                  </a:solidFill>
+                </a:ln>
+                <a:solidFill>
+                  <a:srgbClr val="66FF33"/>
+                </a:solidFill>
+                <a:latin typeface="Courier New" pitchFamily="49" charset="0"/>
+                <a:cs typeface="Courier New" pitchFamily="49" charset="0"/>
+              </a:rPr>
+              <a:t>SO BE PREPARED FOR ANY UNEXPECTED</a:t>
+            </a:r>
+          </a:p>
+          <a:p>
+            <a:r>
+              <a:rPr lang="de-DE" sz="2000" b="1" dirty="0" smtClean="0">
+                <a:ln>
+                  <a:solidFill>
+                    <a:srgbClr val="7030A0"/>
+                  </a:solidFill>
+                </a:ln>
+                <a:solidFill>
+                  <a:srgbClr val="66FF33"/>
+                </a:solidFill>
+                <a:latin typeface="Courier New" pitchFamily="49" charset="0"/>
+                <a:cs typeface="Courier New" pitchFamily="49" charset="0"/>
+              </a:rPr>
+              <a:t>MOVEMENTS.</a:t>
+            </a:r>
+            <a:endParaRPr lang="de-DE" sz="2000" b="1" dirty="0" smtClean="0">
               <a:ln>
                 <a:solidFill>
                   <a:srgbClr val="7030A0"/>
@@ -4569,57 +6120,6 @@
               <a:latin typeface="Courier New" pitchFamily="49" charset="0"/>
               <a:cs typeface="Courier New" pitchFamily="49" charset="0"/>
             </a:endParaRPr>
-          </a:p>
-          <a:p>
-            <a:r>
-              <a:rPr lang="de-DE" sz="2000" b="1" dirty="0" smtClean="0">
-                <a:ln>
-                  <a:solidFill>
-                    <a:srgbClr val="7030A0"/>
-                  </a:solidFill>
-                </a:ln>
-                <a:solidFill>
-                  <a:srgbClr val="66FF33"/>
-                </a:solidFill>
-                <a:latin typeface="Courier New" pitchFamily="49" charset="0"/>
-                <a:cs typeface="Courier New" pitchFamily="49" charset="0"/>
-              </a:rPr>
-              <a:t>Tau ceti move randomly in circles.</a:t>
-            </a:r>
-          </a:p>
-          <a:p>
-            <a:r>
-              <a:rPr lang="de-DE" sz="2000" b="1" dirty="0" smtClean="0">
-                <a:ln>
-                  <a:solidFill>
-                    <a:srgbClr val="7030A0"/>
-                  </a:solidFill>
-                </a:ln>
-                <a:solidFill>
-                  <a:srgbClr val="66FF33"/>
-                </a:solidFill>
-                <a:latin typeface="Courier New" pitchFamily="49" charset="0"/>
-                <a:cs typeface="Courier New" pitchFamily="49" charset="0"/>
-              </a:rPr>
-              <a:t>So be prepared for any unexpected</a:t>
-            </a:r>
-          </a:p>
-          <a:p>
-            <a:r>
-              <a:rPr lang="de-DE" sz="2000" b="1" dirty="0" smtClean="0">
-                <a:ln>
-                  <a:solidFill>
-                    <a:srgbClr val="7030A0"/>
-                  </a:solidFill>
-                </a:ln>
-                <a:solidFill>
-                  <a:srgbClr val="66FF33"/>
-                </a:solidFill>
-                <a:latin typeface="Courier New" pitchFamily="49" charset="0"/>
-                <a:cs typeface="Courier New" pitchFamily="49" charset="0"/>
-              </a:rPr>
-              <a:t>movements.</a:t>
-            </a:r>
           </a:p>
         </p:txBody>
       </p:sp>
@@ -4804,7 +6304,7 @@
 </p:sld>
 </file>
 
-<file path=ppt/slides/slide6.xml><?xml version="1.0" encoding="utf-8"?>
+<file path=ppt/slides/slide7.xml><?xml version="1.0" encoding="utf-8"?>
 <p:sld xmlns:a="http://schemas.openxmlformats.org/drawingml/2006/main" xmlns:r="http://schemas.openxmlformats.org/officeDocument/2006/relationships" xmlns:p="http://schemas.openxmlformats.org/presentationml/2006/main">
   <p:cSld>
     <p:spTree>
@@ -4821,80 +6321,6 @@
           <a:chExt cx="0" cy="0"/>
         </a:xfrm>
       </p:grpSpPr>
-      <p:sp>
-        <p:nvSpPr>
-          <p:cNvPr id="10" name="Rounded Rectangle 9"/>
-          <p:cNvSpPr/>
-          <p:nvPr/>
-        </p:nvSpPr>
-        <p:spPr>
-          <a:xfrm>
-            <a:off x="537784" y="4365104"/>
-            <a:ext cx="8136904" cy="2088232"/>
-          </a:xfrm>
-          <a:prstGeom prst="roundRect">
-            <a:avLst/>
-          </a:prstGeom>
-          <a:solidFill>
-            <a:srgbClr val="0F001E">
-              <a:alpha val="78000"/>
-            </a:srgbClr>
-          </a:solidFill>
-          <a:ln>
-            <a:noFill/>
-          </a:ln>
-          <a:effectLst>
-            <a:outerShdw blurRad="57785" dist="33020" dir="3180000" algn="ctr">
-              <a:srgbClr val="000000">
-                <a:alpha val="30000"/>
-              </a:srgbClr>
-            </a:outerShdw>
-          </a:effectLst>
-          <a:scene3d>
-            <a:camera prst="orthographicFront">
-              <a:rot lat="0" lon="0" rev="0"/>
-            </a:camera>
-            <a:lightRig rig="brightRoom" dir="t">
-              <a:rot lat="0" lon="0" rev="600000"/>
-            </a:lightRig>
-          </a:scene3d>
-          <a:sp3d prstMaterial="metal">
-            <a:bevelT w="38100" h="57150" prst="angle"/>
-          </a:sp3d>
-        </p:spPr>
-        <p:style>
-          <a:lnRef idx="0">
-            <a:schemeClr val="accent4"/>
-          </a:lnRef>
-          <a:fillRef idx="3">
-            <a:schemeClr val="accent4"/>
-          </a:fillRef>
-          <a:effectRef idx="3">
-            <a:schemeClr val="accent4"/>
-          </a:effectRef>
-          <a:fontRef idx="minor">
-            <a:schemeClr val="lt1"/>
-          </a:fontRef>
-        </p:style>
-        <p:txBody>
-          <a:bodyPr lIns="360000" rtlCol="0" anchor="ctr"/>
-          <a:lstStyle/>
-          <a:p>
-            <a:endParaRPr lang="de-DE" b="1" dirty="0">
-              <a:ln>
-                <a:solidFill>
-                  <a:srgbClr val="7030A0"/>
-                </a:solidFill>
-              </a:ln>
-              <a:solidFill>
-                <a:srgbClr val="66FF33"/>
-              </a:solidFill>
-              <a:latin typeface="Courier New" pitchFamily="49" charset="0"/>
-              <a:cs typeface="Courier New" pitchFamily="49" charset="0"/>
-            </a:endParaRPr>
-          </a:p>
-        </p:txBody>
-      </p:sp>
       <p:sp>
         <p:nvSpPr>
           <p:cNvPr id="9" name="Rounded Rectangle 8"/>
@@ -4967,7 +6393,7 @@
                 <a:latin typeface="Courier New" pitchFamily="49" charset="0"/>
                 <a:cs typeface="Courier New" pitchFamily="49" charset="0"/>
               </a:rPr>
-              <a:t>Avoid collisions with random</a:t>
+              <a:t>AVOID COLLISIONS WITH RANDOM</a:t>
             </a:r>
           </a:p>
           <a:p>
@@ -4984,7 +6410,7 @@
                 <a:latin typeface="Courier New" pitchFamily="49" charset="0"/>
                 <a:cs typeface="Courier New" pitchFamily="49" charset="0"/>
               </a:rPr>
-              <a:t>Planets which you meet in space.</a:t>
+              <a:t>PLANETS WHICH YOU MEET IN SPACE.</a:t>
             </a:r>
           </a:p>
           <a:p>
@@ -5001,7 +6427,7 @@
                 <a:latin typeface="Courier New" pitchFamily="49" charset="0"/>
                 <a:cs typeface="Courier New" pitchFamily="49" charset="0"/>
               </a:rPr>
-              <a:t>Their collision‘s will make a</a:t>
+              <a:t>THEIR COLLISION‘S WILL MAKE A</a:t>
             </a:r>
           </a:p>
           <a:p>
@@ -5018,22 +6444,7 @@
                 <a:latin typeface="Courier New" pitchFamily="49" charset="0"/>
                 <a:cs typeface="Courier New" pitchFamily="49" charset="0"/>
               </a:rPr>
-              <a:t>Lot o</a:t>
-            </a:r>
-            <a:r>
-              <a:rPr lang="de-DE" sz="2000" b="1" dirty="0" smtClean="0">
-                <a:ln>
-                  <a:solidFill>
-                    <a:srgbClr val="7030A0"/>
-                  </a:solidFill>
-                </a:ln>
-                <a:solidFill>
-                  <a:srgbClr val="66FF33"/>
-                </a:solidFill>
-                <a:latin typeface="Courier New" pitchFamily="49" charset="0"/>
-                <a:cs typeface="Courier New" pitchFamily="49" charset="0"/>
-              </a:rPr>
-              <a:t>f damage.</a:t>
+              <a:t>LOT OF DAMAGE.</a:t>
             </a:r>
             <a:endParaRPr lang="de-DE" sz="2000" b="1" dirty="0" smtClean="0">
               <a:ln>
@@ -5185,7 +6596,7 @@
 </p:sld>
 </file>
 
-<file path=ppt/slides/slide7.xml><?xml version="1.0" encoding="utf-8"?>
+<file path=ppt/slides/slide8.xml><?xml version="1.0" encoding="utf-8"?>
 <p:sld xmlns:a="http://schemas.openxmlformats.org/drawingml/2006/main" xmlns:r="http://schemas.openxmlformats.org/officeDocument/2006/relationships" xmlns:p="http://schemas.openxmlformats.org/presentationml/2006/main">
   <p:cSld>
     <p:spTree>
@@ -5274,7 +6685,7 @@
                 <a:latin typeface="Courier New" pitchFamily="49" charset="0"/>
                 <a:cs typeface="Courier New" pitchFamily="49" charset="0"/>
               </a:rPr>
-              <a:t>These rings load your enegy up to 100</a:t>
+              <a:t>THESE RINGS LOAD YOUR ENEGY UP TO 100</a:t>
             </a:r>
           </a:p>
           <a:p>
@@ -5291,7 +6702,7 @@
                 <a:latin typeface="Courier New" pitchFamily="49" charset="0"/>
                 <a:cs typeface="Courier New" pitchFamily="49" charset="0"/>
               </a:rPr>
-              <a:t>If you caught 100 of them then your</a:t>
+              <a:t>IF YOU CAUGHT 100 OF THEM THEN YOUR</a:t>
             </a:r>
           </a:p>
           <a:p>
@@ -5308,8 +6719,20 @@
                 <a:latin typeface="Courier New" pitchFamily="49" charset="0"/>
                 <a:cs typeface="Courier New" pitchFamily="49" charset="0"/>
               </a:rPr>
-              <a:t>Live will increase by +1</a:t>
-            </a:r>
+              <a:t>LIVE WILL INCREASE BY +1</a:t>
+            </a:r>
+            <a:endParaRPr lang="de-DE" sz="1900" b="1" dirty="0" smtClean="0">
+              <a:ln>
+                <a:solidFill>
+                  <a:srgbClr val="7030A0"/>
+                </a:solidFill>
+              </a:ln>
+              <a:solidFill>
+                <a:srgbClr val="66FF33"/>
+              </a:solidFill>
+              <a:latin typeface="Courier New" pitchFamily="49" charset="0"/>
+              <a:cs typeface="Courier New" pitchFamily="49" charset="0"/>
+            </a:endParaRPr>
           </a:p>
         </p:txBody>
       </p:sp>
@@ -5385,7 +6808,7 @@
                 <a:latin typeface="Courier New" pitchFamily="49" charset="0"/>
                 <a:cs typeface="Courier New" pitchFamily="49" charset="0"/>
               </a:rPr>
-              <a:t>During the game you can take damage</a:t>
+              <a:t>DURING THE GAME YOU CAN TAKE DAMAGE</a:t>
             </a:r>
           </a:p>
           <a:p>
@@ -5402,7 +6825,7 @@
                 <a:latin typeface="Courier New" pitchFamily="49" charset="0"/>
                 <a:cs typeface="Courier New" pitchFamily="49" charset="0"/>
               </a:rPr>
-              <a:t>From enemies and obstacles. These</a:t>
+              <a:t>FROM ENEMIES AND OBSTACLES. THESE</a:t>
             </a:r>
           </a:p>
           <a:p>
@@ -5419,7 +6842,7 @@
                 <a:latin typeface="Courier New" pitchFamily="49" charset="0"/>
                 <a:cs typeface="Courier New" pitchFamily="49" charset="0"/>
               </a:rPr>
-              <a:t>Hearts will re-generate a bit of health.</a:t>
+              <a:t>HEARTS WILL RE-GENERATE A BIT OF HEALTH.</a:t>
             </a:r>
             <a:endParaRPr lang="de-DE" sz="1900" b="1" dirty="0" smtClean="0">
               <a:ln>
@@ -5508,7 +6931,7 @@
                 <a:latin typeface="Courier New" pitchFamily="49" charset="0"/>
                 <a:cs typeface="Courier New" pitchFamily="49" charset="0"/>
               </a:rPr>
-              <a:t>You need to catch warp cores to enable</a:t>
+              <a:t>YOU NEED TO CATCH WARP CORES TO ENABLE</a:t>
             </a:r>
           </a:p>
           <a:p>
@@ -5525,7 +6948,7 @@
                 <a:latin typeface="Courier New" pitchFamily="49" charset="0"/>
                 <a:cs typeface="Courier New" pitchFamily="49" charset="0"/>
               </a:rPr>
-              <a:t>your two warp drives to fly faster.</a:t>
+              <a:t>YOUR TWO WARP DRIVES TO FLY FASTER.</a:t>
             </a:r>
           </a:p>
           <a:p>
@@ -5542,8 +6965,20 @@
                 <a:latin typeface="Courier New" pitchFamily="49" charset="0"/>
                 <a:cs typeface="Courier New" pitchFamily="49" charset="0"/>
               </a:rPr>
-              <a:t>Your warp drives overheats from collisions.</a:t>
-            </a:r>
+              <a:t>YOUR WARP DRIVES OVERHEAT FROM COLLISIONS.</a:t>
+            </a:r>
+            <a:endParaRPr lang="de-DE" sz="1900" b="1" dirty="0" smtClean="0">
+              <a:ln>
+                <a:solidFill>
+                  <a:srgbClr val="7030A0"/>
+                </a:solidFill>
+              </a:ln>
+              <a:solidFill>
+                <a:srgbClr val="66FF33"/>
+              </a:solidFill>
+              <a:latin typeface="Courier New" pitchFamily="49" charset="0"/>
+              <a:cs typeface="Courier New" pitchFamily="49" charset="0"/>
+            </a:endParaRPr>
           </a:p>
         </p:txBody>
       </p:sp>
@@ -5756,7 +7191,7 @@
 </p:sld>
 </file>
 
-<file path=ppt/slides/slide8.xml><?xml version="1.0" encoding="utf-8"?>
+<file path=ppt/slides/slide9.xml><?xml version="1.0" encoding="utf-8"?>
 <p:sld xmlns:a="http://schemas.openxmlformats.org/drawingml/2006/main" xmlns:r="http://schemas.openxmlformats.org/officeDocument/2006/relationships" xmlns:p="http://schemas.openxmlformats.org/presentationml/2006/main">
   <p:cSld>
     <p:spTree>
@@ -5773,9 +7208,39 @@
           <a:chExt cx="0" cy="0"/>
         </a:xfrm>
       </p:grpSpPr>
-      <p:sp>
-        <p:nvSpPr>
-          <p:cNvPr id="11" name="Title 1"/>
+      <p:pic>
+        <p:nvPicPr>
+          <p:cNvPr id="4" name="Picture 3"/>
+          <p:cNvPicPr>
+            <a:picLocks noChangeAspect="1"/>
+          </p:cNvPicPr>
+          <p:nvPr/>
+        </p:nvPicPr>
+        <p:blipFill>
+          <a:blip r:embed="rId2">
+            <a:extLst>
+              <a:ext uri="{28A0092B-C50C-407E-A947-70E740481C1C}">
+                <a14:useLocalDpi xmlns:a14="http://schemas.microsoft.com/office/drawing/2010/main" val="0"/>
+              </a:ext>
+            </a:extLst>
+          </a:blip>
+          <a:stretch>
+            <a:fillRect/>
+          </a:stretch>
+        </p:blipFill>
+        <p:spPr>
+          <a:xfrm>
+            <a:off x="0" y="10095"/>
+            <a:ext cx="9144000" cy="6837810"/>
+          </a:xfrm>
+          <a:prstGeom prst="rect">
+            <a:avLst/>
+          </a:prstGeom>
+        </p:spPr>
+      </p:pic>
+      <p:sp>
+        <p:nvSpPr>
+          <p:cNvPr id="5" name="Title 1"/>
           <p:cNvSpPr txBox="1">
             <a:spLocks/>
           </p:cNvSpPr>
@@ -5838,7 +7303,7 @@
                 <a:latin typeface="Courier New" pitchFamily="49" charset="0"/>
                 <a:cs typeface="Courier New" pitchFamily="49" charset="0"/>
               </a:rPr>
-              <a:t>copyrights</a:t>
+              <a:t>IN GAME SCENE</a:t>
             </a:r>
             <a:endParaRPr lang="de-DE" sz="4800" b="1" dirty="0">
               <a:solidFill>
@@ -5850,404 +7315,16 @@
           </a:p>
         </p:txBody>
       </p:sp>
-      <p:sp>
-        <p:nvSpPr>
-          <p:cNvPr id="10" name="Rounded Rectangle 9"/>
-          <p:cNvSpPr/>
-          <p:nvPr/>
-        </p:nvSpPr>
-        <p:spPr>
-          <a:xfrm>
-            <a:off x="683568" y="404664"/>
-            <a:ext cx="7776864" cy="6192688"/>
-          </a:xfrm>
-          <a:prstGeom prst="roundRect">
-            <a:avLst/>
-          </a:prstGeom>
-          <a:ln>
-            <a:noFill/>
-          </a:ln>
-          <a:effectLst>
-            <a:glow>
-              <a:schemeClr val="accent1">
-                <a:alpha val="40000"/>
-              </a:schemeClr>
-            </a:glow>
-            <a:outerShdw blurRad="44450" dist="27940" dir="5400000" algn="ctr">
-              <a:srgbClr val="000000">
-                <a:alpha val="32000"/>
-              </a:srgbClr>
-            </a:outerShdw>
-          </a:effectLst>
-          <a:scene3d>
-            <a:camera prst="perspectiveRelaxedModerately"/>
-            <a:lightRig rig="balanced" dir="t">
-              <a:rot lat="0" lon="0" rev="8700000"/>
-            </a:lightRig>
-          </a:scene3d>
-          <a:sp3d extrusionH="76200">
-            <a:bevelT w="190500" h="38100" prst="angle"/>
-            <a:extrusionClr>
-              <a:schemeClr val="tx1"/>
-            </a:extrusionClr>
-          </a:sp3d>
-        </p:spPr>
-        <p:style>
-          <a:lnRef idx="0">
-            <a:schemeClr val="dk1"/>
-          </a:lnRef>
-          <a:fillRef idx="3">
-            <a:schemeClr val="dk1"/>
-          </a:fillRef>
-          <a:effectRef idx="3">
-            <a:schemeClr val="dk1"/>
-          </a:effectRef>
-          <a:fontRef idx="minor">
-            <a:schemeClr val="lt1"/>
-          </a:fontRef>
-        </p:style>
-        <p:txBody>
-          <a:bodyPr lIns="360000" tIns="72000" rIns="360000" bIns="72000" rtlCol="0" anchor="ctr"/>
-          <a:lstStyle/>
-          <a:p>
-            <a:endParaRPr lang="de-DE" sz="1700" b="1" dirty="0" smtClean="0">
-              <a:solidFill>
-                <a:srgbClr val="66FF33"/>
-              </a:solidFill>
-              <a:latin typeface="Courier New" pitchFamily="49" charset="0"/>
-              <a:cs typeface="Courier New" pitchFamily="49" charset="0"/>
-            </a:endParaRPr>
-          </a:p>
-          <a:p>
-            <a:endParaRPr lang="de-DE" sz="1700" b="1" dirty="0">
-              <a:solidFill>
-                <a:srgbClr val="66FF33"/>
-              </a:solidFill>
-              <a:latin typeface="Courier New" pitchFamily="49" charset="0"/>
-              <a:cs typeface="Courier New" pitchFamily="49" charset="0"/>
-            </a:endParaRPr>
-          </a:p>
-          <a:p>
-            <a:endParaRPr lang="de-DE" sz="1700" b="1" dirty="0">
-              <a:solidFill>
-                <a:srgbClr val="66FF33"/>
-              </a:solidFill>
-              <a:latin typeface="Courier New" pitchFamily="49" charset="0"/>
-              <a:cs typeface="Courier New" pitchFamily="49" charset="0"/>
-            </a:endParaRPr>
-          </a:p>
-          <a:p>
-            <a:r>
-              <a:rPr lang="de-DE" sz="1700" b="1" dirty="0" smtClean="0">
-                <a:solidFill>
-                  <a:srgbClr val="66FF33"/>
-                </a:solidFill>
-                <a:latin typeface="Courier New" pitchFamily="49" charset="0"/>
-                <a:cs typeface="Courier New" pitchFamily="49" charset="0"/>
-              </a:rPr>
-              <a:t>Game by Saman Sedighi Rad, visit: </a:t>
-            </a:r>
-            <a:r>
-              <a:rPr lang="de-DE" sz="1700" b="1" dirty="0" smtClean="0">
-                <a:solidFill>
-                  <a:schemeClr val="accent6">
-                    <a:lumMod val="75000"/>
-                  </a:schemeClr>
-                </a:solidFill>
-                <a:latin typeface="Courier New" pitchFamily="49" charset="0"/>
-                <a:cs typeface="Courier New" pitchFamily="49" charset="0"/>
-                <a:hlinkClick r:id="rId2"/>
-              </a:rPr>
-              <a:t>http://srad.org/spacebit</a:t>
-            </a:r>
-            <a:r>
-              <a:rPr lang="de-DE" sz="1700" b="1" dirty="0" smtClean="0">
-                <a:solidFill>
-                  <a:srgbClr val="66FF33"/>
-                </a:solidFill>
-                <a:latin typeface="Courier New" pitchFamily="49" charset="0"/>
-                <a:cs typeface="Courier New" pitchFamily="49" charset="0"/>
-              </a:rPr>
-              <a:t> for any future development</a:t>
-            </a:r>
-          </a:p>
-          <a:p>
-            <a:endParaRPr lang="de-DE" sz="1700" b="1" dirty="0">
-              <a:solidFill>
-                <a:srgbClr val="66FF33"/>
-              </a:solidFill>
-              <a:latin typeface="Courier New" pitchFamily="49" charset="0"/>
-              <a:cs typeface="Courier New" pitchFamily="49" charset="0"/>
-            </a:endParaRPr>
-          </a:p>
-          <a:p>
-            <a:r>
-              <a:rPr lang="de-DE" sz="1700" b="1" dirty="0" smtClean="0">
-                <a:solidFill>
-                  <a:srgbClr val="66FF33"/>
-                </a:solidFill>
-                <a:latin typeface="Courier New" pitchFamily="49" charset="0"/>
-                <a:cs typeface="Courier New" pitchFamily="49" charset="0"/>
-              </a:rPr>
-              <a:t>Rocket design exclusively provided by Alexander Ansari</a:t>
-            </a:r>
-          </a:p>
-          <a:p>
-            <a:endParaRPr lang="de-DE" sz="1700" b="1" dirty="0">
-              <a:solidFill>
-                <a:srgbClr val="66FF33"/>
-              </a:solidFill>
-              <a:latin typeface="Courier New" pitchFamily="49" charset="0"/>
-              <a:cs typeface="Courier New" pitchFamily="49" charset="0"/>
-            </a:endParaRPr>
-          </a:p>
-          <a:p>
-            <a:r>
-              <a:rPr lang="de-DE" sz="1700" b="1" dirty="0" smtClean="0">
-                <a:solidFill>
-                  <a:srgbClr val="66FF33"/>
-                </a:solidFill>
-                <a:latin typeface="Courier New" pitchFamily="49" charset="0"/>
-                <a:cs typeface="Courier New" pitchFamily="49" charset="0"/>
-              </a:rPr>
-              <a:t>Music </a:t>
-            </a:r>
-            <a:r>
-              <a:rPr lang="en-US" sz="1700" b="1" dirty="0" smtClean="0">
-                <a:solidFill>
-                  <a:srgbClr val="66FF33"/>
-                </a:solidFill>
-                <a:latin typeface="Courier New" pitchFamily="49" charset="0"/>
-                <a:cs typeface="Courier New" pitchFamily="49" charset="0"/>
-              </a:rPr>
-              <a:t>released by 8bitpeoples under creative commons: </a:t>
-            </a:r>
-            <a:r>
-              <a:rPr lang="en-US" sz="1700" b="1" dirty="0" smtClean="0">
-                <a:solidFill>
-                  <a:srgbClr val="66FF33"/>
-                </a:solidFill>
-                <a:latin typeface="Courier New" pitchFamily="49" charset="0"/>
-                <a:cs typeface="Courier New" pitchFamily="49" charset="0"/>
-                <a:hlinkClick r:id="rId3"/>
-              </a:rPr>
-              <a:t>http://8bitpeoples.com</a:t>
-            </a:r>
-            <a:endParaRPr lang="en-US" sz="1700" b="1" dirty="0" smtClean="0">
-              <a:solidFill>
-                <a:srgbClr val="66FF33"/>
-              </a:solidFill>
-              <a:latin typeface="Courier New" pitchFamily="49" charset="0"/>
-              <a:cs typeface="Courier New" pitchFamily="49" charset="0"/>
-            </a:endParaRPr>
-          </a:p>
-          <a:p>
-            <a:endParaRPr lang="en-US" sz="1700" b="1" dirty="0" smtClean="0">
-              <a:solidFill>
-                <a:srgbClr val="66FF33"/>
-              </a:solidFill>
-              <a:latin typeface="Courier New" pitchFamily="49" charset="0"/>
-              <a:cs typeface="Courier New" pitchFamily="49" charset="0"/>
-            </a:endParaRPr>
-          </a:p>
-          <a:p>
-            <a:r>
-              <a:rPr lang="en-US" sz="1700" b="1" dirty="0" smtClean="0">
-                <a:solidFill>
-                  <a:srgbClr val="66FF33"/>
-                </a:solidFill>
-                <a:latin typeface="Courier New" pitchFamily="49" charset="0"/>
-                <a:cs typeface="Courier New" pitchFamily="49" charset="0"/>
-              </a:rPr>
-              <a:t>Ape model: Build in Blender model under BSD license. </a:t>
-            </a:r>
-            <a:r>
-              <a:rPr lang="en-US" sz="1700" b="1" dirty="0" smtClean="0">
-                <a:solidFill>
-                  <a:srgbClr val="66FF33"/>
-                </a:solidFill>
-                <a:latin typeface="Courier New" pitchFamily="49" charset="0"/>
-                <a:cs typeface="Courier New" pitchFamily="49" charset="0"/>
-                <a:hlinkClick r:id="rId4"/>
-              </a:rPr>
-              <a:t>http://blender.org</a:t>
-            </a:r>
-            <a:endParaRPr lang="en-US" sz="1700" b="1" dirty="0" smtClean="0">
-              <a:solidFill>
-                <a:srgbClr val="66FF33"/>
-              </a:solidFill>
-              <a:latin typeface="Courier New" pitchFamily="49" charset="0"/>
-              <a:cs typeface="Courier New" pitchFamily="49" charset="0"/>
-            </a:endParaRPr>
-          </a:p>
-          <a:p>
-            <a:endParaRPr lang="en-US" sz="1700" b="1" dirty="0">
-              <a:solidFill>
-                <a:srgbClr val="66FF33"/>
-              </a:solidFill>
-              <a:latin typeface="Courier New" pitchFamily="49" charset="0"/>
-              <a:cs typeface="Courier New" pitchFamily="49" charset="0"/>
-            </a:endParaRPr>
-          </a:p>
-          <a:p>
-            <a:r>
-              <a:rPr lang="en-US" sz="1700" b="1" dirty="0" smtClean="0">
-                <a:solidFill>
-                  <a:srgbClr val="66FF33"/>
-                </a:solidFill>
-                <a:latin typeface="Courier New" pitchFamily="49" charset="0"/>
-                <a:cs typeface="Courier New" pitchFamily="49" charset="0"/>
-              </a:rPr>
-              <a:t>All other models created and copyright by</a:t>
-            </a:r>
-          </a:p>
-          <a:p>
-            <a:r>
-              <a:rPr lang="en-US" sz="1700" b="1" dirty="0" err="1" smtClean="0">
-                <a:solidFill>
-                  <a:srgbClr val="66FF33"/>
-                </a:solidFill>
-                <a:latin typeface="Courier New" pitchFamily="49" charset="0"/>
-                <a:cs typeface="Courier New" pitchFamily="49" charset="0"/>
-              </a:rPr>
-              <a:t>Saman</a:t>
-            </a:r>
-            <a:r>
-              <a:rPr lang="en-US" sz="1700" b="1" dirty="0" smtClean="0">
-                <a:solidFill>
-                  <a:srgbClr val="66FF33"/>
-                </a:solidFill>
-                <a:latin typeface="Courier New" pitchFamily="49" charset="0"/>
-                <a:cs typeface="Courier New" pitchFamily="49" charset="0"/>
-              </a:rPr>
-              <a:t> </a:t>
-            </a:r>
-            <a:r>
-              <a:rPr lang="en-US" sz="1700" b="1" dirty="0" err="1" smtClean="0">
-                <a:solidFill>
-                  <a:srgbClr val="66FF33"/>
-                </a:solidFill>
-                <a:latin typeface="Courier New" pitchFamily="49" charset="0"/>
-                <a:cs typeface="Courier New" pitchFamily="49" charset="0"/>
-              </a:rPr>
-              <a:t>Sedighi</a:t>
-            </a:r>
-            <a:r>
-              <a:rPr lang="en-US" sz="1700" b="1" dirty="0" smtClean="0">
-                <a:solidFill>
-                  <a:srgbClr val="66FF33"/>
-                </a:solidFill>
-                <a:latin typeface="Courier New" pitchFamily="49" charset="0"/>
-                <a:cs typeface="Courier New" pitchFamily="49" charset="0"/>
-              </a:rPr>
-              <a:t> Rad</a:t>
-            </a:r>
-          </a:p>
-          <a:p>
-            <a:endParaRPr lang="en-US" sz="1700" b="1" dirty="0">
-              <a:solidFill>
-                <a:srgbClr val="66FF33"/>
-              </a:solidFill>
-              <a:latin typeface="Courier New" pitchFamily="49" charset="0"/>
-              <a:cs typeface="Courier New" pitchFamily="49" charset="0"/>
-            </a:endParaRPr>
-          </a:p>
-          <a:p>
-            <a:r>
-              <a:rPr lang="en-US" sz="1700" b="1" dirty="0" smtClean="0">
-                <a:solidFill>
-                  <a:srgbClr val="66FF33"/>
-                </a:solidFill>
-                <a:latin typeface="Courier New" pitchFamily="49" charset="0"/>
-                <a:cs typeface="Courier New" pitchFamily="49" charset="0"/>
-              </a:rPr>
-              <a:t>Game engine provided by </a:t>
-            </a:r>
-            <a:r>
-              <a:rPr lang="en-US" sz="1700" b="1" dirty="0" err="1" smtClean="0">
-                <a:solidFill>
-                  <a:srgbClr val="66FF33"/>
-                </a:solidFill>
-                <a:latin typeface="Courier New" pitchFamily="49" charset="0"/>
-                <a:cs typeface="Courier New" pitchFamily="49" charset="0"/>
-              </a:rPr>
-              <a:t>jMonkeyEngine</a:t>
-            </a:r>
-            <a:r>
-              <a:rPr lang="en-US" sz="1700" b="1" dirty="0" smtClean="0">
-                <a:solidFill>
-                  <a:srgbClr val="66FF33"/>
-                </a:solidFill>
-                <a:latin typeface="Courier New" pitchFamily="49" charset="0"/>
-                <a:cs typeface="Courier New" pitchFamily="49" charset="0"/>
-              </a:rPr>
-              <a:t> (v3): </a:t>
-            </a:r>
-            <a:r>
-              <a:rPr lang="en-US" sz="1700" b="1" dirty="0" smtClean="0">
-                <a:solidFill>
-                  <a:srgbClr val="66FF33"/>
-                </a:solidFill>
-                <a:latin typeface="Courier New" pitchFamily="49" charset="0"/>
-                <a:cs typeface="Courier New" pitchFamily="49" charset="0"/>
-                <a:hlinkClick r:id="rId5"/>
-              </a:rPr>
-              <a:t>http://jmonkeyengine.org</a:t>
-            </a:r>
-            <a:endParaRPr lang="en-US" sz="1700" b="1" dirty="0">
-              <a:solidFill>
-                <a:srgbClr val="66FF33"/>
-              </a:solidFill>
-              <a:latin typeface="Courier New" pitchFamily="49" charset="0"/>
-              <a:cs typeface="Courier New" pitchFamily="49" charset="0"/>
-            </a:endParaRPr>
-          </a:p>
-          <a:p>
-            <a:endParaRPr lang="de-DE" sz="1700" b="1" dirty="0" smtClean="0">
-              <a:solidFill>
-                <a:srgbClr val="66FF33"/>
-              </a:solidFill>
-              <a:latin typeface="Courier New" pitchFamily="49" charset="0"/>
-              <a:cs typeface="Courier New" pitchFamily="49" charset="0"/>
-            </a:endParaRPr>
-          </a:p>
-          <a:p>
-            <a:endParaRPr lang="de-DE" sz="1700" b="1" dirty="0">
-              <a:solidFill>
-                <a:srgbClr val="66FF33"/>
-              </a:solidFill>
-              <a:latin typeface="Courier New" pitchFamily="49" charset="0"/>
-              <a:cs typeface="Courier New" pitchFamily="49" charset="0"/>
-            </a:endParaRPr>
-          </a:p>
-          <a:p>
-            <a:endParaRPr lang="de-DE" sz="1700" b="1" dirty="0">
-              <a:solidFill>
-                <a:srgbClr val="66FF33"/>
-              </a:solidFill>
-              <a:latin typeface="Courier New" pitchFamily="49" charset="0"/>
-              <a:cs typeface="Courier New" pitchFamily="49" charset="0"/>
-            </a:endParaRPr>
-          </a:p>
-        </p:txBody>
-      </p:sp>
     </p:spTree>
     <p:extLst>
       <p:ext uri="{BB962C8B-B14F-4D97-AF65-F5344CB8AC3E}">
-        <p14:creationId xmlns:p14="http://schemas.microsoft.com/office/powerpoint/2010/main" val="2288137917"/>
+        <p14:creationId xmlns:p14="http://schemas.microsoft.com/office/powerpoint/2010/main" val="3486291365"/>
       </p:ext>
     </p:extLst>
   </p:cSld>
   <p:clrMapOvr>
     <a:masterClrMapping/>
   </p:clrMapOvr>
-  <p:timing>
-    <p:tnLst>
-      <p:par>
-        <p:cTn id="1" dur="indefinite" restart="never" nodeType="tmRoot"/>
-      </p:par>
-    </p:tnLst>
-  </p:timing>
 </p:sld>
 </file>
 

</xml_diff>

<commit_message>
* Disabled logging for now * Removed unused resources from project folder
</commit_message>
<xml_diff>
--- a/handbook/SpaceBIT - Handbook.pptx
+++ b/handbook/SpaceBIT - Handbook.pptx
@@ -15,7 +15,8 @@
     <p:sldId id="262" r:id="rId9"/>
     <p:sldId id="264" r:id="rId10"/>
     <p:sldId id="265" r:id="rId11"/>
-    <p:sldId id="263" r:id="rId12"/>
+    <p:sldId id="267" r:id="rId12"/>
+    <p:sldId id="263" r:id="rId13"/>
   </p:sldIdLst>
   <p:sldSz cx="9144000" cy="6858000" type="screen4x3"/>
   <p:notesSz cx="6858000" cy="9144000"/>
@@ -3313,13 +3314,6 @@
               </a:rPr>
               <a:t>CONTROLS</a:t>
             </a:r>
-            <a:endParaRPr lang="de-DE" sz="2000" b="1" dirty="0" smtClean="0">
-              <a:solidFill>
-                <a:srgbClr val="66FF33"/>
-              </a:solidFill>
-              <a:latin typeface="Courier New" pitchFamily="49" charset="0"/>
-              <a:cs typeface="Courier New" pitchFamily="49" charset="0"/>
-            </a:endParaRPr>
           </a:p>
           <a:p>
             <a:pPr marL="457200" indent="-457200">
@@ -3395,13 +3389,6 @@
               </a:rPr>
               <a:t>COPYRIGHTS</a:t>
             </a:r>
-            <a:endParaRPr lang="de-DE" sz="2000" b="1" dirty="0" smtClean="0">
-              <a:solidFill>
-                <a:srgbClr val="66FF33"/>
-              </a:solidFill>
-              <a:latin typeface="Courier New" pitchFamily="49" charset="0"/>
-              <a:cs typeface="Courier New" pitchFamily="49" charset="0"/>
-            </a:endParaRPr>
           </a:p>
         </p:txBody>
       </p:sp>
@@ -3978,6 +3965,207 @@
           <a:chExt cx="0" cy="0"/>
         </a:xfrm>
       </p:grpSpPr>
+      <p:pic>
+        <p:nvPicPr>
+          <p:cNvPr id="1026" name="Picture 2"/>
+          <p:cNvPicPr>
+            <a:picLocks noChangeAspect="1" noChangeArrowheads="1"/>
+          </p:cNvPicPr>
+          <p:nvPr/>
+        </p:nvPicPr>
+        <p:blipFill>
+          <a:blip r:embed="rId2">
+            <a:extLst>
+              <a:ext uri="{28A0092B-C50C-407E-A947-70E740481C1C}">
+                <a14:useLocalDpi xmlns:a14="http://schemas.microsoft.com/office/drawing/2010/main" val="0"/>
+              </a:ext>
+            </a:extLst>
+          </a:blip>
+          <a:srcRect/>
+          <a:stretch>
+            <a:fillRect/>
+          </a:stretch>
+        </p:blipFill>
+        <p:spPr bwMode="auto">
+          <a:xfrm>
+            <a:off x="0" y="0"/>
+            <a:ext cx="9725025" cy="7267575"/>
+          </a:xfrm>
+          <a:prstGeom prst="rect">
+            <a:avLst/>
+          </a:prstGeom>
+          <a:noFill/>
+          <a:ln>
+            <a:noFill/>
+          </a:ln>
+          <a:effectLst/>
+          <a:extLst>
+            <a:ext uri="{909E8E84-426E-40DD-AFC4-6F175D3DCCD1}">
+              <a14:hiddenFill xmlns:a14="http://schemas.microsoft.com/office/drawing/2010/main">
+                <a:solidFill>
+                  <a:schemeClr val="accent1"/>
+                </a:solidFill>
+              </a14:hiddenFill>
+            </a:ext>
+            <a:ext uri="{91240B29-F687-4F45-9708-019B960494DF}">
+              <a14:hiddenLine xmlns:a14="http://schemas.microsoft.com/office/drawing/2010/main" w="9525">
+                <a:solidFill>
+                  <a:schemeClr val="tx1"/>
+                </a:solidFill>
+                <a:miter lim="800000"/>
+                <a:headEnd/>
+                <a:tailEnd/>
+              </a14:hiddenLine>
+            </a:ext>
+            <a:ext uri="{AF507438-7753-43E0-B8FC-AC1667EBCBE1}">
+              <a14:hiddenEffects xmlns:a14="http://schemas.microsoft.com/office/drawing/2010/main">
+                <a:effectLst>
+                  <a:outerShdw dist="35921" dir="2700000" algn="ctr" rotWithShape="0">
+                    <a:schemeClr val="bg2"/>
+                  </a:outerShdw>
+                </a:effectLst>
+              </a14:hiddenEffects>
+            </a:ext>
+          </a:extLst>
+        </p:spPr>
+      </p:pic>
+      <p:sp>
+        <p:nvSpPr>
+          <p:cNvPr id="5" name="Rectangular Callout 4"/>
+          <p:cNvSpPr/>
+          <p:nvPr/>
+        </p:nvSpPr>
+        <p:spPr>
+          <a:xfrm>
+            <a:off x="5940152" y="1268760"/>
+            <a:ext cx="2771800" cy="1224136"/>
+          </a:xfrm>
+          <a:prstGeom prst="wedgeRectCallout">
+            <a:avLst>
+              <a:gd name="adj1" fmla="val -40943"/>
+              <a:gd name="adj2" fmla="val 174397"/>
+            </a:avLst>
+          </a:prstGeom>
+        </p:spPr>
+        <p:style>
+          <a:lnRef idx="1">
+            <a:schemeClr val="dk1"/>
+          </a:lnRef>
+          <a:fillRef idx="3">
+            <a:schemeClr val="dk1"/>
+          </a:fillRef>
+          <a:effectRef idx="2">
+            <a:schemeClr val="dk1"/>
+          </a:effectRef>
+          <a:fontRef idx="minor">
+            <a:schemeClr val="lt1"/>
+          </a:fontRef>
+        </p:style>
+        <p:txBody>
+          <a:bodyPr rtlCol="0" anchor="ctr"/>
+          <a:lstStyle/>
+          <a:p>
+            <a:r>
+              <a:rPr lang="de-DE" sz="1400" b="1" dirty="0" smtClean="0">
+                <a:latin typeface="Courier New" pitchFamily="49" charset="0"/>
+                <a:cs typeface="Courier New" pitchFamily="49" charset="0"/>
+              </a:rPr>
+              <a:t>FOR EVERY WARP CORE YOU PICK UP YOU WARP DRIVES AN THE SIDE WILL BE ACTIVATED AND SPEED YOU UP!</a:t>
+            </a:r>
+            <a:endParaRPr lang="de-DE" sz="1400" b="1" dirty="0" smtClean="0">
+              <a:latin typeface="Courier New" pitchFamily="49" charset="0"/>
+              <a:cs typeface="Courier New" pitchFamily="49" charset="0"/>
+            </a:endParaRPr>
+          </a:p>
+        </p:txBody>
+      </p:sp>
+      <p:sp>
+        <p:nvSpPr>
+          <p:cNvPr id="4" name="Donut 3"/>
+          <p:cNvSpPr/>
+          <p:nvPr/>
+        </p:nvSpPr>
+        <p:spPr>
+          <a:xfrm>
+            <a:off x="5703396" y="4149080"/>
+            <a:ext cx="849973" cy="864096"/>
+          </a:xfrm>
+          <a:prstGeom prst="donut">
+            <a:avLst>
+              <a:gd name="adj" fmla="val 10558"/>
+            </a:avLst>
+          </a:prstGeom>
+          <a:effectLst>
+            <a:glow rad="101600">
+              <a:schemeClr val="accent2">
+                <a:satMod val="175000"/>
+                <a:alpha val="40000"/>
+              </a:schemeClr>
+            </a:glow>
+            <a:outerShdw blurRad="40000" dist="23000" dir="5400000" rotWithShape="0">
+              <a:srgbClr val="000000">
+                <a:alpha val="35000"/>
+              </a:srgbClr>
+            </a:outerShdw>
+          </a:effectLst>
+        </p:spPr>
+        <p:style>
+          <a:lnRef idx="1">
+            <a:schemeClr val="accent3"/>
+          </a:lnRef>
+          <a:fillRef idx="3">
+            <a:schemeClr val="accent3"/>
+          </a:fillRef>
+          <a:effectRef idx="2">
+            <a:schemeClr val="accent3"/>
+          </a:effectRef>
+          <a:fontRef idx="minor">
+            <a:schemeClr val="lt1"/>
+          </a:fontRef>
+        </p:style>
+        <p:txBody>
+          <a:bodyPr rtlCol="0" anchor="ctr"/>
+          <a:lstStyle/>
+          <a:p>
+            <a:pPr algn="ctr"/>
+            <a:endParaRPr lang="de-DE">
+              <a:solidFill>
+                <a:schemeClr val="tx1"/>
+              </a:solidFill>
+            </a:endParaRPr>
+          </a:p>
+        </p:txBody>
+      </p:sp>
+    </p:spTree>
+    <p:extLst>
+      <p:ext uri="{BB962C8B-B14F-4D97-AF65-F5344CB8AC3E}">
+        <p14:creationId xmlns:p14="http://schemas.microsoft.com/office/powerpoint/2010/main" val="123669835"/>
+      </p:ext>
+    </p:extLst>
+  </p:cSld>
+  <p:clrMapOvr>
+    <a:masterClrMapping/>
+  </p:clrMapOvr>
+</p:sld>
+</file>
+
+<file path=ppt/slides/slide12.xml><?xml version="1.0" encoding="utf-8"?>
+<p:sld xmlns:a="http://schemas.openxmlformats.org/drawingml/2006/main" xmlns:r="http://schemas.openxmlformats.org/officeDocument/2006/relationships" xmlns:p="http://schemas.openxmlformats.org/presentationml/2006/main">
+  <p:cSld>
+    <p:spTree>
+      <p:nvGrpSpPr>
+        <p:cNvPr id="1" name=""/>
+        <p:cNvGrpSpPr/>
+        <p:nvPr/>
+      </p:nvGrpSpPr>
+      <p:grpSpPr>
+        <a:xfrm>
+          <a:off x="0" y="0"/>
+          <a:ext cx="0" cy="0"/>
+          <a:chOff x="0" y="0"/>
+          <a:chExt cx="0" cy="0"/>
+        </a:xfrm>
+      </p:grpSpPr>
       <p:sp>
         <p:nvSpPr>
           <p:cNvPr id="11" name="Title 1"/>
@@ -4375,8 +4563,10 @@
                 <a:latin typeface="Courier New" pitchFamily="49" charset="0"/>
                 <a:cs typeface="Courier New" pitchFamily="49" charset="0"/>
               </a:rPr>
-              <a:t>SOUNDS CREATE WITH FAMITRACKER</a:t>
-            </a:r>
+              <a:t>SOUNDS CREATE WITH FAMITRACKER. EXPLOSION SOUND</a:t>
+            </a:r>
+          </a:p>
+          <a:p>
             <a:r>
               <a:rPr lang="en-US" sz="1400" b="1" dirty="0" smtClean="0">
                 <a:solidFill>
@@ -4385,29 +4575,7 @@
                 <a:latin typeface="Courier New" pitchFamily="49" charset="0"/>
                 <a:cs typeface="Courier New" pitchFamily="49" charset="0"/>
               </a:rPr>
-              <a:t>. EXPLOSION SOUND</a:t>
-            </a:r>
-          </a:p>
-          <a:p>
-            <a:r>
-              <a:rPr lang="en-US" sz="1400" b="1" dirty="0" smtClean="0">
-                <a:solidFill>
-                  <a:srgbClr val="66FF33"/>
-                </a:solidFill>
-                <a:latin typeface="Courier New" pitchFamily="49" charset="0"/>
-                <a:cs typeface="Courier New" pitchFamily="49" charset="0"/>
-              </a:rPr>
-              <a:t>WITH </a:t>
-            </a:r>
-            <a:r>
-              <a:rPr lang="en-US" sz="1400" b="1" dirty="0" smtClean="0">
-                <a:solidFill>
-                  <a:srgbClr val="66FF33"/>
-                </a:solidFill>
-                <a:latin typeface="Courier New" pitchFamily="49" charset="0"/>
-                <a:cs typeface="Courier New" pitchFamily="49" charset="0"/>
-              </a:rPr>
-              <a:t>COMMUNITY HELP: </a:t>
+              <a:t>WITH COMMUNITY HELP: </a:t>
             </a:r>
             <a:r>
               <a:rPr lang="en-US" sz="1400" b="1" dirty="0" smtClean="0">
@@ -5590,13 +5758,6 @@
               </a:rPr>
               <a:t>MEANS PRESSING THE KEY „1“ STARTS THE 1ST LEVEL.</a:t>
             </a:r>
-            <a:endParaRPr lang="de-DE" sz="1600" b="1" dirty="0" smtClean="0">
-              <a:solidFill>
-                <a:srgbClr val="66FF33"/>
-              </a:solidFill>
-              <a:latin typeface="Courier New" pitchFamily="49" charset="0"/>
-              <a:cs typeface="Courier New" pitchFamily="49" charset="0"/>
-            </a:endParaRPr>
           </a:p>
           <a:p>
             <a:endParaRPr lang="de-DE" sz="1600" b="1" dirty="0">
@@ -6108,18 +6269,6 @@
               </a:rPr>
               <a:t>MOVEMENTS.</a:t>
             </a:r>
-            <a:endParaRPr lang="de-DE" sz="2000" b="1" dirty="0" smtClean="0">
-              <a:ln>
-                <a:solidFill>
-                  <a:srgbClr val="7030A0"/>
-                </a:solidFill>
-              </a:ln>
-              <a:solidFill>
-                <a:srgbClr val="66FF33"/>
-              </a:solidFill>
-              <a:latin typeface="Courier New" pitchFamily="49" charset="0"/>
-              <a:cs typeface="Courier New" pitchFamily="49" charset="0"/>
-            </a:endParaRPr>
           </a:p>
         </p:txBody>
       </p:sp>
@@ -6446,18 +6595,6 @@
               </a:rPr>
               <a:t>LOT OF DAMAGE.</a:t>
             </a:r>
-            <a:endParaRPr lang="de-DE" sz="2000" b="1" dirty="0" smtClean="0">
-              <a:ln>
-                <a:solidFill>
-                  <a:srgbClr val="7030A0"/>
-                </a:solidFill>
-              </a:ln>
-              <a:solidFill>
-                <a:srgbClr val="66FF33"/>
-              </a:solidFill>
-              <a:latin typeface="Courier New" pitchFamily="49" charset="0"/>
-              <a:cs typeface="Courier New" pitchFamily="49" charset="0"/>
-            </a:endParaRPr>
           </a:p>
         </p:txBody>
       </p:sp>
@@ -6721,18 +6858,6 @@
               </a:rPr>
               <a:t>LIVE WILL INCREASE BY +1</a:t>
             </a:r>
-            <a:endParaRPr lang="de-DE" sz="1900" b="1" dirty="0" smtClean="0">
-              <a:ln>
-                <a:solidFill>
-                  <a:srgbClr val="7030A0"/>
-                </a:solidFill>
-              </a:ln>
-              <a:solidFill>
-                <a:srgbClr val="66FF33"/>
-              </a:solidFill>
-              <a:latin typeface="Courier New" pitchFamily="49" charset="0"/>
-              <a:cs typeface="Courier New" pitchFamily="49" charset="0"/>
-            </a:endParaRPr>
           </a:p>
         </p:txBody>
       </p:sp>
@@ -6844,18 +6969,6 @@
               </a:rPr>
               <a:t>HEARTS WILL RE-GENERATE A BIT OF HEALTH.</a:t>
             </a:r>
-            <a:endParaRPr lang="de-DE" sz="1900" b="1" dirty="0" smtClean="0">
-              <a:ln>
-                <a:solidFill>
-                  <a:srgbClr val="7030A0"/>
-                </a:solidFill>
-              </a:ln>
-              <a:solidFill>
-                <a:srgbClr val="66FF33"/>
-              </a:solidFill>
-              <a:latin typeface="Courier New" pitchFamily="49" charset="0"/>
-              <a:cs typeface="Courier New" pitchFamily="49" charset="0"/>
-            </a:endParaRPr>
           </a:p>
         </p:txBody>
       </p:sp>
@@ -6967,18 +7080,6 @@
               </a:rPr>
               <a:t>YOUR WARP DRIVES OVERHEAT FROM COLLISIONS.</a:t>
             </a:r>
-            <a:endParaRPr lang="de-DE" sz="1900" b="1" dirty="0" smtClean="0">
-              <a:ln>
-                <a:solidFill>
-                  <a:srgbClr val="7030A0"/>
-                </a:solidFill>
-              </a:ln>
-              <a:solidFill>
-                <a:srgbClr val="66FF33"/>
-              </a:solidFill>
-              <a:latin typeface="Courier New" pitchFamily="49" charset="0"/>
-              <a:cs typeface="Courier New" pitchFamily="49" charset="0"/>
-            </a:endParaRPr>
           </a:p>
         </p:txBody>
       </p:sp>

</xml_diff>

<commit_message>
* Adding jme3 libs to project lib folder * Adding log4j to project * Removing old unused listeners * Renaming logger
</commit_message>
<xml_diff>
--- a/handbook/SpaceBIT - Handbook.pptx
+++ b/handbook/SpaceBIT - Handbook.pptx
@@ -299,7 +299,7 @@
           <a:p>
             <a:fld id="{C581432F-93D2-48D5-B81A-4141BD2990AC}" type="datetimeFigureOut">
               <a:rPr lang="de-DE" smtClean="0"/>
-              <a:t>06.07.2012</a:t>
+              <a:t>07.07.2012</a:t>
             </a:fld>
             <a:endParaRPr lang="de-DE"/>
           </a:p>
@@ -469,7 +469,7 @@
           <a:p>
             <a:fld id="{C581432F-93D2-48D5-B81A-4141BD2990AC}" type="datetimeFigureOut">
               <a:rPr lang="de-DE" smtClean="0"/>
-              <a:t>06.07.2012</a:t>
+              <a:t>07.07.2012</a:t>
             </a:fld>
             <a:endParaRPr lang="de-DE"/>
           </a:p>
@@ -649,7 +649,7 @@
           <a:p>
             <a:fld id="{C581432F-93D2-48D5-B81A-4141BD2990AC}" type="datetimeFigureOut">
               <a:rPr lang="de-DE" smtClean="0"/>
-              <a:t>06.07.2012</a:t>
+              <a:t>07.07.2012</a:t>
             </a:fld>
             <a:endParaRPr lang="de-DE"/>
           </a:p>
@@ -819,7 +819,7 @@
           <a:p>
             <a:fld id="{C581432F-93D2-48D5-B81A-4141BD2990AC}" type="datetimeFigureOut">
               <a:rPr lang="de-DE" smtClean="0"/>
-              <a:t>06.07.2012</a:t>
+              <a:t>07.07.2012</a:t>
             </a:fld>
             <a:endParaRPr lang="de-DE"/>
           </a:p>
@@ -1065,7 +1065,7 @@
           <a:p>
             <a:fld id="{C581432F-93D2-48D5-B81A-4141BD2990AC}" type="datetimeFigureOut">
               <a:rPr lang="de-DE" smtClean="0"/>
-              <a:t>06.07.2012</a:t>
+              <a:t>07.07.2012</a:t>
             </a:fld>
             <a:endParaRPr lang="de-DE"/>
           </a:p>
@@ -1353,7 +1353,7 @@
           <a:p>
             <a:fld id="{C581432F-93D2-48D5-B81A-4141BD2990AC}" type="datetimeFigureOut">
               <a:rPr lang="de-DE" smtClean="0"/>
-              <a:t>06.07.2012</a:t>
+              <a:t>07.07.2012</a:t>
             </a:fld>
             <a:endParaRPr lang="de-DE"/>
           </a:p>
@@ -1775,7 +1775,7 @@
           <a:p>
             <a:fld id="{C581432F-93D2-48D5-B81A-4141BD2990AC}" type="datetimeFigureOut">
               <a:rPr lang="de-DE" smtClean="0"/>
-              <a:t>06.07.2012</a:t>
+              <a:t>07.07.2012</a:t>
             </a:fld>
             <a:endParaRPr lang="de-DE"/>
           </a:p>
@@ -1893,7 +1893,7 @@
           <a:p>
             <a:fld id="{C581432F-93D2-48D5-B81A-4141BD2990AC}" type="datetimeFigureOut">
               <a:rPr lang="de-DE" smtClean="0"/>
-              <a:t>06.07.2012</a:t>
+              <a:t>07.07.2012</a:t>
             </a:fld>
             <a:endParaRPr lang="de-DE"/>
           </a:p>
@@ -1988,7 +1988,7 @@
           <a:p>
             <a:fld id="{C581432F-93D2-48D5-B81A-4141BD2990AC}" type="datetimeFigureOut">
               <a:rPr lang="de-DE" smtClean="0"/>
-              <a:t>06.07.2012</a:t>
+              <a:t>07.07.2012</a:t>
             </a:fld>
             <a:endParaRPr lang="de-DE"/>
           </a:p>
@@ -2265,7 +2265,7 @@
           <a:p>
             <a:fld id="{C581432F-93D2-48D5-B81A-4141BD2990AC}" type="datetimeFigureOut">
               <a:rPr lang="de-DE" smtClean="0"/>
-              <a:t>06.07.2012</a:t>
+              <a:t>07.07.2012</a:t>
             </a:fld>
             <a:endParaRPr lang="de-DE"/>
           </a:p>
@@ -2518,7 +2518,7 @@
           <a:p>
             <a:fld id="{C581432F-93D2-48D5-B81A-4141BD2990AC}" type="datetimeFigureOut">
               <a:rPr lang="de-DE" smtClean="0"/>
-              <a:t>06.07.2012</a:t>
+              <a:t>07.07.2012</a:t>
             </a:fld>
             <a:endParaRPr lang="de-DE"/>
           </a:p>
@@ -2740,7 +2740,7 @@
           <a:p>
             <a:fld id="{C581432F-93D2-48D5-B81A-4141BD2990AC}" type="datetimeFigureOut">
               <a:rPr lang="de-DE" smtClean="0"/>
-              <a:t>06.07.2012</a:t>
+              <a:t>07.07.2012</a:t>
             </a:fld>
             <a:endParaRPr lang="de-DE"/>
           </a:p>
@@ -3127,7 +3127,7 @@
           <a:blip r:embed="rId2">
             <a:extLst>
               <a:ext uri="{28A0092B-C50C-407E-A947-70E740481C1C}">
-                <a14:useLocalDpi xmlns:a14="http://schemas.microsoft.com/office/drawing/2010/main" val="0"/>
+                <a14:useLocalDpi xmlns:a14="http://schemas.microsoft.com/office/drawing/2010/main"/>
               </a:ext>
             </a:extLst>
           </a:blip>
@@ -3157,7 +3157,7 @@
           <a:blip r:embed="rId3">
             <a:extLst>
               <a:ext uri="{28A0092B-C50C-407E-A947-70E740481C1C}">
-                <a14:useLocalDpi xmlns:a14="http://schemas.microsoft.com/office/drawing/2010/main" val="0"/>
+                <a14:useLocalDpi xmlns:a14="http://schemas.microsoft.com/office/drawing/2010/main"/>
               </a:ext>
             </a:extLst>
           </a:blip>
@@ -3441,7 +3441,7 @@
           <a:blip r:embed="rId2">
             <a:extLst>
               <a:ext uri="{28A0092B-C50C-407E-A947-70E740481C1C}">
-                <a14:useLocalDpi xmlns:a14="http://schemas.microsoft.com/office/drawing/2010/main" val="0"/>
+                <a14:useLocalDpi xmlns:a14="http://schemas.microsoft.com/office/drawing/2010/main"/>
               </a:ext>
             </a:extLst>
           </a:blip>
@@ -3977,7 +3977,7 @@
           <a:blip r:embed="rId2">
             <a:extLst>
               <a:ext uri="{28A0092B-C50C-407E-A947-70E740481C1C}">
-                <a14:useLocalDpi xmlns:a14="http://schemas.microsoft.com/office/drawing/2010/main" val="0"/>
+                <a14:useLocalDpi xmlns:a14="http://schemas.microsoft.com/office/drawing/2010/main"/>
               </a:ext>
             </a:extLst>
           </a:blip>
@@ -4072,10 +4072,6 @@
               </a:rPr>
               <a:t>FOR EVERY WARP CORE YOU PICK UP YOU WARP DRIVES AN THE SIDE WILL BE ACTIVATED AND SPEED YOU UP!</a:t>
             </a:r>
-            <a:endParaRPr lang="de-DE" sz="1400" b="1" dirty="0" smtClean="0">
-              <a:latin typeface="Courier New" pitchFamily="49" charset="0"/>
-              <a:cs typeface="Courier New" pitchFamily="49" charset="0"/>
-            </a:endParaRPr>
           </a:p>
         </p:txBody>
       </p:sp>
@@ -6281,7 +6277,7 @@
           <p:nvPr/>
         </p:nvPicPr>
         <p:blipFill>
-          <a:blip r:embed="rId2">
+          <a:blip r:embed="rId2" cstate="screen">
             <a:extLst>
               <a:ext uri="{BEBA8EAE-BF5A-486C-A8C5-ECC9F3942E4B}">
                 <a14:imgProps xmlns:a14="http://schemas.microsoft.com/office/drawing/2010/main">
@@ -6293,7 +6289,7 @@
                 </a14:imgProps>
               </a:ext>
               <a:ext uri="{28A0092B-C50C-407E-A947-70E740481C1C}">
-                <a14:useLocalDpi xmlns:a14="http://schemas.microsoft.com/office/drawing/2010/main" val="0"/>
+                <a14:useLocalDpi xmlns:a14="http://schemas.microsoft.com/office/drawing/2010/main"/>
               </a:ext>
             </a:extLst>
           </a:blip>
@@ -6330,7 +6326,7 @@
           <a:blip r:embed="rId4">
             <a:extLst>
               <a:ext uri="{28A0092B-C50C-407E-A947-70E740481C1C}">
-                <a14:useLocalDpi xmlns:a14="http://schemas.microsoft.com/office/drawing/2010/main" val="0"/>
+                <a14:useLocalDpi xmlns:a14="http://schemas.microsoft.com/office/drawing/2010/main"/>
               </a:ext>
             </a:extLst>
           </a:blip>
@@ -6607,10 +6603,10 @@
           <p:nvPr/>
         </p:nvPicPr>
         <p:blipFill>
-          <a:blip r:embed="rId2">
+          <a:blip r:embed="rId2" cstate="screen">
             <a:extLst>
               <a:ext uri="{28A0092B-C50C-407E-A947-70E740481C1C}">
-                <a14:useLocalDpi xmlns:a14="http://schemas.microsoft.com/office/drawing/2010/main" val="0"/>
+                <a14:useLocalDpi xmlns:a14="http://schemas.microsoft.com/office/drawing/2010/main"/>
               </a:ext>
             </a:extLst>
           </a:blip>
@@ -7169,10 +7165,10 @@
           <p:nvPr/>
         </p:nvPicPr>
         <p:blipFill>
-          <a:blip r:embed="rId2" cstate="print">
+          <a:blip r:embed="rId2" cstate="screen">
             <a:extLst>
               <a:ext uri="{28A0092B-C50C-407E-A947-70E740481C1C}">
-                <a14:useLocalDpi xmlns:a14="http://schemas.microsoft.com/office/drawing/2010/main" val="0"/>
+                <a14:useLocalDpi xmlns:a14="http://schemas.microsoft.com/office/drawing/2010/main"/>
               </a:ext>
             </a:extLst>
           </a:blip>
@@ -7207,10 +7203,10 @@
           <p:nvPr/>
         </p:nvPicPr>
         <p:blipFill>
-          <a:blip r:embed="rId3" cstate="print">
+          <a:blip r:embed="rId3" cstate="screen">
             <a:extLst>
               <a:ext uri="{28A0092B-C50C-407E-A947-70E740481C1C}">
-                <a14:useLocalDpi xmlns:a14="http://schemas.microsoft.com/office/drawing/2010/main" val="0"/>
+                <a14:useLocalDpi xmlns:a14="http://schemas.microsoft.com/office/drawing/2010/main"/>
               </a:ext>
             </a:extLst>
           </a:blip>
@@ -7244,10 +7240,10 @@
           <p:nvPr/>
         </p:nvPicPr>
         <p:blipFill>
-          <a:blip r:embed="rId4" cstate="print">
+          <a:blip r:embed="rId4" cstate="screen">
             <a:extLst>
               <a:ext uri="{28A0092B-C50C-407E-A947-70E740481C1C}">
-                <a14:useLocalDpi xmlns:a14="http://schemas.microsoft.com/office/drawing/2010/main" val="0"/>
+                <a14:useLocalDpi xmlns:a14="http://schemas.microsoft.com/office/drawing/2010/main"/>
               </a:ext>
             </a:extLst>
           </a:blip>
@@ -7321,7 +7317,7 @@
           <a:blip r:embed="rId2">
             <a:extLst>
               <a:ext uri="{28A0092B-C50C-407E-A947-70E740481C1C}">
-                <a14:useLocalDpi xmlns:a14="http://schemas.microsoft.com/office/drawing/2010/main" val="0"/>
+                <a14:useLocalDpi xmlns:a14="http://schemas.microsoft.com/office/drawing/2010/main"/>
               </a:ext>
             </a:extLst>
           </a:blip>

</xml_diff>

<commit_message>
* Moving design resources to the "resources" folder * Removing netbeans stuff * Adding prerendered lighting for planets and warp cores
</commit_message>
<xml_diff>
--- a/handbook/SpaceBIT - Handbook.pptx
+++ b/handbook/SpaceBIT - Handbook.pptx
@@ -4,6 +4,9 @@
   <p:sldMasterIdLst>
     <p:sldMasterId id="2147483648" r:id="rId1"/>
   </p:sldMasterIdLst>
+  <p:notesMasterIdLst>
+    <p:notesMasterId r:id="rId14"/>
+  </p:notesMasterIdLst>
   <p:sldIdLst>
     <p:sldId id="256" r:id="rId2"/>
     <p:sldId id="257" r:id="rId3"/>
@@ -118,6 +121,440 @@
 </p:presentation>
 </file>
 
+<file path=ppt/notesMasters/notesMaster1.xml><?xml version="1.0" encoding="utf-8"?>
+<p:notesMaster xmlns:a="http://schemas.openxmlformats.org/drawingml/2006/main" xmlns:r="http://schemas.openxmlformats.org/officeDocument/2006/relationships" xmlns:p="http://schemas.openxmlformats.org/presentationml/2006/main">
+  <p:cSld>
+    <p:bg>
+      <p:bgRef idx="1001">
+        <a:schemeClr val="bg1"/>
+      </p:bgRef>
+    </p:bg>
+    <p:spTree>
+      <p:nvGrpSpPr>
+        <p:cNvPr id="1" name=""/>
+        <p:cNvGrpSpPr/>
+        <p:nvPr/>
+      </p:nvGrpSpPr>
+      <p:grpSpPr>
+        <a:xfrm>
+          <a:off x="0" y="0"/>
+          <a:ext cx="0" cy="0"/>
+          <a:chOff x="0" y="0"/>
+          <a:chExt cx="0" cy="0"/>
+        </a:xfrm>
+      </p:grpSpPr>
+      <p:sp>
+        <p:nvSpPr>
+          <p:cNvPr id="2" name="Header Placeholder 1"/>
+          <p:cNvSpPr>
+            <a:spLocks noGrp="1"/>
+          </p:cNvSpPr>
+          <p:nvPr>
+            <p:ph type="hdr" sz="quarter"/>
+          </p:nvPr>
+        </p:nvSpPr>
+        <p:spPr>
+          <a:xfrm>
+            <a:off x="0" y="0"/>
+            <a:ext cx="2971800" cy="457200"/>
+          </a:xfrm>
+          <a:prstGeom prst="rect">
+            <a:avLst/>
+          </a:prstGeom>
+        </p:spPr>
+        <p:txBody>
+          <a:bodyPr vert="horz" lIns="91440" tIns="45720" rIns="91440" bIns="45720" rtlCol="0"/>
+          <a:lstStyle>
+            <a:lvl1pPr algn="l">
+              <a:defRPr sz="1200"/>
+            </a:lvl1pPr>
+          </a:lstStyle>
+          <a:p>
+            <a:endParaRPr lang="de-DE"/>
+          </a:p>
+        </p:txBody>
+      </p:sp>
+      <p:sp>
+        <p:nvSpPr>
+          <p:cNvPr id="3" name="Date Placeholder 2"/>
+          <p:cNvSpPr>
+            <a:spLocks noGrp="1"/>
+          </p:cNvSpPr>
+          <p:nvPr>
+            <p:ph type="dt" idx="1"/>
+          </p:nvPr>
+        </p:nvSpPr>
+        <p:spPr>
+          <a:xfrm>
+            <a:off x="3884613" y="0"/>
+            <a:ext cx="2971800" cy="457200"/>
+          </a:xfrm>
+          <a:prstGeom prst="rect">
+            <a:avLst/>
+          </a:prstGeom>
+        </p:spPr>
+        <p:txBody>
+          <a:bodyPr vert="horz" lIns="91440" tIns="45720" rIns="91440" bIns="45720" rtlCol="0"/>
+          <a:lstStyle>
+            <a:lvl1pPr algn="r">
+              <a:defRPr sz="1200"/>
+            </a:lvl1pPr>
+          </a:lstStyle>
+          <a:p>
+            <a:fld id="{0128B02E-3E6C-489E-B0A9-A5B93F6C11FC}" type="datetimeFigureOut">
+              <a:rPr lang="de-DE" smtClean="0"/>
+              <a:t>12.07.2012</a:t>
+            </a:fld>
+            <a:endParaRPr lang="de-DE"/>
+          </a:p>
+        </p:txBody>
+      </p:sp>
+      <p:sp>
+        <p:nvSpPr>
+          <p:cNvPr id="4" name="Slide Image Placeholder 3"/>
+          <p:cNvSpPr>
+            <a:spLocks noGrp="1" noRot="1" noChangeAspect="1"/>
+          </p:cNvSpPr>
+          <p:nvPr>
+            <p:ph type="sldImg" idx="2"/>
+          </p:nvPr>
+        </p:nvSpPr>
+        <p:spPr>
+          <a:xfrm>
+            <a:off x="1143000" y="685800"/>
+            <a:ext cx="4572000" cy="3429000"/>
+          </a:xfrm>
+          <a:prstGeom prst="rect">
+            <a:avLst/>
+          </a:prstGeom>
+          <a:noFill/>
+          <a:ln w="12700">
+            <a:solidFill>
+              <a:prstClr val="black"/>
+            </a:solidFill>
+          </a:ln>
+        </p:spPr>
+        <p:txBody>
+          <a:bodyPr vert="horz" lIns="91440" tIns="45720" rIns="91440" bIns="45720" rtlCol="0" anchor="ctr"/>
+          <a:lstStyle/>
+          <a:p>
+            <a:endParaRPr lang="de-DE"/>
+          </a:p>
+        </p:txBody>
+      </p:sp>
+      <p:sp>
+        <p:nvSpPr>
+          <p:cNvPr id="5" name="Notes Placeholder 4"/>
+          <p:cNvSpPr>
+            <a:spLocks noGrp="1"/>
+          </p:cNvSpPr>
+          <p:nvPr>
+            <p:ph type="body" sz="quarter" idx="3"/>
+          </p:nvPr>
+        </p:nvSpPr>
+        <p:spPr>
+          <a:xfrm>
+            <a:off x="685800" y="4343400"/>
+            <a:ext cx="5486400" cy="4114800"/>
+          </a:xfrm>
+          <a:prstGeom prst="rect">
+            <a:avLst/>
+          </a:prstGeom>
+        </p:spPr>
+        <p:txBody>
+          <a:bodyPr vert="horz" lIns="91440" tIns="45720" rIns="91440" bIns="45720" rtlCol="0"/>
+          <a:lstStyle/>
+          <a:p>
+            <a:pPr lvl="0"/>
+            <a:r>
+              <a:rPr lang="en-US" smtClean="0"/>
+              <a:t>Click to edit Master text styles</a:t>
+            </a:r>
+          </a:p>
+          <a:p>
+            <a:pPr lvl="1"/>
+            <a:r>
+              <a:rPr lang="en-US" smtClean="0"/>
+              <a:t>Second level</a:t>
+            </a:r>
+          </a:p>
+          <a:p>
+            <a:pPr lvl="2"/>
+            <a:r>
+              <a:rPr lang="en-US" smtClean="0"/>
+              <a:t>Third level</a:t>
+            </a:r>
+          </a:p>
+          <a:p>
+            <a:pPr lvl="3"/>
+            <a:r>
+              <a:rPr lang="en-US" smtClean="0"/>
+              <a:t>Fourth level</a:t>
+            </a:r>
+          </a:p>
+          <a:p>
+            <a:pPr lvl="4"/>
+            <a:r>
+              <a:rPr lang="en-US" smtClean="0"/>
+              <a:t>Fifth level</a:t>
+            </a:r>
+            <a:endParaRPr lang="de-DE"/>
+          </a:p>
+        </p:txBody>
+      </p:sp>
+      <p:sp>
+        <p:nvSpPr>
+          <p:cNvPr id="6" name="Footer Placeholder 5"/>
+          <p:cNvSpPr>
+            <a:spLocks noGrp="1"/>
+          </p:cNvSpPr>
+          <p:nvPr>
+            <p:ph type="ftr" sz="quarter" idx="4"/>
+          </p:nvPr>
+        </p:nvSpPr>
+        <p:spPr>
+          <a:xfrm>
+            <a:off x="0" y="8685213"/>
+            <a:ext cx="2971800" cy="457200"/>
+          </a:xfrm>
+          <a:prstGeom prst="rect">
+            <a:avLst/>
+          </a:prstGeom>
+        </p:spPr>
+        <p:txBody>
+          <a:bodyPr vert="horz" lIns="91440" tIns="45720" rIns="91440" bIns="45720" rtlCol="0" anchor="b"/>
+          <a:lstStyle>
+            <a:lvl1pPr algn="l">
+              <a:defRPr sz="1200"/>
+            </a:lvl1pPr>
+          </a:lstStyle>
+          <a:p>
+            <a:endParaRPr lang="de-DE"/>
+          </a:p>
+        </p:txBody>
+      </p:sp>
+      <p:sp>
+        <p:nvSpPr>
+          <p:cNvPr id="7" name="Slide Number Placeholder 6"/>
+          <p:cNvSpPr>
+            <a:spLocks noGrp="1"/>
+          </p:cNvSpPr>
+          <p:nvPr>
+            <p:ph type="sldNum" sz="quarter" idx="5"/>
+          </p:nvPr>
+        </p:nvSpPr>
+        <p:spPr>
+          <a:xfrm>
+            <a:off x="3884613" y="8685213"/>
+            <a:ext cx="2971800" cy="457200"/>
+          </a:xfrm>
+          <a:prstGeom prst="rect">
+            <a:avLst/>
+          </a:prstGeom>
+        </p:spPr>
+        <p:txBody>
+          <a:bodyPr vert="horz" lIns="91440" tIns="45720" rIns="91440" bIns="45720" rtlCol="0" anchor="b"/>
+          <a:lstStyle>
+            <a:lvl1pPr algn="r">
+              <a:defRPr sz="1200"/>
+            </a:lvl1pPr>
+          </a:lstStyle>
+          <a:p>
+            <a:fld id="{6CBE5226-D3F2-424D-B5BE-3897B159B114}" type="slidenum">
+              <a:rPr lang="de-DE" smtClean="0"/>
+              <a:t>‹#›</a:t>
+            </a:fld>
+            <a:endParaRPr lang="de-DE"/>
+          </a:p>
+        </p:txBody>
+      </p:sp>
+    </p:spTree>
+    <p:extLst>
+      <p:ext uri="{BB962C8B-B14F-4D97-AF65-F5344CB8AC3E}">
+        <p14:creationId xmlns:p14="http://schemas.microsoft.com/office/powerpoint/2010/main" val="4083646100"/>
+      </p:ext>
+    </p:extLst>
+  </p:cSld>
+  <p:clrMap bg1="lt1" tx1="dk1" bg2="lt2" tx2="dk2" accent1="accent1" accent2="accent2" accent3="accent3" accent4="accent4" accent5="accent5" accent6="accent6" hlink="hlink" folHlink="folHlink"/>
+  <p:notesStyle>
+    <a:lvl1pPr marL="0" algn="l" defTabSz="914400" rtl="0" eaLnBrk="1" latinLnBrk="0" hangingPunct="1">
+      <a:defRPr sz="1200" kern="1200">
+        <a:solidFill>
+          <a:schemeClr val="tx1"/>
+        </a:solidFill>
+        <a:latin typeface="+mn-lt"/>
+        <a:ea typeface="+mn-ea"/>
+        <a:cs typeface="+mn-cs"/>
+      </a:defRPr>
+    </a:lvl1pPr>
+    <a:lvl2pPr marL="457200" algn="l" defTabSz="914400" rtl="0" eaLnBrk="1" latinLnBrk="0" hangingPunct="1">
+      <a:defRPr sz="1200" kern="1200">
+        <a:solidFill>
+          <a:schemeClr val="tx1"/>
+        </a:solidFill>
+        <a:latin typeface="+mn-lt"/>
+        <a:ea typeface="+mn-ea"/>
+        <a:cs typeface="+mn-cs"/>
+      </a:defRPr>
+    </a:lvl2pPr>
+    <a:lvl3pPr marL="914400" algn="l" defTabSz="914400" rtl="0" eaLnBrk="1" latinLnBrk="0" hangingPunct="1">
+      <a:defRPr sz="1200" kern="1200">
+        <a:solidFill>
+          <a:schemeClr val="tx1"/>
+        </a:solidFill>
+        <a:latin typeface="+mn-lt"/>
+        <a:ea typeface="+mn-ea"/>
+        <a:cs typeface="+mn-cs"/>
+      </a:defRPr>
+    </a:lvl3pPr>
+    <a:lvl4pPr marL="1371600" algn="l" defTabSz="914400" rtl="0" eaLnBrk="1" latinLnBrk="0" hangingPunct="1">
+      <a:defRPr sz="1200" kern="1200">
+        <a:solidFill>
+          <a:schemeClr val="tx1"/>
+        </a:solidFill>
+        <a:latin typeface="+mn-lt"/>
+        <a:ea typeface="+mn-ea"/>
+        <a:cs typeface="+mn-cs"/>
+      </a:defRPr>
+    </a:lvl4pPr>
+    <a:lvl5pPr marL="1828800" algn="l" defTabSz="914400" rtl="0" eaLnBrk="1" latinLnBrk="0" hangingPunct="1">
+      <a:defRPr sz="1200" kern="1200">
+        <a:solidFill>
+          <a:schemeClr val="tx1"/>
+        </a:solidFill>
+        <a:latin typeface="+mn-lt"/>
+        <a:ea typeface="+mn-ea"/>
+        <a:cs typeface="+mn-cs"/>
+      </a:defRPr>
+    </a:lvl5pPr>
+    <a:lvl6pPr marL="2286000" algn="l" defTabSz="914400" rtl="0" eaLnBrk="1" latinLnBrk="0" hangingPunct="1">
+      <a:defRPr sz="1200" kern="1200">
+        <a:solidFill>
+          <a:schemeClr val="tx1"/>
+        </a:solidFill>
+        <a:latin typeface="+mn-lt"/>
+        <a:ea typeface="+mn-ea"/>
+        <a:cs typeface="+mn-cs"/>
+      </a:defRPr>
+    </a:lvl6pPr>
+    <a:lvl7pPr marL="2743200" algn="l" defTabSz="914400" rtl="0" eaLnBrk="1" latinLnBrk="0" hangingPunct="1">
+      <a:defRPr sz="1200" kern="1200">
+        <a:solidFill>
+          <a:schemeClr val="tx1"/>
+        </a:solidFill>
+        <a:latin typeface="+mn-lt"/>
+        <a:ea typeface="+mn-ea"/>
+        <a:cs typeface="+mn-cs"/>
+      </a:defRPr>
+    </a:lvl7pPr>
+    <a:lvl8pPr marL="3200400" algn="l" defTabSz="914400" rtl="0" eaLnBrk="1" latinLnBrk="0" hangingPunct="1">
+      <a:defRPr sz="1200" kern="1200">
+        <a:solidFill>
+          <a:schemeClr val="tx1"/>
+        </a:solidFill>
+        <a:latin typeface="+mn-lt"/>
+        <a:ea typeface="+mn-ea"/>
+        <a:cs typeface="+mn-cs"/>
+      </a:defRPr>
+    </a:lvl8pPr>
+    <a:lvl9pPr marL="3657600" algn="l" defTabSz="914400" rtl="0" eaLnBrk="1" latinLnBrk="0" hangingPunct="1">
+      <a:defRPr sz="1200" kern="1200">
+        <a:solidFill>
+          <a:schemeClr val="tx1"/>
+        </a:solidFill>
+        <a:latin typeface="+mn-lt"/>
+        <a:ea typeface="+mn-ea"/>
+        <a:cs typeface="+mn-cs"/>
+      </a:defRPr>
+    </a:lvl9pPr>
+  </p:notesStyle>
+</p:notesMaster>
+</file>
+
+<file path=ppt/notesSlides/notesSlide1.xml><?xml version="1.0" encoding="utf-8"?>
+<p:notes xmlns:a="http://schemas.openxmlformats.org/drawingml/2006/main" xmlns:r="http://schemas.openxmlformats.org/officeDocument/2006/relationships" xmlns:p="http://schemas.openxmlformats.org/presentationml/2006/main">
+  <p:cSld>
+    <p:spTree>
+      <p:nvGrpSpPr>
+        <p:cNvPr id="1" name=""/>
+        <p:cNvGrpSpPr/>
+        <p:nvPr/>
+      </p:nvGrpSpPr>
+      <p:grpSpPr>
+        <a:xfrm>
+          <a:off x="0" y="0"/>
+          <a:ext cx="0" cy="0"/>
+          <a:chOff x="0" y="0"/>
+          <a:chExt cx="0" cy="0"/>
+        </a:xfrm>
+      </p:grpSpPr>
+      <p:sp>
+        <p:nvSpPr>
+          <p:cNvPr id="2" name="Slide Image Placeholder 1"/>
+          <p:cNvSpPr>
+            <a:spLocks noGrp="1" noRot="1" noChangeAspect="1"/>
+          </p:cNvSpPr>
+          <p:nvPr>
+            <p:ph type="sldImg"/>
+          </p:nvPr>
+        </p:nvSpPr>
+        <p:spPr/>
+      </p:sp>
+      <p:sp>
+        <p:nvSpPr>
+          <p:cNvPr id="3" name="Notes Placeholder 2"/>
+          <p:cNvSpPr>
+            <a:spLocks noGrp="1"/>
+          </p:cNvSpPr>
+          <p:nvPr>
+            <p:ph type="body" idx="1"/>
+          </p:nvPr>
+        </p:nvSpPr>
+        <p:spPr/>
+        <p:txBody>
+          <a:bodyPr/>
+          <a:lstStyle/>
+          <a:p>
+            <a:endParaRPr lang="de-DE" dirty="0"/>
+          </a:p>
+        </p:txBody>
+      </p:sp>
+      <p:sp>
+        <p:nvSpPr>
+          <p:cNvPr id="4" name="Slide Number Placeholder 3"/>
+          <p:cNvSpPr>
+            <a:spLocks noGrp="1"/>
+          </p:cNvSpPr>
+          <p:nvPr>
+            <p:ph type="sldNum" sz="quarter" idx="10"/>
+          </p:nvPr>
+        </p:nvSpPr>
+        <p:spPr/>
+        <p:txBody>
+          <a:bodyPr/>
+          <a:lstStyle/>
+          <a:p>
+            <a:fld id="{6CBE5226-D3F2-424D-B5BE-3897B159B114}" type="slidenum">
+              <a:rPr lang="de-DE" smtClean="0"/>
+              <a:t>10</a:t>
+            </a:fld>
+            <a:endParaRPr lang="de-DE"/>
+          </a:p>
+        </p:txBody>
+      </p:sp>
+    </p:spTree>
+    <p:extLst>
+      <p:ext uri="{BB962C8B-B14F-4D97-AF65-F5344CB8AC3E}">
+        <p14:creationId xmlns:p14="http://schemas.microsoft.com/office/powerpoint/2010/main" val="2579883155"/>
+      </p:ext>
+    </p:extLst>
+  </p:cSld>
+  <p:clrMapOvr>
+    <a:masterClrMapping/>
+  </p:clrMapOvr>
+</p:notes>
+</file>
+
 <file path=ppt/slideLayouts/slideLayout1.xml><?xml version="1.0" encoding="utf-8"?>
 <p:sldLayout xmlns:a="http://schemas.openxmlformats.org/drawingml/2006/main" xmlns:r="http://schemas.openxmlformats.org/officeDocument/2006/relationships" xmlns:p="http://schemas.openxmlformats.org/presentationml/2006/main" type="title" preserve="1">
   <p:cSld name="Title Slide">
@@ -299,7 +736,7 @@
           <a:p>
             <a:fld id="{C581432F-93D2-48D5-B81A-4141BD2990AC}" type="datetimeFigureOut">
               <a:rPr lang="de-DE" smtClean="0"/>
-              <a:t>07.07.2012</a:t>
+              <a:t>12.07.2012</a:t>
             </a:fld>
             <a:endParaRPr lang="de-DE"/>
           </a:p>
@@ -469,7 +906,7 @@
           <a:p>
             <a:fld id="{C581432F-93D2-48D5-B81A-4141BD2990AC}" type="datetimeFigureOut">
               <a:rPr lang="de-DE" smtClean="0"/>
-              <a:t>07.07.2012</a:t>
+              <a:t>12.07.2012</a:t>
             </a:fld>
             <a:endParaRPr lang="de-DE"/>
           </a:p>
@@ -649,7 +1086,7 @@
           <a:p>
             <a:fld id="{C581432F-93D2-48D5-B81A-4141BD2990AC}" type="datetimeFigureOut">
               <a:rPr lang="de-DE" smtClean="0"/>
-              <a:t>07.07.2012</a:t>
+              <a:t>12.07.2012</a:t>
             </a:fld>
             <a:endParaRPr lang="de-DE"/>
           </a:p>
@@ -819,7 +1256,7 @@
           <a:p>
             <a:fld id="{C581432F-93D2-48D5-B81A-4141BD2990AC}" type="datetimeFigureOut">
               <a:rPr lang="de-DE" smtClean="0"/>
-              <a:t>07.07.2012</a:t>
+              <a:t>12.07.2012</a:t>
             </a:fld>
             <a:endParaRPr lang="de-DE"/>
           </a:p>
@@ -1065,7 +1502,7 @@
           <a:p>
             <a:fld id="{C581432F-93D2-48D5-B81A-4141BD2990AC}" type="datetimeFigureOut">
               <a:rPr lang="de-DE" smtClean="0"/>
-              <a:t>07.07.2012</a:t>
+              <a:t>12.07.2012</a:t>
             </a:fld>
             <a:endParaRPr lang="de-DE"/>
           </a:p>
@@ -1353,7 +1790,7 @@
           <a:p>
             <a:fld id="{C581432F-93D2-48D5-B81A-4141BD2990AC}" type="datetimeFigureOut">
               <a:rPr lang="de-DE" smtClean="0"/>
-              <a:t>07.07.2012</a:t>
+              <a:t>12.07.2012</a:t>
             </a:fld>
             <a:endParaRPr lang="de-DE"/>
           </a:p>
@@ -1775,7 +2212,7 @@
           <a:p>
             <a:fld id="{C581432F-93D2-48D5-B81A-4141BD2990AC}" type="datetimeFigureOut">
               <a:rPr lang="de-DE" smtClean="0"/>
-              <a:t>07.07.2012</a:t>
+              <a:t>12.07.2012</a:t>
             </a:fld>
             <a:endParaRPr lang="de-DE"/>
           </a:p>
@@ -1893,7 +2330,7 @@
           <a:p>
             <a:fld id="{C581432F-93D2-48D5-B81A-4141BD2990AC}" type="datetimeFigureOut">
               <a:rPr lang="de-DE" smtClean="0"/>
-              <a:t>07.07.2012</a:t>
+              <a:t>12.07.2012</a:t>
             </a:fld>
             <a:endParaRPr lang="de-DE"/>
           </a:p>
@@ -1988,7 +2425,7 @@
           <a:p>
             <a:fld id="{C581432F-93D2-48D5-B81A-4141BD2990AC}" type="datetimeFigureOut">
               <a:rPr lang="de-DE" smtClean="0"/>
-              <a:t>07.07.2012</a:t>
+              <a:t>12.07.2012</a:t>
             </a:fld>
             <a:endParaRPr lang="de-DE"/>
           </a:p>
@@ -2265,7 +2702,7 @@
           <a:p>
             <a:fld id="{C581432F-93D2-48D5-B81A-4141BD2990AC}" type="datetimeFigureOut">
               <a:rPr lang="de-DE" smtClean="0"/>
-              <a:t>07.07.2012</a:t>
+              <a:t>12.07.2012</a:t>
             </a:fld>
             <a:endParaRPr lang="de-DE"/>
           </a:p>
@@ -2518,7 +2955,7 @@
           <a:p>
             <a:fld id="{C581432F-93D2-48D5-B81A-4141BD2990AC}" type="datetimeFigureOut">
               <a:rPr lang="de-DE" smtClean="0"/>
-              <a:t>07.07.2012</a:t>
+              <a:t>12.07.2012</a:t>
             </a:fld>
             <a:endParaRPr lang="de-DE"/>
           </a:p>
@@ -2740,7 +3177,7 @@
           <a:p>
             <a:fld id="{C581432F-93D2-48D5-B81A-4141BD2990AC}" type="datetimeFigureOut">
               <a:rPr lang="de-DE" smtClean="0"/>
-              <a:t>07.07.2012</a:t>
+              <a:t>12.07.2012</a:t>
             </a:fld>
             <a:endParaRPr lang="de-DE"/>
           </a:p>
@@ -3431,17 +3868,17 @@
       </p:grpSpPr>
       <p:pic>
         <p:nvPicPr>
-          <p:cNvPr id="4" name="Picture 3"/>
+          <p:cNvPr id="13" name="Picture 12"/>
           <p:cNvPicPr>
             <a:picLocks noChangeAspect="1"/>
           </p:cNvPicPr>
           <p:nvPr/>
         </p:nvPicPr>
         <p:blipFill>
-          <a:blip r:embed="rId2">
+          <a:blip r:embed="rId3">
             <a:extLst>
               <a:ext uri="{28A0092B-C50C-407E-A947-70E740481C1C}">
-                <a14:useLocalDpi xmlns:a14="http://schemas.microsoft.com/office/drawing/2010/main"/>
+                <a14:useLocalDpi xmlns:a14="http://schemas.microsoft.com/office/drawing/2010/main" val="0"/>
               </a:ext>
             </a:extLst>
           </a:blip>
@@ -3451,8 +3888,8 @@
         </p:blipFill>
         <p:spPr>
           <a:xfrm>
-            <a:off x="0" y="10095"/>
-            <a:ext cx="9144000" cy="6837810"/>
+            <a:off x="0" y="0"/>
+            <a:ext cx="9144000" cy="6858000"/>
           </a:xfrm>
           <a:prstGeom prst="rect">
             <a:avLst/>
@@ -3467,12 +3904,12 @@
         </p:nvSpPr>
         <p:spPr>
           <a:xfrm>
-            <a:off x="467544" y="692696"/>
+            <a:off x="251520" y="692696"/>
             <a:ext cx="3168352" cy="792088"/>
           </a:xfrm>
           <a:prstGeom prst="wedgeRectCallout">
             <a:avLst>
-              <a:gd name="adj1" fmla="val -51244"/>
+              <a:gd name="adj1" fmla="val -26969"/>
               <a:gd name="adj2" fmla="val -89043"/>
             </a:avLst>
           </a:prstGeom>
@@ -3523,13 +3960,13 @@
         </p:nvSpPr>
         <p:spPr>
           <a:xfrm>
-            <a:off x="5796136" y="1628800"/>
-            <a:ext cx="3168352" cy="648072"/>
+            <a:off x="5768507" y="692696"/>
+            <a:ext cx="3168352" cy="504056"/>
           </a:xfrm>
           <a:prstGeom prst="wedgeRectCallout">
             <a:avLst>
-              <a:gd name="adj1" fmla="val 37962"/>
-              <a:gd name="adj2" fmla="val -221550"/>
+              <a:gd name="adj1" fmla="val 22318"/>
+              <a:gd name="adj2" fmla="val -91004"/>
             </a:avLst>
           </a:prstGeom>
         </p:spPr>
@@ -3557,18 +3994,19 @@
                 <a:latin typeface="Courier New" pitchFamily="49" charset="0"/>
                 <a:cs typeface="Courier New" pitchFamily="49" charset="0"/>
               </a:rPr>
-              <a:t>CURRENT SCORE/MUST SCORE</a:t>
-            </a:r>
-          </a:p>
-          <a:p>
-            <a:pPr algn="ctr"/>
+              <a:t>CURRENT </a:t>
+            </a:r>
             <a:r>
               <a:rPr lang="de-DE" sz="1400" b="1" dirty="0" smtClean="0">
                 <a:latin typeface="Courier New" pitchFamily="49" charset="0"/>
                 <a:cs typeface="Courier New" pitchFamily="49" charset="0"/>
               </a:rPr>
-              <a:t>YOU HAVE TO REACH THIS SCORE</a:t>
-            </a:r>
+              <a:t>SCORE/TARGET SCORE</a:t>
+            </a:r>
+            <a:endParaRPr lang="de-DE" sz="1400" b="1" dirty="0" smtClean="0">
+              <a:latin typeface="Courier New" pitchFamily="49" charset="0"/>
+              <a:cs typeface="Courier New" pitchFamily="49" charset="0"/>
+            </a:endParaRPr>
           </a:p>
         </p:txBody>
       </p:sp>
@@ -3580,13 +4018,13 @@
         </p:nvSpPr>
         <p:spPr>
           <a:xfrm>
-            <a:off x="5796136" y="5805264"/>
-            <a:ext cx="2736304" cy="504056"/>
+            <a:off x="3059832" y="4149080"/>
+            <a:ext cx="1648558" cy="432048"/>
           </a:xfrm>
           <a:prstGeom prst="wedgeRectCallout">
             <a:avLst>
-              <a:gd name="adj1" fmla="val -64417"/>
-              <a:gd name="adj2" fmla="val -127754"/>
+              <a:gd name="adj1" fmla="val 65069"/>
+              <a:gd name="adj2" fmla="val 33309"/>
             </a:avLst>
           </a:prstGeom>
         </p:spPr>
@@ -3627,8 +4065,8 @@
         </p:nvSpPr>
         <p:spPr>
           <a:xfrm>
-            <a:off x="251520" y="4221088"/>
-            <a:ext cx="2736304" cy="1080120"/>
+            <a:off x="251520" y="4509120"/>
+            <a:ext cx="2232248" cy="792088"/>
           </a:xfrm>
           <a:prstGeom prst="wedgeRectCallout">
             <a:avLst>
@@ -3655,23 +4093,17 @@
           <a:bodyPr rtlCol="0" anchor="ctr"/>
           <a:lstStyle/>
           <a:p>
-            <a:pPr algn="ctr"/>
             <a:r>
               <a:rPr lang="de-DE" sz="1400" b="1" dirty="0" smtClean="0">
                 <a:latin typeface="Courier New" pitchFamily="49" charset="0"/>
                 <a:cs typeface="Courier New" pitchFamily="49" charset="0"/>
               </a:rPr>
-              <a:t>BOTTOM BAR</a:t>
-            </a:r>
-          </a:p>
-          <a:p>
-            <a:r>
-              <a:rPr lang="de-DE" sz="1400" b="1" dirty="0" smtClean="0">
-                <a:latin typeface="Courier New" pitchFamily="49" charset="0"/>
-                <a:cs typeface="Courier New" pitchFamily="49" charset="0"/>
-              </a:rPr>
               <a:t>YOURHEALTH</a:t>
             </a:r>
+            <a:endParaRPr lang="de-DE" sz="1400" b="1" dirty="0" smtClean="0">
+              <a:latin typeface="Courier New" pitchFamily="49" charset="0"/>
+              <a:cs typeface="Courier New" pitchFamily="49" charset="0"/>
+            </a:endParaRPr>
           </a:p>
           <a:p>
             <a:r>
@@ -3706,28 +4138,21 @@
           </a:xfrm>
           <a:prstGeom prst="wedgeRectCallout">
             <a:avLst>
-              <a:gd name="adj1" fmla="val 78622"/>
-              <a:gd name="adj2" fmla="val 36700"/>
+              <a:gd name="adj1" fmla="val 60508"/>
+              <a:gd name="adj2" fmla="val 4487"/>
             </a:avLst>
           </a:prstGeom>
-          <a:solidFill>
-            <a:srgbClr val="663300"/>
-          </a:solidFill>
-          <a:ln>
-            <a:solidFill>
-              <a:srgbClr val="663300"/>
-            </a:solidFill>
-          </a:ln>
+          <a:ln/>
         </p:spPr>
         <p:style>
           <a:lnRef idx="1">
-            <a:schemeClr val="accent6"/>
+            <a:schemeClr val="accent3"/>
           </a:lnRef>
           <a:fillRef idx="3">
-            <a:schemeClr val="accent6"/>
+            <a:schemeClr val="accent3"/>
           </a:fillRef>
           <a:effectRef idx="2">
-            <a:schemeClr val="accent6"/>
+            <a:schemeClr val="accent3"/>
           </a:effectRef>
           <a:fontRef idx="minor">
             <a:schemeClr val="lt1"/>
@@ -3756,13 +4181,13 @@
         </p:nvSpPr>
         <p:spPr>
           <a:xfrm>
-            <a:off x="7185263" y="4257092"/>
+            <a:off x="2666726" y="2641573"/>
             <a:ext cx="1760725" cy="504056"/>
           </a:xfrm>
           <a:prstGeom prst="wedgeRectCallout">
             <a:avLst>
-              <a:gd name="adj1" fmla="val -49400"/>
-              <a:gd name="adj2" fmla="val 94344"/>
+              <a:gd name="adj1" fmla="val -29986"/>
+              <a:gd name="adj2" fmla="val -92150"/>
             </a:avLst>
           </a:prstGeom>
         </p:spPr>
@@ -3803,13 +4228,13 @@
         </p:nvSpPr>
         <p:spPr>
           <a:xfrm>
-            <a:off x="1873325" y="2024844"/>
+            <a:off x="7176134" y="5049180"/>
             <a:ext cx="1760725" cy="504056"/>
           </a:xfrm>
           <a:prstGeom prst="wedgeRectCallout">
             <a:avLst>
-              <a:gd name="adj1" fmla="val -66873"/>
-              <a:gd name="adj2" fmla="val -7380"/>
+              <a:gd name="adj1" fmla="val -63961"/>
+              <a:gd name="adj2" fmla="val 77390"/>
             </a:avLst>
           </a:prstGeom>
         </p:spPr>
@@ -3850,13 +4275,13 @@
         </p:nvSpPr>
         <p:spPr>
           <a:xfrm>
-            <a:off x="4788024" y="476672"/>
+            <a:off x="3203848" y="1700808"/>
             <a:ext cx="1240403" cy="432048"/>
           </a:xfrm>
           <a:prstGeom prst="wedgeRectCallout">
             <a:avLst>
-              <a:gd name="adj1" fmla="val -85268"/>
-              <a:gd name="adj2" fmla="val 63827"/>
+              <a:gd name="adj1" fmla="val 11185"/>
+              <a:gd name="adj2" fmla="val -143860"/>
             </a:avLst>
           </a:prstGeom>
         </p:spPr>
@@ -3897,25 +4322,25 @@
         </p:nvSpPr>
         <p:spPr>
           <a:xfrm>
-            <a:off x="6084168" y="2924944"/>
-            <a:ext cx="2952328" cy="936104"/>
+            <a:off x="6232988" y="2492896"/>
+            <a:ext cx="2699792" cy="936104"/>
           </a:xfrm>
           <a:prstGeom prst="wedgeRectCallout">
             <a:avLst>
-              <a:gd name="adj1" fmla="val -62403"/>
-              <a:gd name="adj2" fmla="val -24781"/>
+              <a:gd name="adj1" fmla="val 12932"/>
+              <a:gd name="adj2" fmla="val 97549"/>
             </a:avLst>
           </a:prstGeom>
         </p:spPr>
         <p:style>
           <a:lnRef idx="1">
-            <a:schemeClr val="accent3"/>
+            <a:schemeClr val="dk1"/>
           </a:lnRef>
           <a:fillRef idx="3">
-            <a:schemeClr val="accent3"/>
+            <a:schemeClr val="dk1"/>
           </a:fillRef>
           <a:effectRef idx="2">
-            <a:schemeClr val="accent3"/>
+            <a:schemeClr val="dk1"/>
           </a:effectRef>
           <a:fontRef idx="minor">
             <a:schemeClr val="lt1"/>
@@ -3932,6 +4357,57 @@
               </a:rPr>
               <a:t>DON‘T COLLIDE WITH PLANETS! MAKE LOT OF DAMAGE BUT ALSO GIVE MANY POINTS!</a:t>
             </a:r>
+          </a:p>
+        </p:txBody>
+      </p:sp>
+      <p:sp>
+        <p:nvSpPr>
+          <p:cNvPr id="14" name="Rectangular Callout 13"/>
+          <p:cNvSpPr/>
+          <p:nvPr/>
+        </p:nvSpPr>
+        <p:spPr>
+          <a:xfrm>
+            <a:off x="4788024" y="1826340"/>
+            <a:ext cx="1944216" cy="522539"/>
+          </a:xfrm>
+          <a:prstGeom prst="wedgeRectCallout">
+            <a:avLst>
+              <a:gd name="adj1" fmla="val -38872"/>
+              <a:gd name="adj2" fmla="val -139716"/>
+            </a:avLst>
+          </a:prstGeom>
+        </p:spPr>
+        <p:style>
+          <a:lnRef idx="1">
+            <a:schemeClr val="accent6"/>
+          </a:lnRef>
+          <a:fillRef idx="3">
+            <a:schemeClr val="accent6"/>
+          </a:fillRef>
+          <a:effectRef idx="2">
+            <a:schemeClr val="accent6"/>
+          </a:effectRef>
+          <a:fontRef idx="minor">
+            <a:schemeClr val="lt1"/>
+          </a:fontRef>
+        </p:style>
+        <p:txBody>
+          <a:bodyPr rtlCol="0" anchor="ctr"/>
+          <a:lstStyle/>
+          <a:p>
+            <a:pPr algn="ctr"/>
+            <a:r>
+              <a:rPr lang="de-DE" sz="1400" b="1" dirty="0" smtClean="0">
+                <a:latin typeface="Courier New" pitchFamily="49" charset="0"/>
+                <a:cs typeface="Courier New" pitchFamily="49" charset="0"/>
+              </a:rPr>
+              <a:t>STAY AWAY FROM BLACK HOLES!</a:t>
+            </a:r>
+            <a:endParaRPr lang="de-DE" sz="1400" b="1" dirty="0" smtClean="0">
+              <a:latin typeface="Courier New" pitchFamily="49" charset="0"/>
+              <a:cs typeface="Courier New" pitchFamily="49" charset="0"/>
+            </a:endParaRPr>
           </a:p>
         </p:txBody>
       </p:sp>
@@ -3967,9 +4443,9 @@
       </p:grpSpPr>
       <p:pic>
         <p:nvPicPr>
-          <p:cNvPr id="1026" name="Picture 2"/>
+          <p:cNvPr id="2" name="Picture 1"/>
           <p:cNvPicPr>
-            <a:picLocks noChangeAspect="1" noChangeArrowheads="1"/>
+            <a:picLocks noChangeAspect="1"/>
           </p:cNvPicPr>
           <p:nvPr/>
         </p:nvPicPr>
@@ -3977,56 +4453,22 @@
           <a:blip r:embed="rId2">
             <a:extLst>
               <a:ext uri="{28A0092B-C50C-407E-A947-70E740481C1C}">
-                <a14:useLocalDpi xmlns:a14="http://schemas.microsoft.com/office/drawing/2010/main"/>
+                <a14:useLocalDpi xmlns:a14="http://schemas.microsoft.com/office/drawing/2010/main" val="0"/>
               </a:ext>
             </a:extLst>
           </a:blip>
-          <a:srcRect/>
           <a:stretch>
             <a:fillRect/>
           </a:stretch>
         </p:blipFill>
-        <p:spPr bwMode="auto">
+        <p:spPr>
           <a:xfrm>
             <a:off x="0" y="0"/>
-            <a:ext cx="9725025" cy="7267575"/>
+            <a:ext cx="9144000" cy="6858000"/>
           </a:xfrm>
           <a:prstGeom prst="rect">
             <a:avLst/>
           </a:prstGeom>
-          <a:noFill/>
-          <a:ln>
-            <a:noFill/>
-          </a:ln>
-          <a:effectLst/>
-          <a:extLst>
-            <a:ext uri="{909E8E84-426E-40DD-AFC4-6F175D3DCCD1}">
-              <a14:hiddenFill xmlns:a14="http://schemas.microsoft.com/office/drawing/2010/main">
-                <a:solidFill>
-                  <a:schemeClr val="accent1"/>
-                </a:solidFill>
-              </a14:hiddenFill>
-            </a:ext>
-            <a:ext uri="{91240B29-F687-4F45-9708-019B960494DF}">
-              <a14:hiddenLine xmlns:a14="http://schemas.microsoft.com/office/drawing/2010/main" w="9525">
-                <a:solidFill>
-                  <a:schemeClr val="tx1"/>
-                </a:solidFill>
-                <a:miter lim="800000"/>
-                <a:headEnd/>
-                <a:tailEnd/>
-              </a14:hiddenLine>
-            </a:ext>
-            <a:ext uri="{AF507438-7753-43E0-B8FC-AC1667EBCBE1}">
-              <a14:hiddenEffects xmlns:a14="http://schemas.microsoft.com/office/drawing/2010/main">
-                <a:effectLst>
-                  <a:outerShdw dist="35921" dir="2700000" algn="ctr" rotWithShape="0">
-                    <a:schemeClr val="bg2"/>
-                  </a:outerShdw>
-                </a:effectLst>
-              </a14:hiddenEffects>
-            </a:ext>
-          </a:extLst>
         </p:spPr>
       </p:pic>
       <p:sp>
@@ -4037,13 +4479,13 @@
         </p:nvSpPr>
         <p:spPr>
           <a:xfrm>
-            <a:off x="5940152" y="1268760"/>
+            <a:off x="5508104" y="1772816"/>
             <a:ext cx="2771800" cy="1224136"/>
           </a:xfrm>
           <a:prstGeom prst="wedgeRectCallout">
             <a:avLst>
-              <a:gd name="adj1" fmla="val -40943"/>
-              <a:gd name="adj2" fmla="val 174397"/>
+              <a:gd name="adj1" fmla="val -56667"/>
+              <a:gd name="adj2" fmla="val 178586"/>
             </a:avLst>
           </a:prstGeom>
         </p:spPr>
@@ -4083,7 +4525,7 @@
         </p:nvSpPr>
         <p:spPr>
           <a:xfrm>
-            <a:off x="5703396" y="4149080"/>
+            <a:off x="4499992" y="4638860"/>
             <a:ext cx="849973" cy="864096"/>
           </a:xfrm>
           <a:prstGeom prst="donut">
@@ -4378,7 +4820,27 @@
                 <a:latin typeface="Courier New" pitchFamily="49" charset="0"/>
                 <a:cs typeface="Courier New" pitchFamily="49" charset="0"/>
               </a:rPr>
-              <a:t>ROCKET DESIGN EXCLUSIVELY PROVIDED BY ALEXANDER ANSARI</a:t>
+              <a:t>ROCKET DESIGN </a:t>
+            </a:r>
+            <a:r>
+              <a:rPr lang="de-DE" sz="1400" b="1" dirty="0" smtClean="0">
+                <a:solidFill>
+                  <a:srgbClr val="66FF33"/>
+                </a:solidFill>
+                <a:latin typeface="Courier New" pitchFamily="49" charset="0"/>
+                <a:cs typeface="Courier New" pitchFamily="49" charset="0"/>
+              </a:rPr>
+              <a:t>AND SPACE.BIT LOGO EXCLUSIVELY </a:t>
+            </a:r>
+            <a:r>
+              <a:rPr lang="de-DE" sz="1400" b="1" dirty="0" smtClean="0">
+                <a:solidFill>
+                  <a:srgbClr val="66FF33"/>
+                </a:solidFill>
+                <a:latin typeface="Courier New" pitchFamily="49" charset="0"/>
+                <a:cs typeface="Courier New" pitchFamily="49" charset="0"/>
+              </a:rPr>
+              <a:t>PROVIDED BY ALEXANDER ANSARI</a:t>
             </a:r>
           </a:p>
           <a:p>
@@ -5894,8 +6356,37 @@
                 <a:latin typeface="Courier New" pitchFamily="49" charset="0"/>
                 <a:cs typeface="Courier New" pitchFamily="49" charset="0"/>
               </a:rPr>
-              <a:t>(P) PAUSES/RESUMES THE GAME AND RETURNS TO THE TITLE SCREEN/IN GAME SCENE</a:t>
-            </a:r>
+              <a:t>(P) PAUSES/RESUMES THE GAME AND RETURNS TO THE TITLE SCREEN/IN GAME </a:t>
+            </a:r>
+            <a:r>
+              <a:rPr lang="de-DE" sz="1600" b="1" dirty="0" smtClean="0">
+                <a:solidFill>
+                  <a:srgbClr val="66FF33"/>
+                </a:solidFill>
+                <a:latin typeface="Courier New" pitchFamily="49" charset="0"/>
+                <a:cs typeface="Courier New" pitchFamily="49" charset="0"/>
+              </a:rPr>
+              <a:t>SCENE</a:t>
+            </a:r>
+          </a:p>
+          <a:p>
+            <a:r>
+              <a:rPr lang="de-DE" sz="1600" b="1" dirty="0" smtClean="0">
+                <a:solidFill>
+                  <a:srgbClr val="66FF33"/>
+                </a:solidFill>
+                <a:latin typeface="Courier New" pitchFamily="49" charset="0"/>
+                <a:cs typeface="Courier New" pitchFamily="49" charset="0"/>
+              </a:rPr>
+              <a:t>(PRINT-KEY) SCREENSHOT SAVED IN LAUNCHED FOLDER</a:t>
+            </a:r>
+            <a:endParaRPr lang="de-DE" sz="1600" b="1" dirty="0" smtClean="0">
+              <a:solidFill>
+                <a:srgbClr val="66FF33"/>
+              </a:solidFill>
+              <a:latin typeface="Courier New" pitchFamily="49" charset="0"/>
+              <a:cs typeface="Courier New" pitchFamily="49" charset="0"/>
+            </a:endParaRPr>
           </a:p>
           <a:p>
             <a:endParaRPr lang="de-DE" sz="1600" b="1" dirty="0">
@@ -6709,6 +7200,183 @@
           </a:p>
         </p:txBody>
       </p:sp>
+      <p:sp>
+        <p:nvSpPr>
+          <p:cNvPr id="7" name="Rounded Rectangle 6"/>
+          <p:cNvSpPr/>
+          <p:nvPr/>
+        </p:nvSpPr>
+        <p:spPr>
+          <a:xfrm>
+            <a:off x="539552" y="4348594"/>
+            <a:ext cx="8136904" cy="2088232"/>
+          </a:xfrm>
+          <a:prstGeom prst="roundRect">
+            <a:avLst/>
+          </a:prstGeom>
+          <a:solidFill>
+            <a:srgbClr val="0F001E">
+              <a:alpha val="78000"/>
+            </a:srgbClr>
+          </a:solidFill>
+          <a:ln>
+            <a:noFill/>
+          </a:ln>
+          <a:effectLst>
+            <a:outerShdw blurRad="57785" dist="33020" dir="3180000" algn="ctr">
+              <a:srgbClr val="000000">
+                <a:alpha val="30000"/>
+              </a:srgbClr>
+            </a:outerShdw>
+          </a:effectLst>
+          <a:scene3d>
+            <a:camera prst="orthographicFront">
+              <a:rot lat="0" lon="0" rev="0"/>
+            </a:camera>
+            <a:lightRig rig="brightRoom" dir="t">
+              <a:rot lat="0" lon="0" rev="600000"/>
+            </a:lightRig>
+          </a:scene3d>
+          <a:sp3d prstMaterial="metal">
+            <a:bevelT w="38100" h="57150" prst="angle"/>
+          </a:sp3d>
+        </p:spPr>
+        <p:style>
+          <a:lnRef idx="0">
+            <a:schemeClr val="accent4"/>
+          </a:lnRef>
+          <a:fillRef idx="3">
+            <a:schemeClr val="accent4"/>
+          </a:fillRef>
+          <a:effectRef idx="3">
+            <a:schemeClr val="accent4"/>
+          </a:effectRef>
+          <a:fontRef idx="minor">
+            <a:schemeClr val="lt1"/>
+          </a:fontRef>
+        </p:style>
+        <p:txBody>
+          <a:bodyPr lIns="360000" rtlCol="0" anchor="ctr"/>
+          <a:lstStyle/>
+          <a:p>
+            <a:r>
+              <a:rPr lang="de-DE" sz="2000" b="1" dirty="0" smtClean="0">
+                <a:ln>
+                  <a:solidFill>
+                    <a:srgbClr val="7030A0"/>
+                  </a:solidFill>
+                </a:ln>
+                <a:solidFill>
+                  <a:srgbClr val="66FF33"/>
+                </a:solidFill>
+                <a:latin typeface="Courier New" pitchFamily="49" charset="0"/>
+                <a:cs typeface="Courier New" pitchFamily="49" charset="0"/>
+              </a:rPr>
+              <a:t>STAY FAR AWAY FROM BLACK HOLES</a:t>
+            </a:r>
+          </a:p>
+          <a:p>
+            <a:r>
+              <a:rPr lang="de-DE" sz="2000" b="1" dirty="0" smtClean="0">
+                <a:ln>
+                  <a:solidFill>
+                    <a:srgbClr val="7030A0"/>
+                  </a:solidFill>
+                </a:ln>
+                <a:solidFill>
+                  <a:srgbClr val="66FF33"/>
+                </a:solidFill>
+                <a:latin typeface="Courier New" pitchFamily="49" charset="0"/>
+                <a:cs typeface="Courier New" pitchFamily="49" charset="0"/>
+              </a:rPr>
+              <a:t>THEY WILL ATTRACT YOU AND AND</a:t>
+            </a:r>
+          </a:p>
+          <a:p>
+            <a:r>
+              <a:rPr lang="de-DE" sz="2000" b="1" dirty="0" smtClean="0">
+                <a:ln>
+                  <a:solidFill>
+                    <a:srgbClr val="7030A0"/>
+                  </a:solidFill>
+                </a:ln>
+                <a:solidFill>
+                  <a:srgbClr val="66FF33"/>
+                </a:solidFill>
+                <a:latin typeface="Courier New" pitchFamily="49" charset="0"/>
+                <a:cs typeface="Courier New" pitchFamily="49" charset="0"/>
+              </a:rPr>
+              <a:t>TAKE YOUR HEALTH WHEN YOU COME</a:t>
+            </a:r>
+          </a:p>
+          <a:p>
+            <a:r>
+              <a:rPr lang="de-DE" sz="2000" b="1" dirty="0" smtClean="0">
+                <a:ln>
+                  <a:solidFill>
+                    <a:srgbClr val="7030A0"/>
+                  </a:solidFill>
+                </a:ln>
+                <a:solidFill>
+                  <a:srgbClr val="66FF33"/>
+                </a:solidFill>
+                <a:latin typeface="Courier New" pitchFamily="49" charset="0"/>
+                <a:cs typeface="Courier New" pitchFamily="49" charset="0"/>
+              </a:rPr>
+              <a:t>CLOSE TO THEM:</a:t>
+            </a:r>
+            <a:endParaRPr lang="de-DE" sz="2000" b="1" dirty="0" smtClean="0">
+              <a:ln>
+                <a:solidFill>
+                  <a:srgbClr val="7030A0"/>
+                </a:solidFill>
+              </a:ln>
+              <a:solidFill>
+                <a:srgbClr val="66FF33"/>
+              </a:solidFill>
+              <a:latin typeface="Courier New" pitchFamily="49" charset="0"/>
+              <a:cs typeface="Courier New" pitchFamily="49" charset="0"/>
+            </a:endParaRPr>
+          </a:p>
+        </p:txBody>
+      </p:sp>
+      <p:pic>
+        <p:nvPicPr>
+          <p:cNvPr id="2" name="Picture 1"/>
+          <p:cNvPicPr>
+            <a:picLocks noChangeAspect="1"/>
+          </p:cNvPicPr>
+          <p:nvPr/>
+        </p:nvPicPr>
+        <p:blipFill>
+          <a:blip r:embed="rId3">
+            <a:extLst>
+              <a:ext uri="{28A0092B-C50C-407E-A947-70E740481C1C}">
+                <a14:useLocalDpi xmlns:a14="http://schemas.microsoft.com/office/drawing/2010/main" val="0"/>
+              </a:ext>
+            </a:extLst>
+          </a:blip>
+          <a:stretch>
+            <a:fillRect/>
+          </a:stretch>
+        </p:blipFill>
+        <p:spPr>
+          <a:xfrm>
+            <a:off x="4788024" y="3789040"/>
+            <a:ext cx="5044894" cy="2837753"/>
+          </a:xfrm>
+          <a:prstGeom prst="rect">
+            <a:avLst/>
+          </a:prstGeom>
+          <a:effectLst>
+            <a:glow rad="101600">
+              <a:schemeClr val="bg1">
+                <a:alpha val="60000"/>
+              </a:schemeClr>
+            </a:glow>
+          </a:effectLst>
+        </p:spPr>
+      </p:pic>
     </p:spTree>
     <p:extLst>
       <p:ext uri="{BB962C8B-B14F-4D97-AF65-F5344CB8AC3E}">
@@ -7307,7 +7975,7 @@
       </p:grpSpPr>
       <p:pic>
         <p:nvPicPr>
-          <p:cNvPr id="4" name="Picture 3"/>
+          <p:cNvPr id="2" name="Picture 1"/>
           <p:cNvPicPr>
             <a:picLocks noChangeAspect="1"/>
           </p:cNvPicPr>
@@ -7317,7 +7985,7 @@
           <a:blip r:embed="rId2">
             <a:extLst>
               <a:ext uri="{28A0092B-C50C-407E-A947-70E740481C1C}">
-                <a14:useLocalDpi xmlns:a14="http://schemas.microsoft.com/office/drawing/2010/main"/>
+                <a14:useLocalDpi xmlns:a14="http://schemas.microsoft.com/office/drawing/2010/main" val="0"/>
               </a:ext>
             </a:extLst>
           </a:blip>
@@ -7327,8 +7995,8 @@
         </p:blipFill>
         <p:spPr>
           <a:xfrm>
-            <a:off x="0" y="10095"/>
-            <a:ext cx="9144000" cy="6837810"/>
+            <a:off x="0" y="0"/>
+            <a:ext cx="9144000" cy="6858000"/>
           </a:xfrm>
           <a:prstGeom prst="rect">
             <a:avLst/>
@@ -7708,4 +8376,289 @@
   <a:objectDefaults/>
   <a:extraClrSchemeLst/>
 </a:theme>
+</file>
+
+<file path=ppt/theme/theme2.xml><?xml version="1.0" encoding="utf-8"?>
+<a:theme xmlns:a="http://schemas.openxmlformats.org/drawingml/2006/main" name="Office Theme">
+  <a:themeElements>
+    <a:clrScheme name="Office">
+      <a:dk1>
+        <a:sysClr val="windowText" lastClr="000000"/>
+      </a:dk1>
+      <a:lt1>
+        <a:sysClr val="window" lastClr="FFFFFF"/>
+      </a:lt1>
+      <a:dk2>
+        <a:srgbClr val="1F497D"/>
+      </a:dk2>
+      <a:lt2>
+        <a:srgbClr val="EEECE1"/>
+      </a:lt2>
+      <a:accent1>
+        <a:srgbClr val="4F81BD"/>
+      </a:accent1>
+      <a:accent2>
+        <a:srgbClr val="C0504D"/>
+      </a:accent2>
+      <a:accent3>
+        <a:srgbClr val="9BBB59"/>
+      </a:accent3>
+      <a:accent4>
+        <a:srgbClr val="8064A2"/>
+      </a:accent4>
+      <a:accent5>
+        <a:srgbClr val="4BACC6"/>
+      </a:accent5>
+      <a:accent6>
+        <a:srgbClr val="F79646"/>
+      </a:accent6>
+      <a:hlink>
+        <a:srgbClr val="0000FF"/>
+      </a:hlink>
+      <a:folHlink>
+        <a:srgbClr val="800080"/>
+      </a:folHlink>
+    </a:clrScheme>
+    <a:fontScheme name="Office">
+      <a:majorFont>
+        <a:latin typeface="Calibri"/>
+        <a:ea typeface=""/>
+        <a:cs typeface=""/>
+        <a:font script="Jpan" typeface="ＭＳ Ｐゴシック"/>
+        <a:font script="Hang" typeface="맑은 고딕"/>
+        <a:font script="Hans" typeface="宋体"/>
+        <a:font script="Hant" typeface="新細明體"/>
+        <a:font script="Arab" typeface="Times New Roman"/>
+        <a:font script="Hebr" typeface="Times New Roman"/>
+        <a:font script="Thai" typeface="Angsana New"/>
+        <a:font script="Ethi" typeface="Nyala"/>
+        <a:font script="Beng" typeface="Vrinda"/>
+        <a:font script="Gujr" typeface="Shruti"/>
+        <a:font script="Khmr" typeface="MoolBoran"/>
+        <a:font script="Knda" typeface="Tunga"/>
+        <a:font script="Guru" typeface="Raavi"/>
+        <a:font script="Cans" typeface="Euphemia"/>
+        <a:font script="Cher" typeface="Plantagenet Cherokee"/>
+        <a:font script="Yiii" typeface="Microsoft Yi Baiti"/>
+        <a:font script="Tibt" typeface="Microsoft Himalaya"/>
+        <a:font script="Thaa" typeface="MV Boli"/>
+        <a:font script="Deva" typeface="Mangal"/>
+        <a:font script="Telu" typeface="Gautami"/>
+        <a:font script="Taml" typeface="Latha"/>
+        <a:font script="Syrc" typeface="Estrangelo Edessa"/>
+        <a:font script="Orya" typeface="Kalinga"/>
+        <a:font script="Mlym" typeface="Kartika"/>
+        <a:font script="Laoo" typeface="DokChampa"/>
+        <a:font script="Sinh" typeface="Iskoola Pota"/>
+        <a:font script="Mong" typeface="Mongolian Baiti"/>
+        <a:font script="Viet" typeface="Times New Roman"/>
+        <a:font script="Uigh" typeface="Microsoft Uighur"/>
+        <a:font script="Geor" typeface="Sylfaen"/>
+      </a:majorFont>
+      <a:minorFont>
+        <a:latin typeface="Calibri"/>
+        <a:ea typeface=""/>
+        <a:cs typeface=""/>
+        <a:font script="Jpan" typeface="ＭＳ Ｐゴシック"/>
+        <a:font script="Hang" typeface="맑은 고딕"/>
+        <a:font script="Hans" typeface="宋体"/>
+        <a:font script="Hant" typeface="新細明體"/>
+        <a:font script="Arab" typeface="Arial"/>
+        <a:font script="Hebr" typeface="Arial"/>
+        <a:font script="Thai" typeface="Cordia New"/>
+        <a:font script="Ethi" typeface="Nyala"/>
+        <a:font script="Beng" typeface="Vrinda"/>
+        <a:font script="Gujr" typeface="Shruti"/>
+        <a:font script="Khmr" typeface="DaunPenh"/>
+        <a:font script="Knda" typeface="Tunga"/>
+        <a:font script="Guru" typeface="Raavi"/>
+        <a:font script="Cans" typeface="Euphemia"/>
+        <a:font script="Cher" typeface="Plantagenet Cherokee"/>
+        <a:font script="Yiii" typeface="Microsoft Yi Baiti"/>
+        <a:font script="Tibt" typeface="Microsoft Himalaya"/>
+        <a:font script="Thaa" typeface="MV Boli"/>
+        <a:font script="Deva" typeface="Mangal"/>
+        <a:font script="Telu" typeface="Gautami"/>
+        <a:font script="Taml" typeface="Latha"/>
+        <a:font script="Syrc" typeface="Estrangelo Edessa"/>
+        <a:font script="Orya" typeface="Kalinga"/>
+        <a:font script="Mlym" typeface="Kartika"/>
+        <a:font script="Laoo" typeface="DokChampa"/>
+        <a:font script="Sinh" typeface="Iskoola Pota"/>
+        <a:font script="Mong" typeface="Mongolian Baiti"/>
+        <a:font script="Viet" typeface="Arial"/>
+        <a:font script="Uigh" typeface="Microsoft Uighur"/>
+        <a:font script="Geor" typeface="Sylfaen"/>
+      </a:minorFont>
+    </a:fontScheme>
+    <a:fmtScheme name="Office">
+      <a:fillStyleLst>
+        <a:solidFill>
+          <a:schemeClr val="phClr"/>
+        </a:solidFill>
+        <a:gradFill rotWithShape="1">
+          <a:gsLst>
+            <a:gs pos="0">
+              <a:schemeClr val="phClr">
+                <a:tint val="50000"/>
+                <a:satMod val="300000"/>
+              </a:schemeClr>
+            </a:gs>
+            <a:gs pos="35000">
+              <a:schemeClr val="phClr">
+                <a:tint val="37000"/>
+                <a:satMod val="300000"/>
+              </a:schemeClr>
+            </a:gs>
+            <a:gs pos="100000">
+              <a:schemeClr val="phClr">
+                <a:tint val="15000"/>
+                <a:satMod val="350000"/>
+              </a:schemeClr>
+            </a:gs>
+          </a:gsLst>
+          <a:lin ang="16200000" scaled="1"/>
+        </a:gradFill>
+        <a:gradFill rotWithShape="1">
+          <a:gsLst>
+            <a:gs pos="0">
+              <a:schemeClr val="phClr">
+                <a:shade val="51000"/>
+                <a:satMod val="130000"/>
+              </a:schemeClr>
+            </a:gs>
+            <a:gs pos="80000">
+              <a:schemeClr val="phClr">
+                <a:shade val="93000"/>
+                <a:satMod val="130000"/>
+              </a:schemeClr>
+            </a:gs>
+            <a:gs pos="100000">
+              <a:schemeClr val="phClr">
+                <a:shade val="94000"/>
+                <a:satMod val="135000"/>
+              </a:schemeClr>
+            </a:gs>
+          </a:gsLst>
+          <a:lin ang="16200000" scaled="0"/>
+        </a:gradFill>
+      </a:fillStyleLst>
+      <a:lnStyleLst>
+        <a:ln w="9525" cap="flat" cmpd="sng" algn="ctr">
+          <a:solidFill>
+            <a:schemeClr val="phClr">
+              <a:shade val="95000"/>
+              <a:satMod val="105000"/>
+            </a:schemeClr>
+          </a:solidFill>
+          <a:prstDash val="solid"/>
+        </a:ln>
+        <a:ln w="25400" cap="flat" cmpd="sng" algn="ctr">
+          <a:solidFill>
+            <a:schemeClr val="phClr"/>
+          </a:solidFill>
+          <a:prstDash val="solid"/>
+        </a:ln>
+        <a:ln w="38100" cap="flat" cmpd="sng" algn="ctr">
+          <a:solidFill>
+            <a:schemeClr val="phClr"/>
+          </a:solidFill>
+          <a:prstDash val="solid"/>
+        </a:ln>
+      </a:lnStyleLst>
+      <a:effectStyleLst>
+        <a:effectStyle>
+          <a:effectLst>
+            <a:outerShdw blurRad="40000" dist="20000" dir="5400000" rotWithShape="0">
+              <a:srgbClr val="000000">
+                <a:alpha val="38000"/>
+              </a:srgbClr>
+            </a:outerShdw>
+          </a:effectLst>
+        </a:effectStyle>
+        <a:effectStyle>
+          <a:effectLst>
+            <a:outerShdw blurRad="40000" dist="23000" dir="5400000" rotWithShape="0">
+              <a:srgbClr val="000000">
+                <a:alpha val="35000"/>
+              </a:srgbClr>
+            </a:outerShdw>
+          </a:effectLst>
+        </a:effectStyle>
+        <a:effectStyle>
+          <a:effectLst>
+            <a:outerShdw blurRad="40000" dist="23000" dir="5400000" rotWithShape="0">
+              <a:srgbClr val="000000">
+                <a:alpha val="35000"/>
+              </a:srgbClr>
+            </a:outerShdw>
+          </a:effectLst>
+          <a:scene3d>
+            <a:camera prst="orthographicFront">
+              <a:rot lat="0" lon="0" rev="0"/>
+            </a:camera>
+            <a:lightRig rig="threePt" dir="t">
+              <a:rot lat="0" lon="0" rev="1200000"/>
+            </a:lightRig>
+          </a:scene3d>
+          <a:sp3d>
+            <a:bevelT w="63500" h="25400"/>
+          </a:sp3d>
+        </a:effectStyle>
+      </a:effectStyleLst>
+      <a:bgFillStyleLst>
+        <a:solidFill>
+          <a:schemeClr val="phClr"/>
+        </a:solidFill>
+        <a:gradFill rotWithShape="1">
+          <a:gsLst>
+            <a:gs pos="0">
+              <a:schemeClr val="phClr">
+                <a:tint val="40000"/>
+                <a:satMod val="350000"/>
+              </a:schemeClr>
+            </a:gs>
+            <a:gs pos="40000">
+              <a:schemeClr val="phClr">
+                <a:tint val="45000"/>
+                <a:shade val="99000"/>
+                <a:satMod val="350000"/>
+              </a:schemeClr>
+            </a:gs>
+            <a:gs pos="100000">
+              <a:schemeClr val="phClr">
+                <a:shade val="20000"/>
+                <a:satMod val="255000"/>
+              </a:schemeClr>
+            </a:gs>
+          </a:gsLst>
+          <a:path path="circle">
+            <a:fillToRect l="50000" t="-80000" r="50000" b="180000"/>
+          </a:path>
+        </a:gradFill>
+        <a:gradFill rotWithShape="1">
+          <a:gsLst>
+            <a:gs pos="0">
+              <a:schemeClr val="phClr">
+                <a:tint val="80000"/>
+                <a:satMod val="300000"/>
+              </a:schemeClr>
+            </a:gs>
+            <a:gs pos="100000">
+              <a:schemeClr val="phClr">
+                <a:shade val="30000"/>
+                <a:satMod val="200000"/>
+              </a:schemeClr>
+            </a:gs>
+          </a:gsLst>
+          <a:path path="circle">
+            <a:fillToRect l="50000" t="50000" r="50000" b="50000"/>
+          </a:path>
+        </a:gradFill>
+      </a:bgFillStyleLst>
+    </a:fmtScheme>
+  </a:themeElements>
+  <a:objectDefaults/>
+  <a:extraClrSchemeLst/>
+</a:theme>
 </file>
</xml_diff>